<commit_message>
revised tutorial on Dec 2015
</commit_message>
<xml_diff>
--- a/rtfbsdb-tutorial.pptx
+++ b/rtfbsdb-tutorial.pptx
@@ -247,7 +247,7 @@
             <a:fld id="{68796EA6-6F25-4F19-87BA-7ADCC16DAEFF}" type="datetimeFigureOut">
               <a:rPr lang="en-US" smtClean="0"/>
               <a:pPr/>
-              <a:t>10/7/15</a:t>
+              <a:t>12/8/2015</a:t>
             </a:fld>
             <a:endParaRPr lang="en-US" dirty="0"/>
           </a:p>
@@ -414,7 +414,7 @@
             <a:fld id="{C39C172E-A8B5-46F6-B05C-DFA3E2E0F207}" type="datetimeFigureOut">
               <a:rPr lang="en-US" smtClean="0"/>
               <a:pPr/>
-              <a:t>10/7/15</a:t>
+              <a:t>12/8/2015</a:t>
             </a:fld>
             <a:endParaRPr lang="en-US" dirty="0"/>
           </a:p>
@@ -2112,7 +2112,7 @@
             <a:fld id="{4E708F12-96AD-4ED4-8132-A78F5E42C1F5}" type="datetime1">
               <a:rPr lang="en-US" smtClean="0"/>
               <a:pPr/>
-              <a:t>10/7/15</a:t>
+              <a:t>12/8/2015</a:t>
             </a:fld>
             <a:endParaRPr lang="en-US" dirty="0"/>
           </a:p>
@@ -2336,7 +2336,7 @@
             <a:fld id="{7B7FA170-8299-44AD-AEEF-FC686C3D7804}" type="datetime1">
               <a:rPr lang="en-US" smtClean="0"/>
               <a:pPr/>
-              <a:t>10/7/15</a:t>
+              <a:t>12/8/2015</a:t>
             </a:fld>
             <a:endParaRPr lang="en-US" dirty="0"/>
           </a:p>
@@ -2520,7 +2520,7 @@
             <a:fld id="{2231763A-68EC-4ECD-9620-D9FE9CDDD622}" type="datetime1">
               <a:rPr lang="en-US" smtClean="0"/>
               <a:pPr/>
-              <a:t>10/7/15</a:t>
+              <a:t>12/8/2015</a:t>
             </a:fld>
             <a:endParaRPr lang="en-US" dirty="0"/>
           </a:p>
@@ -2714,7 +2714,7 @@
             <a:fld id="{7B98BEDD-6160-49BB-B372-861DE7DE9BA5}" type="datetime1">
               <a:rPr lang="en-US" smtClean="0"/>
               <a:pPr/>
-              <a:t>10/7/15</a:t>
+              <a:t>12/8/2015</a:t>
             </a:fld>
             <a:endParaRPr lang="en-US" dirty="0"/>
           </a:p>
@@ -2898,7 +2898,7 @@
             <a:fld id="{0AAE819F-B7FD-4B29-8F66-9E318144BC2A}" type="datetime1">
               <a:rPr lang="en-US" smtClean="0"/>
               <a:pPr/>
-              <a:t>10/7/15</a:t>
+              <a:t>12/8/2015</a:t>
             </a:fld>
             <a:endParaRPr lang="en-US" dirty="0"/>
           </a:p>
@@ -3132,7 +3132,7 @@
             <a:fld id="{D4CA159C-B6E0-4F10-9F4A-2FA57003B139}" type="datetime1">
               <a:rPr lang="en-US" smtClean="0"/>
               <a:pPr/>
-              <a:t>10/7/15</a:t>
+              <a:t>12/8/2015</a:t>
             </a:fld>
             <a:endParaRPr lang="en-US" dirty="0"/>
           </a:p>
@@ -3426,7 +3426,7 @@
             <a:fld id="{8170CBBB-D1D1-4386-A5E9-07F3477B78F3}" type="datetime1">
               <a:rPr lang="en-US" smtClean="0"/>
               <a:pPr/>
-              <a:t>10/7/15</a:t>
+              <a:t>12/8/2015</a:t>
             </a:fld>
             <a:endParaRPr lang="en-US" dirty="0"/>
           </a:p>
@@ -3856,7 +3856,7 @@
             <a:fld id="{9FA4CAD8-0EA7-4615-B69B-B2F199EF3A93}" type="datetime1">
               <a:rPr lang="en-US" smtClean="0"/>
               <a:pPr/>
-              <a:t>10/7/15</a:t>
+              <a:t>12/8/2015</a:t>
             </a:fld>
             <a:endParaRPr lang="en-US" dirty="0"/>
           </a:p>
@@ -4011,7 +4011,7 @@
             <a:fld id="{B9234BD7-6953-492C-921B-E68B2D7F14C8}" type="datetime1">
               <a:rPr lang="en-US" smtClean="0"/>
               <a:pPr/>
-              <a:t>10/7/15</a:t>
+              <a:t>12/8/2015</a:t>
             </a:fld>
             <a:endParaRPr lang="en-US" dirty="0"/>
           </a:p>
@@ -4120,7 +4120,7 @@
             <a:fld id="{35A17D9B-D4D3-4E23-88DF-2E354FA43196}" type="datetime1">
               <a:rPr lang="en-US" smtClean="0"/>
               <a:pPr/>
-              <a:t>10/7/15</a:t>
+              <a:t>12/8/2015</a:t>
             </a:fld>
             <a:endParaRPr lang="en-US" dirty="0"/>
           </a:p>
@@ -4384,7 +4384,7 @@
             <a:fld id="{541F67C5-D04E-4576-B61C-12ABA14BBD6C}" type="datetime1">
               <a:rPr lang="en-US" smtClean="0"/>
               <a:pPr/>
-              <a:t>10/7/15</a:t>
+              <a:t>12/8/2015</a:t>
             </a:fld>
             <a:endParaRPr lang="en-US" dirty="0"/>
           </a:p>
@@ -5286,7 +5286,7 @@
             <a:fld id="{C20F09E4-6EA4-4BF3-9FC8-FF40373B88E6}" type="datetime1">
               <a:rPr lang="en-US" smtClean="0"/>
               <a:pPr/>
-              <a:t>10/7/15</a:t>
+              <a:t>12/8/2015</a:t>
             </a:fld>
             <a:endParaRPr lang="en-US" dirty="0"/>
           </a:p>
@@ -5830,7 +5830,9 @@
         </p:nvSpPr>
         <p:spPr/>
         <p:txBody>
-          <a:bodyPr/>
+          <a:bodyPr>
+            <a:normAutofit fontScale="92500" lnSpcReduction="10000"/>
+          </a:bodyPr>
           <a:lstStyle/>
           <a:p>
             <a:r>
@@ -5854,12 +5856,31 @@
             </a:r>
             <a:r>
               <a:rPr lang="en-US" sz="2000" dirty="0"/>
-              <a:t> Lab(http://www.dankolab.org</a:t>
+              <a:t> Lab(</a:t>
+            </a:r>
+            <a:r>
+              <a:rPr lang="en-US" sz="2000" dirty="0">
+                <a:hlinkClick r:id="rId3"/>
+              </a:rPr>
+              <a:t>http://www.dankolab.org</a:t>
+            </a:r>
+            <a:r>
+              <a:rPr lang="en-US" sz="2000" dirty="0" smtClean="0">
+                <a:hlinkClick r:id="rId3"/>
+              </a:rPr>
+              <a:t>/</a:t>
             </a:r>
             <a:r>
               <a:rPr lang="en-US" sz="2000" dirty="0" smtClean="0"/>
-              <a:t>/)</a:t>
-            </a:r>
+              <a:t>)</a:t>
+            </a:r>
+          </a:p>
+          <a:p>
+            <a:r>
+              <a:rPr lang="en-US" sz="2000" dirty="0" smtClean="0"/>
+              <a:t>12/8/2015</a:t>
+            </a:r>
+            <a:endParaRPr lang="en-US" sz="2000" dirty="0" smtClean="0"/>
           </a:p>
           <a:p>
             <a:endParaRPr lang="en-US" dirty="0"/>
@@ -6035,7 +6056,15 @@
             </a:r>
             <a:r>
               <a:rPr lang="en-US" dirty="0" smtClean="0"/>
-              <a:t> is also employed to clustering the similarity measures used in the </a:t>
+              <a:t> is also employed to </a:t>
+            </a:r>
+            <a:r>
+              <a:rPr lang="en-US" dirty="0" smtClean="0"/>
+              <a:t>cluster </a:t>
+            </a:r>
+            <a:r>
+              <a:rPr lang="en-US" dirty="0" smtClean="0"/>
+              <a:t>the similarity measures used in the </a:t>
             </a:r>
             <a:r>
               <a:rPr lang="en-US" i="1" dirty="0" err="1" smtClean="0"/>
@@ -6114,7 +6143,17 @@
                 <a:latin typeface="Times New Roman" panose="02020603050405020304" pitchFamily="18" charset="0"/>
                 <a:cs typeface="Times New Roman" panose="02020603050405020304" pitchFamily="18" charset="0"/>
               </a:rPr>
-              <a:t>clu1 </a:t>
+              <a:t>tfs1&lt;- </a:t>
+            </a:r>
+            <a:r>
+              <a:rPr lang="en-US" sz="1600" dirty="0" err="1">
+                <a:solidFill>
+                  <a:schemeClr val="tx1"/>
+                </a:solidFill>
+                <a:latin typeface="Times New Roman" panose="02020603050405020304" pitchFamily="18" charset="0"/>
+                <a:cs typeface="Times New Roman" panose="02020603050405020304" pitchFamily="18" charset="0"/>
+              </a:rPr>
+              <a:t>tfbs.clusterMotifs</a:t>
             </a:r>
             <a:r>
               <a:rPr lang="en-US" sz="1600" dirty="0">
@@ -6124,7 +6163,7 @@
                 <a:latin typeface="Times New Roman" panose="02020603050405020304" pitchFamily="18" charset="0"/>
                 <a:cs typeface="Times New Roman" panose="02020603050405020304" pitchFamily="18" charset="0"/>
               </a:rPr>
-              <a:t>&lt;- </a:t>
+              <a:t>(</a:t>
             </a:r>
             <a:r>
               <a:rPr lang="en-US" sz="1600" dirty="0" err="1">
@@ -6134,7 +6173,7 @@
                 <a:latin typeface="Times New Roman" panose="02020603050405020304" pitchFamily="18" charset="0"/>
                 <a:cs typeface="Times New Roman" panose="02020603050405020304" pitchFamily="18" charset="0"/>
               </a:rPr>
-              <a:t>tfbs.clusterMotifs</a:t>
+              <a:t>tfs</a:t>
             </a:r>
             <a:r>
               <a:rPr lang="en-US" sz="1600" dirty="0">
@@ -6144,7 +6183,7 @@
                 <a:latin typeface="Times New Roman" panose="02020603050405020304" pitchFamily="18" charset="0"/>
                 <a:cs typeface="Times New Roman" panose="02020603050405020304" pitchFamily="18" charset="0"/>
               </a:rPr>
-              <a:t>(</a:t>
+              <a:t>, method="</a:t>
             </a:r>
             <a:r>
               <a:rPr lang="en-US" sz="1600" dirty="0" err="1">
@@ -6154,7 +6193,7 @@
                 <a:latin typeface="Times New Roman" panose="02020603050405020304" pitchFamily="18" charset="0"/>
                 <a:cs typeface="Times New Roman" panose="02020603050405020304" pitchFamily="18" charset="0"/>
               </a:rPr>
-              <a:t>tfs</a:t>
+              <a:t>agnes</a:t>
             </a:r>
             <a:r>
               <a:rPr lang="en-US" sz="1600" dirty="0">
@@ -6164,26 +6203,6 @@
                 <a:latin typeface="Times New Roman" panose="02020603050405020304" pitchFamily="18" charset="0"/>
                 <a:cs typeface="Times New Roman" panose="02020603050405020304" pitchFamily="18" charset="0"/>
               </a:rPr>
-              <a:t>, method="</a:t>
-            </a:r>
-            <a:r>
-              <a:rPr lang="en-US" sz="1600" dirty="0" err="1">
-                <a:solidFill>
-                  <a:schemeClr val="tx1"/>
-                </a:solidFill>
-                <a:latin typeface="Times New Roman" panose="02020603050405020304" pitchFamily="18" charset="0"/>
-                <a:cs typeface="Times New Roman" panose="02020603050405020304" pitchFamily="18" charset="0"/>
-              </a:rPr>
-              <a:t>agnes</a:t>
-            </a:r>
-            <a:r>
-              <a:rPr lang="en-US" sz="1600" dirty="0">
-                <a:solidFill>
-                  <a:schemeClr val="tx1"/>
-                </a:solidFill>
-                <a:latin typeface="Times New Roman" panose="02020603050405020304" pitchFamily="18" charset="0"/>
-                <a:cs typeface="Times New Roman" panose="02020603050405020304" pitchFamily="18" charset="0"/>
-              </a:rPr>
               <a:t>", </a:t>
             </a:r>
             <a:r>
@@ -6217,16 +6236,6 @@
               <a:t>pdf.heatmap</a:t>
             </a:r>
             <a:r>
-              <a:rPr lang="en-US" sz="1600" dirty="0">
-                <a:solidFill>
-                  <a:schemeClr val="tx1"/>
-                </a:solidFill>
-                <a:latin typeface="Times New Roman" panose="02020603050405020304" pitchFamily="18" charset="0"/>
-                <a:cs typeface="Times New Roman" panose="02020603050405020304" pitchFamily="18" charset="0"/>
-              </a:rPr>
-              <a:t>="</a:t>
-            </a:r>
-            <a:r>
               <a:rPr lang="en-US" sz="1600" dirty="0" smtClean="0">
                 <a:solidFill>
                   <a:schemeClr val="tx1"/>
@@ -6234,7 +6243,17 @@
                 <a:latin typeface="Times New Roman" panose="02020603050405020304" pitchFamily="18" charset="0"/>
                 <a:cs typeface="Times New Roman" panose="02020603050405020304" pitchFamily="18" charset="0"/>
               </a:rPr>
-              <a:t>heatmap.pdf" )</a:t>
+              <a:t>=“agnes.hm.pdf" </a:t>
+            </a:r>
+            <a:r>
+              <a:rPr lang="en-US" sz="1600" dirty="0" smtClean="0">
+                <a:solidFill>
+                  <a:schemeClr val="tx1"/>
+                </a:solidFill>
+                <a:latin typeface="Times New Roman" panose="02020603050405020304" pitchFamily="18" charset="0"/>
+                <a:cs typeface="Times New Roman" panose="02020603050405020304" pitchFamily="18" charset="0"/>
+              </a:rPr>
+              <a:t>)</a:t>
             </a:r>
             <a:endParaRPr lang="en-US" sz="1600" dirty="0">
               <a:solidFill>
@@ -6268,7 +6287,7 @@
                 <a:latin typeface="Times New Roman" panose="02020603050405020304" pitchFamily="18" charset="0"/>
                 <a:cs typeface="Times New Roman" panose="02020603050405020304" pitchFamily="18" charset="0"/>
               </a:rPr>
-              <a:t>clu2 </a:t>
+              <a:t>tfs2 </a:t>
             </a:r>
             <a:r>
               <a:rPr lang="en-US" sz="1600" dirty="0">
@@ -6361,16 +6380,6 @@
               <a:t>pdf.heatmap</a:t>
             </a:r>
             <a:r>
-              <a:rPr lang="en-US" sz="1600" dirty="0">
-                <a:solidFill>
-                  <a:schemeClr val="tx1"/>
-                </a:solidFill>
-                <a:latin typeface="Times New Roman" panose="02020603050405020304" pitchFamily="18" charset="0"/>
-                <a:cs typeface="Times New Roman" panose="02020603050405020304" pitchFamily="18" charset="0"/>
-              </a:rPr>
-              <a:t>="</a:t>
-            </a:r>
-            <a:r>
               <a:rPr lang="en-US" sz="1600" dirty="0" smtClean="0">
                 <a:solidFill>
                   <a:schemeClr val="tx1"/>
@@ -6378,7 +6387,17 @@
                 <a:latin typeface="Times New Roman" panose="02020603050405020304" pitchFamily="18" charset="0"/>
                 <a:cs typeface="Times New Roman" panose="02020603050405020304" pitchFamily="18" charset="0"/>
               </a:rPr>
-              <a:t>heatmap.pdf" )</a:t>
+              <a:t>=“apcluster.hm.pdf</a:t>
+            </a:r>
+            <a:r>
+              <a:rPr lang="en-US" sz="1600" dirty="0" smtClean="0">
+                <a:solidFill>
+                  <a:schemeClr val="tx1"/>
+                </a:solidFill>
+                <a:latin typeface="Times New Roman" panose="02020603050405020304" pitchFamily="18" charset="0"/>
+                <a:cs typeface="Times New Roman" panose="02020603050405020304" pitchFamily="18" charset="0"/>
+              </a:rPr>
+              <a:t>" )</a:t>
             </a:r>
             <a:endParaRPr lang="en-US" sz="1600" dirty="0">
               <a:solidFill>
@@ -6450,46 +6469,6 @@
               <a:t>( </a:t>
             </a:r>
             <a:r>
-              <a:rPr lang="en-US" sz="1600" dirty="0" err="1" smtClean="0">
-                <a:solidFill>
-                  <a:schemeClr val="tx1"/>
-                </a:solidFill>
-                <a:latin typeface="Times New Roman" panose="02020603050405020304" pitchFamily="18" charset="0"/>
-                <a:cs typeface="Times New Roman" panose="02020603050405020304" pitchFamily="18" charset="0"/>
-              </a:rPr>
-              <a:t>tfs</a:t>
-            </a:r>
-            <a:r>
-              <a:rPr lang="en-US" sz="1600" dirty="0">
-                <a:solidFill>
-                  <a:schemeClr val="tx1"/>
-                </a:solidFill>
-                <a:latin typeface="Times New Roman" panose="02020603050405020304" pitchFamily="18" charset="0"/>
-                <a:cs typeface="Times New Roman" panose="02020603050405020304" pitchFamily="18" charset="0"/>
-              </a:rPr>
-              <a:t>, </a:t>
-            </a:r>
-            <a:r>
-              <a:rPr lang="en-US" sz="1600" dirty="0" err="1">
-                <a:solidFill>
-                  <a:schemeClr val="tx1"/>
-                </a:solidFill>
-                <a:latin typeface="Times New Roman" panose="02020603050405020304" pitchFamily="18" charset="0"/>
-                <a:cs typeface="Times New Roman" panose="02020603050405020304" pitchFamily="18" charset="0"/>
-              </a:rPr>
-              <a:t>clu</a:t>
-            </a:r>
-            <a:r>
-              <a:rPr lang="en-US" sz="1600" dirty="0">
-                <a:solidFill>
-                  <a:schemeClr val="tx1"/>
-                </a:solidFill>
-                <a:latin typeface="Times New Roman" panose="02020603050405020304" pitchFamily="18" charset="0"/>
-                <a:cs typeface="Times New Roman" panose="02020603050405020304" pitchFamily="18" charset="0"/>
-              </a:rPr>
-              <a:t>, "</a:t>
-            </a:r>
-            <a:r>
               <a:rPr lang="en-US" sz="1600" dirty="0" smtClean="0">
                 <a:solidFill>
                   <a:schemeClr val="tx1"/>
@@ -6497,7 +6476,17 @@
                 <a:latin typeface="Times New Roman" panose="02020603050405020304" pitchFamily="18" charset="0"/>
                 <a:cs typeface="Times New Roman" panose="02020603050405020304" pitchFamily="18" charset="0"/>
               </a:rPr>
-              <a:t>clustering.logos.pdf" );</a:t>
+              <a:t>tfs1, file.pdf=“agnes.logos.pdf" </a:t>
+            </a:r>
+            <a:r>
+              <a:rPr lang="en-US" sz="1600" dirty="0" smtClean="0">
+                <a:solidFill>
+                  <a:schemeClr val="tx1"/>
+                </a:solidFill>
+                <a:latin typeface="Times New Roman" panose="02020603050405020304" pitchFamily="18" charset="0"/>
+                <a:cs typeface="Times New Roman" panose="02020603050405020304" pitchFamily="18" charset="0"/>
+              </a:rPr>
+              <a:t>);</a:t>
             </a:r>
             <a:endParaRPr lang="en-US" sz="1600" dirty="0">
               <a:solidFill>
@@ -6506,6 +6495,77 @@
               <a:latin typeface="Times New Roman" panose="02020603050405020304" pitchFamily="18" charset="0"/>
               <a:cs typeface="Times New Roman" panose="02020603050405020304" pitchFamily="18" charset="0"/>
             </a:endParaRPr>
+          </a:p>
+          <a:p>
+            <a:pPr marL="109728" indent="0">
+              <a:buNone/>
+            </a:pPr>
+            <a:r>
+              <a:rPr lang="en-US" sz="1600" dirty="0" err="1" smtClean="0">
+                <a:solidFill>
+                  <a:schemeClr val="tx1"/>
+                </a:solidFill>
+                <a:latin typeface="Times New Roman" panose="02020603050405020304" pitchFamily="18" charset="0"/>
+                <a:cs typeface="Times New Roman" panose="02020603050405020304" pitchFamily="18" charset="0"/>
+              </a:rPr>
+              <a:t>tfbs.drawLogosForClusters</a:t>
+            </a:r>
+            <a:r>
+              <a:rPr lang="en-US" sz="1600" dirty="0">
+                <a:solidFill>
+                  <a:schemeClr val="tx1"/>
+                </a:solidFill>
+                <a:latin typeface="Times New Roman" panose="02020603050405020304" pitchFamily="18" charset="0"/>
+                <a:cs typeface="Times New Roman" panose="02020603050405020304" pitchFamily="18" charset="0"/>
+              </a:rPr>
+              <a:t>( </a:t>
+            </a:r>
+            <a:r>
+              <a:rPr lang="en-US" sz="1600" dirty="0" smtClean="0">
+                <a:solidFill>
+                  <a:schemeClr val="tx1"/>
+                </a:solidFill>
+                <a:latin typeface="Times New Roman" panose="02020603050405020304" pitchFamily="18" charset="0"/>
+                <a:cs typeface="Times New Roman" panose="02020603050405020304" pitchFamily="18" charset="0"/>
+              </a:rPr>
+              <a:t>tfs2, </a:t>
+            </a:r>
+            <a:r>
+              <a:rPr lang="en-US" sz="1600" dirty="0">
+                <a:solidFill>
+                  <a:schemeClr val="tx1"/>
+                </a:solidFill>
+                <a:latin typeface="Times New Roman" panose="02020603050405020304" pitchFamily="18" charset="0"/>
+                <a:cs typeface="Times New Roman" panose="02020603050405020304" pitchFamily="18" charset="0"/>
+              </a:rPr>
+              <a:t>file.pdf</a:t>
+            </a:r>
+            <a:r>
+              <a:rPr lang="en-US" sz="1600" dirty="0" smtClean="0">
+                <a:solidFill>
+                  <a:schemeClr val="tx1"/>
+                </a:solidFill>
+                <a:latin typeface="Times New Roman" panose="02020603050405020304" pitchFamily="18" charset="0"/>
+                <a:cs typeface="Times New Roman" panose="02020603050405020304" pitchFamily="18" charset="0"/>
+              </a:rPr>
+              <a:t>=“apcluster.logos.pdf</a:t>
+            </a:r>
+            <a:r>
+              <a:rPr lang="en-US" sz="1600" dirty="0">
+                <a:solidFill>
+                  <a:schemeClr val="tx1"/>
+                </a:solidFill>
+                <a:latin typeface="Times New Roman" panose="02020603050405020304" pitchFamily="18" charset="0"/>
+                <a:cs typeface="Times New Roman" panose="02020603050405020304" pitchFamily="18" charset="0"/>
+              </a:rPr>
+              <a:t>" );</a:t>
+            </a:r>
+          </a:p>
+          <a:p>
+            <a:pPr marL="109728" indent="0">
+              <a:buNone/>
+            </a:pPr>
+            <a:endParaRPr lang="en-US" sz="2000" dirty="0" smtClean="0"/>
           </a:p>
           <a:p>
             <a:endParaRPr lang="en-US" sz="2000" dirty="0" smtClean="0"/>
@@ -7054,11 +7114,7 @@
           <a:p>
             <a:r>
               <a:rPr lang="en-US" dirty="0" smtClean="0"/>
-              <a:t>To get a heat-map for </a:t>
-            </a:r>
-            <a:r>
-              <a:rPr lang="en-US" dirty="0" smtClean="0"/>
-              <a:t>publishing.</a:t>
+              <a:t>To get a heat-map for publishing.</a:t>
             </a:r>
             <a:endParaRPr lang="en-US" dirty="0"/>
           </a:p>
@@ -7205,6 +7261,26 @@
               <a:buNone/>
             </a:pPr>
             <a:r>
+              <a:rPr lang="en-US" sz="1600" dirty="0" smtClean="0">
+                <a:solidFill>
+                  <a:schemeClr val="tx1"/>
+                </a:solidFill>
+                <a:latin typeface="Times New Roman" panose="02020603050405020304" pitchFamily="18" charset="0"/>
+                <a:cs typeface="Times New Roman" panose="02020603050405020304" pitchFamily="18" charset="0"/>
+              </a:rPr>
+              <a:t>tfs1 </a:t>
+            </a:r>
+            <a:r>
+              <a:rPr lang="en-US" sz="1600" dirty="0" smtClean="0">
+                <a:solidFill>
+                  <a:schemeClr val="tx1"/>
+                </a:solidFill>
+                <a:latin typeface="Times New Roman" panose="02020603050405020304" pitchFamily="18" charset="0"/>
+                <a:cs typeface="Times New Roman" panose="02020603050405020304" pitchFamily="18" charset="0"/>
+              </a:rPr>
+              <a:t>&lt;- </a:t>
+            </a:r>
+            <a:r>
               <a:rPr lang="en-US" sz="1600" dirty="0" err="1" smtClean="0">
                 <a:solidFill>
                   <a:schemeClr val="tx1"/>
@@ -7212,7 +7288,7 @@
                 <a:latin typeface="Times New Roman" panose="02020603050405020304" pitchFamily="18" charset="0"/>
                 <a:cs typeface="Times New Roman" panose="02020603050405020304" pitchFamily="18" charset="0"/>
               </a:rPr>
-              <a:t>motifs.idx</a:t>
+              <a:t>tfbs.selecteByRandom</a:t>
             </a:r>
             <a:r>
               <a:rPr lang="en-US" sz="1600" dirty="0" smtClean="0">
@@ -7222,48 +7298,15 @@
                 <a:latin typeface="Times New Roman" panose="02020603050405020304" pitchFamily="18" charset="0"/>
                 <a:cs typeface="Times New Roman" panose="02020603050405020304" pitchFamily="18" charset="0"/>
               </a:rPr>
-              <a:t> &lt;- </a:t>
-            </a:r>
-            <a:r>
-              <a:rPr lang="en-US" sz="1600" dirty="0" err="1" smtClean="0">
-                <a:solidFill>
-                  <a:schemeClr val="tx1"/>
-                </a:solidFill>
-                <a:latin typeface="Times New Roman" panose="02020603050405020304" pitchFamily="18" charset="0"/>
-                <a:cs typeface="Times New Roman" panose="02020603050405020304" pitchFamily="18" charset="0"/>
-              </a:rPr>
-              <a:t>tfbs.selecteByRandom</a:t>
-            </a:r>
-            <a:r>
-              <a:rPr lang="en-US" sz="1600" dirty="0" smtClean="0">
-                <a:solidFill>
-                  <a:schemeClr val="tx1"/>
-                </a:solidFill>
-                <a:latin typeface="Times New Roman" panose="02020603050405020304" pitchFamily="18" charset="0"/>
-                <a:cs typeface="Times New Roman" panose="02020603050405020304" pitchFamily="18" charset="0"/>
-              </a:rPr>
-              <a:t>(</a:t>
-            </a:r>
-            <a:r>
-              <a:rPr lang="en-US" sz="1600" dirty="0" err="1" smtClean="0">
-                <a:solidFill>
-                  <a:schemeClr val="tx1"/>
-                </a:solidFill>
-                <a:latin typeface="Times New Roman" panose="02020603050405020304" pitchFamily="18" charset="0"/>
-                <a:cs typeface="Times New Roman" panose="02020603050405020304" pitchFamily="18" charset="0"/>
-              </a:rPr>
-              <a:t>tfs</a:t>
-            </a:r>
-            <a:r>
-              <a:rPr lang="en-US" sz="1600" dirty="0" smtClean="0">
-                <a:solidFill>
-                  <a:schemeClr val="tx1"/>
-                </a:solidFill>
-                <a:latin typeface="Times New Roman" panose="02020603050405020304" pitchFamily="18" charset="0"/>
-                <a:cs typeface="Times New Roman" panose="02020603050405020304" pitchFamily="18" charset="0"/>
-              </a:rPr>
-              <a:t>, clu1)</a:t>
-            </a:r>
+              <a:t>(tfs1)</a:t>
+            </a:r>
+            <a:endParaRPr lang="en-US" sz="1600" dirty="0" smtClean="0">
+              <a:solidFill>
+                <a:schemeClr val="tx1"/>
+              </a:solidFill>
+              <a:latin typeface="Times New Roman" panose="02020603050405020304" pitchFamily="18" charset="0"/>
+              <a:cs typeface="Times New Roman" panose="02020603050405020304" pitchFamily="18" charset="0"/>
+            </a:endParaRPr>
           </a:p>
           <a:p>
             <a:pPr marL="109728" indent="0">
@@ -7317,6 +7360,26 @@
               <a:buNone/>
             </a:pPr>
             <a:r>
+              <a:rPr lang="en-US" sz="1600" dirty="0" smtClean="0">
+                <a:solidFill>
+                  <a:schemeClr val="tx1"/>
+                </a:solidFill>
+                <a:latin typeface="Times New Roman" panose="02020603050405020304" pitchFamily="18" charset="0"/>
+                <a:cs typeface="Times New Roman" panose="02020603050405020304" pitchFamily="18" charset="0"/>
+              </a:rPr>
+              <a:t>tfs2 </a:t>
+            </a:r>
+            <a:r>
+              <a:rPr lang="en-US" sz="1600" dirty="0" smtClean="0">
+                <a:solidFill>
+                  <a:schemeClr val="tx1"/>
+                </a:solidFill>
+                <a:latin typeface="Times New Roman" panose="02020603050405020304" pitchFamily="18" charset="0"/>
+                <a:cs typeface="Times New Roman" panose="02020603050405020304" pitchFamily="18" charset="0"/>
+              </a:rPr>
+              <a:t>&lt;- </a:t>
+            </a:r>
+            <a:r>
               <a:rPr lang="en-US" sz="1600" dirty="0" err="1" smtClean="0">
                 <a:solidFill>
                   <a:schemeClr val="tx1"/>
@@ -7324,7 +7387,7 @@
                 <a:latin typeface="Times New Roman" panose="02020603050405020304" pitchFamily="18" charset="0"/>
                 <a:cs typeface="Times New Roman" panose="02020603050405020304" pitchFamily="18" charset="0"/>
               </a:rPr>
-              <a:t>motifs.idx</a:t>
+              <a:t>tfbs.selecteByGeneExp</a:t>
             </a:r>
             <a:r>
               <a:rPr lang="en-US" sz="1600" dirty="0" smtClean="0">
@@ -7334,17 +7397,7 @@
                 <a:latin typeface="Times New Roman" panose="02020603050405020304" pitchFamily="18" charset="0"/>
                 <a:cs typeface="Times New Roman" panose="02020603050405020304" pitchFamily="18" charset="0"/>
               </a:rPr>
-              <a:t> &lt;- </a:t>
-            </a:r>
-            <a:r>
-              <a:rPr lang="en-US" sz="1600" dirty="0" err="1" smtClean="0">
-                <a:solidFill>
-                  <a:schemeClr val="tx1"/>
-                </a:solidFill>
-                <a:latin typeface="Times New Roman" panose="02020603050405020304" pitchFamily="18" charset="0"/>
-                <a:cs typeface="Times New Roman" panose="02020603050405020304" pitchFamily="18" charset="0"/>
-              </a:rPr>
-              <a:t>tfbs.selecteByGeneExp</a:t>
+              <a:t> (</a:t>
             </a:r>
             <a:r>
               <a:rPr lang="en-US" sz="1600" dirty="0" smtClean="0">
@@ -7354,28 +7407,15 @@
                 <a:latin typeface="Times New Roman" panose="02020603050405020304" pitchFamily="18" charset="0"/>
                 <a:cs typeface="Times New Roman" panose="02020603050405020304" pitchFamily="18" charset="0"/>
               </a:rPr>
-              <a:t> (</a:t>
-            </a:r>
-            <a:r>
-              <a:rPr lang="en-US" sz="1600" dirty="0" err="1" smtClean="0">
-                <a:solidFill>
-                  <a:schemeClr val="tx1"/>
-                </a:solidFill>
-                <a:latin typeface="Times New Roman" panose="02020603050405020304" pitchFamily="18" charset="0"/>
-                <a:cs typeface="Times New Roman" panose="02020603050405020304" pitchFamily="18" charset="0"/>
-              </a:rPr>
-              <a:t>tfs</a:t>
-            </a:r>
-            <a:r>
-              <a:rPr lang="en-US" sz="1600" dirty="0">
-                <a:solidFill>
-                  <a:schemeClr val="tx1"/>
-                </a:solidFill>
-                <a:latin typeface="Times New Roman" panose="02020603050405020304" pitchFamily="18" charset="0"/>
-                <a:cs typeface="Times New Roman" panose="02020603050405020304" pitchFamily="18" charset="0"/>
-              </a:rPr>
-              <a:t>, clu1)</a:t>
-            </a:r>
+              <a:t>tfs2)</a:t>
+            </a:r>
+            <a:endParaRPr lang="en-US" sz="1600" dirty="0">
+              <a:solidFill>
+                <a:schemeClr val="tx1"/>
+              </a:solidFill>
+              <a:latin typeface="Times New Roman" panose="02020603050405020304" pitchFamily="18" charset="0"/>
+              <a:cs typeface="Times New Roman" panose="02020603050405020304" pitchFamily="18" charset="0"/>
+            </a:endParaRPr>
           </a:p>
           <a:p>
             <a:endParaRPr lang="en-US" sz="2000" dirty="0" smtClean="0"/>
@@ -7519,7 +7559,7 @@
               <a:t>Now a </a:t>
             </a:r>
             <a:r>
-              <a:rPr lang="en-US" sz="1600" dirty="0" err="1" smtClean="0"/>
+              <a:rPr lang="en-US" sz="1600" i="1" dirty="0" err="1" smtClean="0"/>
               <a:t>tfbs</a:t>
             </a:r>
             <a:r>
@@ -8224,7 +8264,7 @@
               <a:t>Visualizing and summarizing </a:t>
             </a:r>
             <a:r>
-              <a:rPr lang="en-US" dirty="0" err="1"/>
+              <a:rPr lang="en-US" i="1" dirty="0" err="1"/>
               <a:t>tfbs</a:t>
             </a:r>
             <a:r>
@@ -8382,7 +8422,7 @@
               <a:t> </a:t>
             </a:r>
             <a:r>
-              <a:rPr lang="en-US" dirty="0" err="1"/>
+              <a:rPr lang="en-US" i="1" dirty="0" err="1"/>
               <a:t>tfbs</a:t>
             </a:r>
             <a:r>
@@ -8489,11 +8529,7 @@
             </a:r>
             <a:r>
               <a:rPr lang="en-US" sz="1600" dirty="0" smtClean="0"/>
-              <a:t>locates </a:t>
-            </a:r>
-            <a:r>
-              <a:rPr lang="en-US" sz="1600" dirty="0" smtClean="0"/>
-              <a:t>TF binding sites across a genome</a:t>
+              <a:t>locates TF binding sites across a genome</a:t>
             </a:r>
           </a:p>
           <a:p>
@@ -9983,27 +10019,7 @@
                 <a:latin typeface="Times New Roman" panose="02020603050405020304" pitchFamily="18" charset="0"/>
                 <a:cs typeface="Times New Roman" panose="02020603050405020304" pitchFamily="18" charset="0"/>
               </a:rPr>
-              <a:t>the basic information about t</a:t>
-            </a:r>
-            <a:r>
-              <a:rPr lang="en-US" sz="1500" dirty="0" smtClean="0">
-                <a:solidFill>
-                  <a:schemeClr val="tx1"/>
-                </a:solidFill>
-                <a:latin typeface="Times New Roman" panose="02020603050405020304" pitchFamily="18" charset="0"/>
-                <a:cs typeface="Times New Roman" panose="02020603050405020304" pitchFamily="18" charset="0"/>
-              </a:rPr>
-              <a:t>he </a:t>
-            </a:r>
-            <a:r>
-              <a:rPr lang="en-US" sz="1500" dirty="0" smtClean="0">
-                <a:solidFill>
-                  <a:schemeClr val="tx1"/>
-                </a:solidFill>
-                <a:latin typeface="Times New Roman" panose="02020603050405020304" pitchFamily="18" charset="0"/>
-                <a:cs typeface="Times New Roman" panose="02020603050405020304" pitchFamily="18" charset="0"/>
-              </a:rPr>
-              <a:t>result</a:t>
+              <a:t>the basic information about the result</a:t>
             </a:r>
           </a:p>
           <a:p>
@@ -10790,12 +10806,16 @@
               <a:t>The </a:t>
             </a:r>
             <a:r>
-              <a:rPr lang="en-US" sz="1600" i="1" dirty="0" err="1"/>
-              <a:t>tfbs.compareTFsite</a:t>
+              <a:rPr lang="en-US" sz="1600" i="1" dirty="0" err="1" smtClean="0"/>
+              <a:t>tfbs.enrichmentTest</a:t>
+            </a:r>
+            <a:r>
+              <a:rPr lang="en-US" sz="1600" dirty="0" smtClean="0"/>
+              <a:t> </a:t>
             </a:r>
             <a:r>
               <a:rPr lang="en-US" sz="1600" dirty="0"/>
-              <a:t> function </a:t>
+              <a:t>function </a:t>
             </a:r>
             <a:r>
               <a:rPr lang="en-US" sz="1600" dirty="0" smtClean="0"/>
@@ -10895,15 +10915,7 @@
             </a:pPr>
             <a:r>
               <a:rPr lang="en-US" sz="1600" dirty="0" smtClean="0"/>
-              <a:t>4) GC </a:t>
-            </a:r>
-            <a:r>
-              <a:rPr lang="en-US" sz="1600" dirty="0" smtClean="0"/>
-              <a:t>correction? </a:t>
-            </a:r>
-            <a:r>
-              <a:rPr lang="en-US" sz="1600" dirty="0" smtClean="0"/>
-              <a:t>(</a:t>
+              <a:t>4) GC correction? (</a:t>
             </a:r>
             <a:r>
               <a:rPr lang="en-US" sz="1600" i="1" dirty="0" err="1" smtClean="0"/>
@@ -10920,15 +10932,7 @@
             </a:pPr>
             <a:r>
               <a:rPr lang="en-US" sz="1600" dirty="0" smtClean="0"/>
-              <a:t>5) Score or </a:t>
-            </a:r>
-            <a:r>
-              <a:rPr lang="en-US" sz="1600" dirty="0" smtClean="0"/>
-              <a:t>FDR </a:t>
-            </a:r>
-            <a:r>
-              <a:rPr lang="en-US" sz="1600" dirty="0" smtClean="0"/>
-              <a:t>threshold (</a:t>
+              <a:t>5) Score or FDR threshold (</a:t>
             </a:r>
             <a:r>
               <a:rPr lang="en-US" sz="1600" i="1" dirty="0" smtClean="0"/>
@@ -11660,7 +11664,7 @@
               <a:buNone/>
             </a:pPr>
             <a:r>
-              <a:rPr lang="en-US" dirty="0" err="1">
+              <a:rPr lang="en-US" dirty="0" err="1" smtClean="0">
                 <a:solidFill>
                   <a:schemeClr val="tx1"/>
                 </a:solidFill>
@@ -11670,6 +11674,16 @@
               <a:t>t.comp</a:t>
             </a:r>
             <a:r>
+              <a:rPr lang="en-US" dirty="0" smtClean="0">
+                <a:solidFill>
+                  <a:schemeClr val="tx1"/>
+                </a:solidFill>
+                <a:latin typeface="Times New Roman" panose="02020603050405020304" pitchFamily="18" charset="0"/>
+                <a:cs typeface="Times New Roman" panose="02020603050405020304" pitchFamily="18" charset="0"/>
+              </a:rPr>
+              <a:t> </a:t>
+            </a:r>
+            <a:r>
               <a:rPr lang="en-US" dirty="0">
                 <a:solidFill>
                   <a:schemeClr val="tx1"/>
@@ -11677,20 +11691,20 @@
                 <a:latin typeface="Times New Roman" panose="02020603050405020304" pitchFamily="18" charset="0"/>
                 <a:cs typeface="Times New Roman" panose="02020603050405020304" pitchFamily="18" charset="0"/>
               </a:rPr>
-              <a:t> &lt;- </a:t>
-            </a:r>
-            <a:r>
-              <a:rPr lang="en-US" dirty="0" err="1">
-                <a:solidFill>
-                  <a:schemeClr val="tx1"/>
-                </a:solidFill>
-                <a:latin typeface="Times New Roman" panose="02020603050405020304" pitchFamily="18" charset="0"/>
-                <a:cs typeface="Times New Roman" panose="02020603050405020304" pitchFamily="18" charset="0"/>
-              </a:rPr>
-              <a:t>tfbs.compareTFsite</a:t>
-            </a:r>
-            <a:r>
-              <a:rPr lang="en-US" dirty="0">
+              <a:t>&lt;- </a:t>
+            </a:r>
+            <a:r>
+              <a:rPr lang="en-US" dirty="0" err="1" smtClean="0">
+                <a:solidFill>
+                  <a:schemeClr val="tx1"/>
+                </a:solidFill>
+                <a:latin typeface="Times New Roman" panose="02020603050405020304" pitchFamily="18" charset="0"/>
+                <a:cs typeface="Times New Roman" panose="02020603050405020304" pitchFamily="18" charset="0"/>
+              </a:rPr>
+              <a:t>tfbs.enrichmentTest</a:t>
+            </a:r>
+            <a:r>
+              <a:rPr lang="en-US" dirty="0" smtClean="0">
                 <a:solidFill>
                   <a:schemeClr val="tx1"/>
                 </a:solidFill>
@@ -11919,24 +11933,24 @@
               <a:t>file.prefix</a:t>
             </a:r>
             <a:r>
-              <a:rPr lang="en-US" dirty="0">
-                <a:solidFill>
-                  <a:schemeClr val="tx1"/>
-                </a:solidFill>
-                <a:latin typeface="Times New Roman" panose="02020603050405020304" pitchFamily="18" charset="0"/>
-                <a:cs typeface="Times New Roman" panose="02020603050405020304" pitchFamily="18" charset="0"/>
-              </a:rPr>
-              <a:t>="</a:t>
-            </a:r>
-            <a:r>
-              <a:rPr lang="en-US" dirty="0" err="1">
-                <a:solidFill>
-                  <a:schemeClr val="tx1"/>
-                </a:solidFill>
-                <a:latin typeface="Times New Roman" panose="02020603050405020304" pitchFamily="18" charset="0"/>
-                <a:cs typeface="Times New Roman" panose="02020603050405020304" pitchFamily="18" charset="0"/>
-              </a:rPr>
-              <a:t>comp.db</a:t>
+              <a:rPr lang="en-US" dirty="0" smtClean="0">
+                <a:solidFill>
+                  <a:schemeClr val="tx1"/>
+                </a:solidFill>
+                <a:latin typeface="Times New Roman" panose="02020603050405020304" pitchFamily="18" charset="0"/>
+                <a:cs typeface="Times New Roman" panose="02020603050405020304" pitchFamily="18" charset="0"/>
+              </a:rPr>
+              <a:t>=“</a:t>
+            </a:r>
+            <a:r>
+              <a:rPr lang="en-US" dirty="0" err="1" smtClean="0">
+                <a:solidFill>
+                  <a:schemeClr val="tx1"/>
+                </a:solidFill>
+                <a:latin typeface="Times New Roman" panose="02020603050405020304" pitchFamily="18" charset="0"/>
+                <a:cs typeface="Times New Roman" panose="02020603050405020304" pitchFamily="18" charset="0"/>
+              </a:rPr>
+              <a:t>enrich.db</a:t>
             </a:r>
             <a:r>
               <a:rPr lang="en-US" dirty="0">
@@ -12096,11 +12110,15 @@
             </a:r>
             <a:r>
               <a:rPr lang="en-US" sz="1600" i="1" dirty="0" err="1" smtClean="0"/>
-              <a:t>tfbs.compareTFsite</a:t>
+              <a:t>tfbs.enrichmentTest</a:t>
             </a:r>
             <a:r>
               <a:rPr lang="en-US" sz="1600" dirty="0" smtClean="0"/>
-              <a:t> checks the mean </a:t>
+              <a:t> </a:t>
+            </a:r>
+            <a:r>
+              <a:rPr lang="en-US" sz="1600" dirty="0" smtClean="0"/>
+              <a:t>checks the mean </a:t>
             </a:r>
             <a:r>
               <a:rPr lang="en-US" sz="1600" dirty="0"/>
@@ -12358,11 +12376,15 @@
           <a:p>
             <a:r>
               <a:rPr lang="en-US" dirty="0" smtClean="0"/>
-              <a:t>Provides </a:t>
+              <a:t>Provides a framework to integrate the Cis-BP </a:t>
             </a:r>
             <a:r>
               <a:rPr lang="en-US" dirty="0" smtClean="0"/>
-              <a:t>a framework to integrate the Cis-BP database and the statistical model in the </a:t>
+              <a:t>database and </a:t>
+            </a:r>
+            <a:r>
+              <a:rPr lang="en-US" dirty="0" smtClean="0"/>
+              <a:t>the statistical model in the </a:t>
             </a:r>
             <a:r>
               <a:rPr lang="en-US" i="1" dirty="0" err="1" smtClean="0"/>
@@ -12376,11 +12398,7 @@
           <a:p>
             <a:r>
               <a:rPr lang="en-US" dirty="0" smtClean="0"/>
-              <a:t>Designed </a:t>
-            </a:r>
-            <a:r>
-              <a:rPr lang="en-US" dirty="0" smtClean="0"/>
-              <a:t>a pipeline to implement the following goals:</a:t>
+              <a:t>Designed a pipeline to implement the following goals:</a:t>
             </a:r>
           </a:p>
           <a:p>
@@ -12402,15 +12420,7 @@
             <a:pPr lvl="1"/>
             <a:r>
               <a:rPr lang="en-US" dirty="0" smtClean="0"/>
-              <a:t>2) Searching the genome </a:t>
-            </a:r>
-            <a:r>
-              <a:rPr lang="en-US" dirty="0" smtClean="0"/>
-              <a:t>for </a:t>
-            </a:r>
-            <a:r>
-              <a:rPr lang="en-US" dirty="0" smtClean="0"/>
-              <a:t>motif occurrences.</a:t>
+              <a:t>2) Searching the genome for motif occurrences.</a:t>
             </a:r>
           </a:p>
           <a:p>
@@ -12539,12 +12549,16 @@
               <a:t> </a:t>
             </a:r>
             <a:r>
-              <a:rPr lang="en-US" sz="1600" i="1" dirty="0" err="1"/>
-              <a:t>tfbs.compareTFsite</a:t>
+              <a:rPr lang="en-US" sz="1600" i="1" dirty="0" err="1" smtClean="0"/>
+              <a:t>tfbs.enrichmentTest</a:t>
+            </a:r>
+            <a:r>
+              <a:rPr lang="en-US" sz="1600" dirty="0" smtClean="0"/>
+              <a:t> </a:t>
             </a:r>
             <a:r>
               <a:rPr lang="en-US" sz="1600" dirty="0"/>
-              <a:t> includes a data frame with 8 columns, including </a:t>
+              <a:t>includes a data frame with 8 columns, including </a:t>
             </a:r>
             <a:r>
               <a:rPr lang="en-US" sz="1600" dirty="0" smtClean="0"/>
@@ -12651,12 +12665,16 @@
               <a:t>The </a:t>
             </a:r>
             <a:r>
-              <a:rPr lang="en-US" sz="1600" i="1" dirty="0" err="1"/>
-              <a:t>tfbs.reportComparison</a:t>
+              <a:rPr lang="en-US" sz="1600" i="1" dirty="0" err="1" smtClean="0"/>
+              <a:t>tfbs.reportEnrichment</a:t>
+            </a:r>
+            <a:r>
+              <a:rPr lang="en-US" sz="1600" dirty="0" smtClean="0"/>
+              <a:t> </a:t>
             </a:r>
             <a:r>
               <a:rPr lang="en-US" sz="1600" dirty="0"/>
-              <a:t> function draws a motif list with visual p-value bar, enrichment ratio bar, and motif logos. </a:t>
+              <a:t>function draws a motif list with visual p-value bar, enrichment ratio bar, and motif logos. </a:t>
             </a:r>
             <a:endParaRPr lang="en-US" sz="1600" dirty="0" smtClean="0"/>
           </a:p>
@@ -12988,14 +13006,14 @@
               <a:buNone/>
             </a:pPr>
             <a:r>
-              <a:rPr lang="en-US" sz="1600" dirty="0" err="1">
-                <a:solidFill>
-                  <a:schemeClr val="tx1"/>
-                </a:solidFill>
-                <a:latin typeface="Times New Roman" panose="02020603050405020304" pitchFamily="18" charset="0"/>
-                <a:cs typeface="Times New Roman" panose="02020603050405020304" pitchFamily="18" charset="0"/>
-              </a:rPr>
-              <a:t>tfbs.reportComparson</a:t>
+              <a:rPr lang="en-US" sz="1600" dirty="0" err="1" smtClean="0">
+                <a:solidFill>
+                  <a:schemeClr val="tx1"/>
+                </a:solidFill>
+                <a:latin typeface="Times New Roman" panose="02020603050405020304" pitchFamily="18" charset="0"/>
+                <a:cs typeface="Times New Roman" panose="02020603050405020304" pitchFamily="18" charset="0"/>
+              </a:rPr>
+              <a:t>tfbs.reportEnrichment</a:t>
             </a:r>
             <a:r>
               <a:rPr lang="en-US" sz="1600" dirty="0" smtClean="0">
@@ -13028,7 +13046,7 @@
               <a:t>, </a:t>
             </a:r>
             <a:r>
-              <a:rPr lang="en-US" sz="1600" dirty="0" err="1">
+              <a:rPr lang="en-US" sz="1600" dirty="0" err="1" smtClean="0">
                 <a:solidFill>
                   <a:schemeClr val="tx1"/>
                 </a:solidFill>
@@ -13038,7 +13056,7 @@
               <a:t>t.comp</a:t>
             </a:r>
             <a:r>
-              <a:rPr lang="en-US" sz="1600" dirty="0">
+              <a:rPr lang="en-US" sz="1600" dirty="0" smtClean="0">
                 <a:solidFill>
                   <a:schemeClr val="tx1"/>
                 </a:solidFill>
@@ -13087,7 +13105,27 @@
                 <a:latin typeface="Times New Roman" panose="02020603050405020304" pitchFamily="18" charset="0"/>
                 <a:cs typeface="Times New Roman" panose="02020603050405020304" pitchFamily="18" charset="0"/>
               </a:rPr>
-              <a:t>="test-tfcomp.pdf", </a:t>
+              <a:t>="</a:t>
+            </a:r>
+            <a:r>
+              <a:rPr lang="en-US" sz="1600" dirty="0" smtClean="0">
+                <a:solidFill>
+                  <a:schemeClr val="tx1"/>
+                </a:solidFill>
+                <a:latin typeface="Times New Roman" panose="02020603050405020304" pitchFamily="18" charset="0"/>
+                <a:cs typeface="Times New Roman" panose="02020603050405020304" pitchFamily="18" charset="0"/>
+              </a:rPr>
+              <a:t>test-enrich.pdf</a:t>
+            </a:r>
+            <a:r>
+              <a:rPr lang="en-US" sz="1600" dirty="0">
+                <a:solidFill>
+                  <a:schemeClr val="tx1"/>
+                </a:solidFill>
+                <a:latin typeface="Times New Roman" panose="02020603050405020304" pitchFamily="18" charset="0"/>
+                <a:cs typeface="Times New Roman" panose="02020603050405020304" pitchFamily="18" charset="0"/>
+              </a:rPr>
+              <a:t>", </a:t>
             </a:r>
             <a:endParaRPr lang="en-US" sz="1600" dirty="0" smtClean="0">
               <a:solidFill>
@@ -13196,7 +13234,7 @@
                 <a:latin typeface="Times New Roman" panose="02020603050405020304" pitchFamily="18" charset="0"/>
                 <a:cs typeface="Times New Roman" panose="02020603050405020304" pitchFamily="18" charset="0"/>
               </a:rPr>
-              <a:t>pv.cutoff</a:t>
+              <a:t>pv.threshold</a:t>
             </a:r>
             <a:r>
               <a:rPr lang="en-US" sz="1600" dirty="0" smtClean="0">
@@ -14378,17 +14416,7 @@
                   </a:schemeClr>
                 </a:solidFill>
               </a:rPr>
-              <a:t>) </a:t>
-            </a:r>
-            <a:r>
-              <a:rPr lang="en-US" sz="2000" dirty="0" smtClean="0">
-                <a:solidFill>
-                  <a:schemeClr val="accent3">
-                    <a:lumMod val="50000"/>
-                  </a:schemeClr>
-                </a:solidFill>
-              </a:rPr>
-              <a:t>is a public online dataset of TFBS.</a:t>
+              <a:t>) is a public online dataset of TFBS.</a:t>
             </a:r>
           </a:p>
           <a:p>
@@ -14977,8 +15005,29 @@
             </a:r>
             <a:r>
               <a:rPr lang="en-US" sz="2100" i="1" dirty="0" smtClean="0"/>
-              <a:t>lattice</a:t>
-            </a:r>
+              <a:t>lattice, </a:t>
+            </a:r>
+            <a:r>
+              <a:rPr lang="en-US" sz="2100" i="1" dirty="0" err="1" smtClean="0"/>
+              <a:t>apcluster</a:t>
+            </a:r>
+            <a:r>
+              <a:rPr lang="en-US" sz="2100" i="1" dirty="0" smtClean="0"/>
+              <a:t>, </a:t>
+            </a:r>
+            <a:r>
+              <a:rPr lang="en-US" sz="2100" i="1" dirty="0" err="1" smtClean="0"/>
+              <a:t>vioplot</a:t>
+            </a:r>
+            <a:r>
+              <a:rPr lang="en-US" sz="2100" i="1" dirty="0" smtClean="0"/>
+              <a:t>, </a:t>
+            </a:r>
+            <a:r>
+              <a:rPr lang="en-US" sz="2100" i="1" dirty="0" err="1" smtClean="0"/>
+              <a:t>RCurl</a:t>
+            </a:r>
+            <a:endParaRPr lang="en-US" sz="2100" i="1" dirty="0" smtClean="0"/>
           </a:p>
           <a:p>
             <a:r>
@@ -15576,19 +15625,8 @@
                 <a:latin typeface="Times New Roman" pitchFamily="18" charset="0"/>
                 <a:cs typeface="Times New Roman" pitchFamily="18" charset="0"/>
               </a:rPr>
-              <a:t> package from source </a:t>
-            </a:r>
-            <a:r>
-              <a:rPr lang="en-US" sz="1600" dirty="0" smtClean="0">
-                <a:latin typeface="Times New Roman" pitchFamily="18" charset="0"/>
-                <a:cs typeface="Times New Roman" pitchFamily="18" charset="0"/>
-              </a:rPr>
-              <a:t>code</a:t>
-            </a:r>
-            <a:endParaRPr lang="en-US" sz="1600" dirty="0" smtClean="0">
-              <a:latin typeface="Times New Roman" pitchFamily="18" charset="0"/>
-              <a:cs typeface="Times New Roman" pitchFamily="18" charset="0"/>
-            </a:endParaRPr>
+              <a:t> package from source code</a:t>
+            </a:r>
           </a:p>
           <a:p>
             <a:pPr marL="109728" lvl="0">
@@ -16368,6 +16406,11 @@
               <a:rPr lang="en-US" sz="2000" dirty="0" smtClean="0"/>
               <a:t>TF_Information.txt) </a:t>
             </a:r>
+            <a:r>
+              <a:rPr lang="en-US" sz="2000" dirty="0" smtClean="0"/>
+              <a:t>at the first step</a:t>
+            </a:r>
+            <a:endParaRPr lang="en-US" sz="2000" dirty="0" smtClean="0"/>
           </a:p>
           <a:p>
             <a:endParaRPr lang="en-US" dirty="0" smtClean="0"/>
@@ -18731,11 +18774,7 @@
             </a:pPr>
             <a:r>
               <a:rPr lang="en-US" sz="3100" dirty="0" smtClean="0"/>
-              <a:t>Advanced </a:t>
-            </a:r>
-            <a:r>
-              <a:rPr lang="en-US" sz="3100" dirty="0" smtClean="0"/>
-              <a:t>way:</a:t>
+              <a:t>Advanced way:</a:t>
             </a:r>
           </a:p>
           <a:p>
@@ -19470,19 +19509,11 @@
           <a:p>
             <a:r>
               <a:rPr lang="en-US" dirty="0"/>
-              <a:t>Step 2: Selecting motif </a:t>
+              <a:t>Step 2: </a:t>
             </a:r>
             <a:r>
               <a:rPr lang="en-US" dirty="0" smtClean="0"/>
-              <a:t>data (</a:t>
-            </a:r>
-            <a:r>
-              <a:rPr lang="en-US" dirty="0"/>
-              <a:t>continued</a:t>
-            </a:r>
-            <a:r>
-              <a:rPr lang="en-US" dirty="0" smtClean="0"/>
-              <a:t>)</a:t>
+              <a:t>Or importing motif data</a:t>
             </a:r>
             <a:endParaRPr lang="en-US" dirty="0"/>
           </a:p>
@@ -19702,8 +19733,109 @@
             </a:r>
             <a:r>
               <a:rPr lang="en-US" altLang="zh-CN" sz="2000" dirty="0" smtClean="0"/>
-              <a:t>ternal motif data( i.e., PWM files)</a:t>
-            </a:r>
+              <a:t>ternal motif </a:t>
+            </a:r>
+            <a:r>
+              <a:rPr lang="en-US" altLang="zh-CN" sz="2000" dirty="0" smtClean="0"/>
+              <a:t>data:</a:t>
+            </a:r>
+          </a:p>
+          <a:p>
+            <a:pPr marL="566928" indent="-457200">
+              <a:buAutoNum type="arabicPeriod"/>
+            </a:pPr>
+            <a:r>
+              <a:rPr lang="en-US" altLang="zh-CN" sz="2000" dirty="0" smtClean="0"/>
+              <a:t>Licensed </a:t>
+            </a:r>
+            <a:r>
+              <a:rPr lang="en-US" altLang="zh-CN" sz="2000" dirty="0" smtClean="0"/>
+              <a:t>PWM files for Cis-BP data set</a:t>
+            </a:r>
+          </a:p>
+          <a:p>
+            <a:pPr marL="566928" indent="-457200">
+              <a:buAutoNum type="arabicPeriod"/>
+            </a:pPr>
+            <a:r>
+              <a:rPr lang="en-US" altLang="zh-CN" sz="2000" dirty="0" err="1" smtClean="0"/>
+              <a:t>Transfac</a:t>
+            </a:r>
+            <a:r>
+              <a:rPr lang="en-US" altLang="zh-CN" sz="2000" dirty="0" smtClean="0"/>
+              <a:t>, Jaspar, meme, </a:t>
+            </a:r>
+            <a:r>
+              <a:rPr lang="en-US" altLang="zh-CN" sz="2000" dirty="0" err="1" smtClean="0"/>
+              <a:t>mscan</a:t>
+            </a:r>
+            <a:r>
+              <a:rPr lang="en-US" altLang="zh-CN" sz="2000" dirty="0" smtClean="0"/>
+              <a:t> text file containing multiple PFM information.</a:t>
+            </a:r>
+          </a:p>
+          <a:p>
+            <a:pPr marL="566928" indent="-457200">
+              <a:buAutoNum type="arabicPeriod"/>
+            </a:pPr>
+            <a:r>
+              <a:rPr lang="en-US" altLang="zh-CN" sz="2000" dirty="0" smtClean="0"/>
+              <a:t>New released data file parsed by </a:t>
+            </a:r>
+            <a:r>
+              <a:rPr lang="en-US" altLang="zh-CN" sz="2000" i="1" dirty="0" err="1" smtClean="0"/>
+              <a:t>rtfbsdb</a:t>
+            </a:r>
+            <a:endParaRPr lang="en-US" altLang="zh-CN" sz="2000" i="1" dirty="0" smtClean="0"/>
+          </a:p>
+          <a:p>
+            <a:pPr marL="566928" indent="-457200">
+              <a:buAutoNum type="arabicPeriod"/>
+            </a:pPr>
+            <a:r>
+              <a:rPr lang="en-US" altLang="zh-CN" sz="2000" dirty="0" smtClean="0"/>
+              <a:t>User customized data file </a:t>
+            </a:r>
+            <a:endParaRPr lang="en-US" altLang="zh-CN" sz="2000" dirty="0" smtClean="0"/>
+          </a:p>
+          <a:p>
+            <a:pPr marL="109728" indent="0">
+              <a:buNone/>
+            </a:pPr>
+            <a:endParaRPr lang="en-US" sz="2000" dirty="0" smtClean="0"/>
+          </a:p>
+          <a:p>
+            <a:pPr marL="109728" indent="0">
+              <a:buNone/>
+            </a:pPr>
+            <a:r>
+              <a:rPr lang="en-US" sz="2000" i="1" dirty="0" smtClean="0">
+                <a:solidFill>
+                  <a:schemeClr val="tx1"/>
+                </a:solidFill>
+              </a:rPr>
+              <a:t>Simple parser implemented in the package.</a:t>
+            </a:r>
+          </a:p>
+          <a:p>
+            <a:pPr marL="109728" indent="0">
+              <a:buNone/>
+            </a:pPr>
+            <a:endParaRPr lang="en-US" sz="2000" i="1" dirty="0" smtClean="0">
+              <a:solidFill>
+                <a:schemeClr val="tx1"/>
+              </a:solidFill>
+            </a:endParaRPr>
+          </a:p>
+          <a:p>
+            <a:pPr marL="109728" indent="0">
+              <a:buNone/>
+            </a:pPr>
+            <a:endParaRPr lang="en-US" sz="2000" i="1" dirty="0" smtClean="0">
+              <a:solidFill>
+                <a:schemeClr val="tx1"/>
+              </a:solidFill>
+            </a:endParaRPr>
           </a:p>
           <a:p>
             <a:pPr marL="109728" indent="0">
@@ -19760,7 +19892,7 @@
         </p:spPr>
         <p:txBody>
           <a:bodyPr>
-            <a:normAutofit/>
+            <a:normAutofit fontScale="85000" lnSpcReduction="20000"/>
           </a:bodyPr>
           <a:lstStyle/>
           <a:p>
@@ -19805,6 +19937,16 @@
               <a:buNone/>
             </a:pPr>
             <a:r>
+              <a:rPr lang="en-US" sz="1600" dirty="0" err="1">
+                <a:solidFill>
+                  <a:schemeClr val="tx1"/>
+                </a:solidFill>
+                <a:latin typeface="Times New Roman" panose="02020603050405020304" pitchFamily="18" charset="0"/>
+                <a:cs typeface="Times New Roman" panose="02020603050405020304" pitchFamily="18" charset="0"/>
+              </a:rPr>
+              <a:t>db</a:t>
+            </a:r>
+            <a:r>
               <a:rPr lang="en-US" sz="1600" dirty="0">
                 <a:solidFill>
                   <a:schemeClr val="tx1"/>
@@ -19812,18 +19954,138 @@
                 <a:latin typeface="Times New Roman" panose="02020603050405020304" pitchFamily="18" charset="0"/>
                 <a:cs typeface="Times New Roman" panose="02020603050405020304" pitchFamily="18" charset="0"/>
               </a:rPr>
-              <a:t># </a:t>
-            </a:r>
-            <a:r>
-              <a:rPr lang="en-US" sz="1600" dirty="0" smtClean="0">
-                <a:solidFill>
-                  <a:schemeClr val="tx1"/>
-                </a:solidFill>
-                <a:latin typeface="Times New Roman" panose="02020603050405020304" pitchFamily="18" charset="0"/>
-                <a:cs typeface="Times New Roman" panose="02020603050405020304" pitchFamily="18" charset="0"/>
-              </a:rPr>
-              <a:t>Import the single or multiple PWM files </a:t>
-            </a:r>
+              <a:t>  &lt;- </a:t>
+            </a:r>
+            <a:r>
+              <a:rPr lang="en-US" sz="1600" dirty="0" err="1">
+                <a:solidFill>
+                  <a:schemeClr val="tx1"/>
+                </a:solidFill>
+                <a:latin typeface="Times New Roman" panose="02020603050405020304" pitchFamily="18" charset="0"/>
+                <a:cs typeface="Times New Roman" panose="02020603050405020304" pitchFamily="18" charset="0"/>
+              </a:rPr>
+              <a:t>CisBP.extdata</a:t>
+            </a:r>
+            <a:r>
+              <a:rPr lang="en-US" sz="1600" dirty="0">
+                <a:solidFill>
+                  <a:schemeClr val="tx1"/>
+                </a:solidFill>
+                <a:latin typeface="Times New Roman" panose="02020603050405020304" pitchFamily="18" charset="0"/>
+                <a:cs typeface="Times New Roman" panose="02020603050405020304" pitchFamily="18" charset="0"/>
+              </a:rPr>
+              <a:t>("</a:t>
+            </a:r>
+            <a:r>
+              <a:rPr lang="en-US" sz="1600" dirty="0" err="1">
+                <a:solidFill>
+                  <a:schemeClr val="tx1"/>
+                </a:solidFill>
+                <a:latin typeface="Times New Roman" panose="02020603050405020304" pitchFamily="18" charset="0"/>
+                <a:cs typeface="Times New Roman" panose="02020603050405020304" pitchFamily="18" charset="0"/>
+              </a:rPr>
+              <a:t>Homo_sapiens</a:t>
+            </a:r>
+            <a:r>
+              <a:rPr lang="en-US" sz="1600" dirty="0">
+                <a:solidFill>
+                  <a:schemeClr val="tx1"/>
+                </a:solidFill>
+                <a:latin typeface="Times New Roman" panose="02020603050405020304" pitchFamily="18" charset="0"/>
+                <a:cs typeface="Times New Roman" panose="02020603050405020304" pitchFamily="18" charset="0"/>
+              </a:rPr>
+              <a:t>");</a:t>
+            </a:r>
+          </a:p>
+          <a:p>
+            <a:pPr marL="109728" indent="0">
+              <a:buNone/>
+            </a:pPr>
+            <a:r>
+              <a:rPr lang="en-US" sz="1600" dirty="0" err="1">
+                <a:solidFill>
+                  <a:schemeClr val="tx1"/>
+                </a:solidFill>
+                <a:latin typeface="Times New Roman" panose="02020603050405020304" pitchFamily="18" charset="0"/>
+                <a:cs typeface="Times New Roman" panose="02020603050405020304" pitchFamily="18" charset="0"/>
+              </a:rPr>
+              <a:t>tfs</a:t>
+            </a:r>
+            <a:r>
+              <a:rPr lang="en-US" sz="1600" dirty="0">
+                <a:solidFill>
+                  <a:schemeClr val="tx1"/>
+                </a:solidFill>
+                <a:latin typeface="Times New Roman" panose="02020603050405020304" pitchFamily="18" charset="0"/>
+                <a:cs typeface="Times New Roman" panose="02020603050405020304" pitchFamily="18" charset="0"/>
+              </a:rPr>
+              <a:t> &lt;- </a:t>
+            </a:r>
+            <a:r>
+              <a:rPr lang="en-US" sz="1600" dirty="0" err="1">
+                <a:solidFill>
+                  <a:schemeClr val="tx1"/>
+                </a:solidFill>
+                <a:latin typeface="Times New Roman" panose="02020603050405020304" pitchFamily="18" charset="0"/>
+                <a:cs typeface="Times New Roman" panose="02020603050405020304" pitchFamily="18" charset="0"/>
+              </a:rPr>
+              <a:t>tfbs.createFromCisBP</a:t>
+            </a:r>
+            <a:r>
+              <a:rPr lang="en-US" sz="1600" dirty="0">
+                <a:solidFill>
+                  <a:schemeClr val="tx1"/>
+                </a:solidFill>
+                <a:latin typeface="Times New Roman" panose="02020603050405020304" pitchFamily="18" charset="0"/>
+                <a:cs typeface="Times New Roman" panose="02020603050405020304" pitchFamily="18" charset="0"/>
+              </a:rPr>
+              <a:t>(</a:t>
+            </a:r>
+            <a:r>
+              <a:rPr lang="en-US" sz="1600" dirty="0" err="1">
+                <a:solidFill>
+                  <a:schemeClr val="tx1"/>
+                </a:solidFill>
+                <a:latin typeface="Times New Roman" panose="02020603050405020304" pitchFamily="18" charset="0"/>
+                <a:cs typeface="Times New Roman" panose="02020603050405020304" pitchFamily="18" charset="0"/>
+              </a:rPr>
+              <a:t>db</a:t>
+            </a:r>
+            <a:r>
+              <a:rPr lang="en-US" sz="1600" dirty="0">
+                <a:solidFill>
+                  <a:schemeClr val="tx1"/>
+                </a:solidFill>
+                <a:latin typeface="Times New Roman" panose="02020603050405020304" pitchFamily="18" charset="0"/>
+                <a:cs typeface="Times New Roman" panose="02020603050405020304" pitchFamily="18" charset="0"/>
+              </a:rPr>
+              <a:t>, </a:t>
+            </a:r>
+            <a:r>
+              <a:rPr lang="en-US" sz="1600" dirty="0" err="1">
+                <a:solidFill>
+                  <a:schemeClr val="tx1"/>
+                </a:solidFill>
+                <a:latin typeface="Times New Roman" panose="02020603050405020304" pitchFamily="18" charset="0"/>
+                <a:cs typeface="Times New Roman" panose="02020603050405020304" pitchFamily="18" charset="0"/>
+              </a:rPr>
+              <a:t>family_name</a:t>
+            </a:r>
+            <a:r>
+              <a:rPr lang="en-US" sz="1600" dirty="0">
+                <a:solidFill>
+                  <a:schemeClr val="tx1"/>
+                </a:solidFill>
+                <a:latin typeface="Times New Roman" panose="02020603050405020304" pitchFamily="18" charset="0"/>
+                <a:cs typeface="Times New Roman" panose="02020603050405020304" pitchFamily="18" charset="0"/>
+              </a:rPr>
+              <a:t>="AP-2");</a:t>
+            </a:r>
+          </a:p>
+          <a:p>
+            <a:pPr marL="109728" indent="0">
+              <a:buNone/>
+            </a:pPr>
             <a:endParaRPr lang="en-US" sz="1600" dirty="0">
               <a:solidFill>
                 <a:schemeClr val="tx1"/>
@@ -19837,16 +20099,6 @@
               <a:buNone/>
             </a:pPr>
             <a:r>
-              <a:rPr lang="en-US" sz="1600" dirty="0" err="1">
-                <a:solidFill>
-                  <a:schemeClr val="tx1"/>
-                </a:solidFill>
-                <a:latin typeface="Times New Roman" panose="02020603050405020304" pitchFamily="18" charset="0"/>
-                <a:cs typeface="Times New Roman" panose="02020603050405020304" pitchFamily="18" charset="0"/>
-              </a:rPr>
-              <a:t>tfs</a:t>
-            </a:r>
-            <a:r>
               <a:rPr lang="en-US" sz="1600" dirty="0">
                 <a:solidFill>
                   <a:schemeClr val="tx1"/>
@@ -19854,18 +20106,20 @@
                 <a:latin typeface="Times New Roman" panose="02020603050405020304" pitchFamily="18" charset="0"/>
                 <a:cs typeface="Times New Roman" panose="02020603050405020304" pitchFamily="18" charset="0"/>
               </a:rPr>
-              <a:t> &lt;- </a:t>
-            </a:r>
-            <a:r>
-              <a:rPr lang="en-US" sz="1600" dirty="0" err="1" smtClean="0">
-                <a:solidFill>
-                  <a:schemeClr val="tx1"/>
-                </a:solidFill>
-                <a:latin typeface="Times New Roman" panose="02020603050405020304" pitchFamily="18" charset="0"/>
-                <a:cs typeface="Times New Roman" panose="02020603050405020304" pitchFamily="18" charset="0"/>
-              </a:rPr>
-              <a:t>tfbs.importMotif</a:t>
-            </a:r>
+              <a:t>## import 2 motifs to fill the licensed motifs in Cis-BP and 1 new motif </a:t>
+            </a:r>
+            <a:endParaRPr lang="en-US" sz="1600" dirty="0" smtClean="0">
+              <a:solidFill>
+                <a:schemeClr val="tx1"/>
+              </a:solidFill>
+              <a:latin typeface="Times New Roman" panose="02020603050405020304" pitchFamily="18" charset="0"/>
+              <a:cs typeface="Times New Roman" panose="02020603050405020304" pitchFamily="18" charset="0"/>
+            </a:endParaRPr>
+          </a:p>
+          <a:p>
+            <a:pPr marL="109728" indent="0">
+              <a:buNone/>
+            </a:pPr>
             <a:r>
               <a:rPr lang="en-US" sz="1600" dirty="0" smtClean="0">
                 <a:solidFill>
@@ -19874,17 +20128,17 @@
                 <a:latin typeface="Times New Roman" panose="02020603050405020304" pitchFamily="18" charset="0"/>
                 <a:cs typeface="Times New Roman" panose="02020603050405020304" pitchFamily="18" charset="0"/>
               </a:rPr>
-              <a:t>( </a:t>
-            </a:r>
-            <a:r>
-              <a:rPr lang="en-US" sz="1600" dirty="0" err="1" smtClean="0">
-                <a:solidFill>
-                  <a:schemeClr val="tx1"/>
-                </a:solidFill>
-                <a:latin typeface="Times New Roman" panose="02020603050405020304" pitchFamily="18" charset="0"/>
-                <a:cs typeface="Times New Roman" panose="02020603050405020304" pitchFamily="18" charset="0"/>
-              </a:rPr>
-              <a:t>tfs</a:t>
+              <a:t>## from </a:t>
+            </a:r>
+            <a:r>
+              <a:rPr lang="en-US" sz="1600" dirty="0">
+                <a:solidFill>
+                  <a:schemeClr val="tx1"/>
+                </a:solidFill>
+                <a:latin typeface="Times New Roman" panose="02020603050405020304" pitchFamily="18" charset="0"/>
+                <a:cs typeface="Times New Roman" panose="02020603050405020304" pitchFamily="18" charset="0"/>
+              </a:rPr>
+              <a:t>other </a:t>
             </a:r>
             <a:r>
               <a:rPr lang="en-US" sz="1600" dirty="0" smtClean="0">
@@ -19894,77 +20148,7 @@
                 <a:latin typeface="Times New Roman" panose="02020603050405020304" pitchFamily="18" charset="0"/>
                 <a:cs typeface="Times New Roman" panose="02020603050405020304" pitchFamily="18" charset="0"/>
               </a:rPr>
-              <a:t>, </a:t>
-            </a:r>
-            <a:r>
-              <a:rPr lang="en-US" sz="1600" dirty="0" err="1" smtClean="0">
-                <a:solidFill>
-                  <a:schemeClr val="tx1"/>
-                </a:solidFill>
-                <a:latin typeface="Times New Roman" panose="02020603050405020304" pitchFamily="18" charset="0"/>
-                <a:cs typeface="Times New Roman" panose="02020603050405020304" pitchFamily="18" charset="0"/>
-              </a:rPr>
-              <a:t>db</a:t>
-            </a:r>
-            <a:r>
-              <a:rPr lang="en-US" sz="1600" dirty="0" smtClean="0">
-                <a:solidFill>
-                  <a:schemeClr val="tx1"/>
-                </a:solidFill>
-                <a:latin typeface="Times New Roman" panose="02020603050405020304" pitchFamily="18" charset="0"/>
-                <a:cs typeface="Times New Roman" panose="02020603050405020304" pitchFamily="18" charset="0"/>
-              </a:rPr>
-              <a:t>, motif.id</a:t>
-            </a:r>
-            <a:r>
-              <a:rPr lang="en-US" sz="1600" dirty="0">
-                <a:solidFill>
-                  <a:schemeClr val="tx1"/>
-                </a:solidFill>
-                <a:latin typeface="Times New Roman" panose="02020603050405020304" pitchFamily="18" charset="0"/>
-                <a:cs typeface="Times New Roman" panose="02020603050405020304" pitchFamily="18" charset="0"/>
-              </a:rPr>
-              <a:t>="</a:t>
-            </a:r>
-            <a:r>
-              <a:rPr lang="en-US" sz="1600" dirty="0" err="1">
-                <a:solidFill>
-                  <a:schemeClr val="tx1"/>
-                </a:solidFill>
-                <a:latin typeface="Times New Roman" panose="02020603050405020304" pitchFamily="18" charset="0"/>
-                <a:cs typeface="Times New Roman" panose="02020603050405020304" pitchFamily="18" charset="0"/>
-              </a:rPr>
-              <a:t>Mxx_ID</a:t>
-            </a:r>
-            <a:r>
-              <a:rPr lang="en-US" sz="1600" dirty="0" smtClean="0">
-                <a:solidFill>
-                  <a:schemeClr val="tx1"/>
-                </a:solidFill>
-                <a:latin typeface="Times New Roman" panose="02020603050405020304" pitchFamily="18" charset="0"/>
-                <a:cs typeface="Times New Roman" panose="02020603050405020304" pitchFamily="18" charset="0"/>
-              </a:rPr>
-              <a:t>", 		</a:t>
-            </a:r>
-            <a:r>
-              <a:rPr lang="en-US" sz="1600" dirty="0" err="1" smtClean="0">
-                <a:solidFill>
-                  <a:schemeClr val="tx1"/>
-                </a:solidFill>
-                <a:latin typeface="Times New Roman" panose="02020603050405020304" pitchFamily="18" charset="0"/>
-                <a:cs typeface="Times New Roman" panose="02020603050405020304" pitchFamily="18" charset="0"/>
-              </a:rPr>
-              <a:t>file.pwms</a:t>
-            </a:r>
-            <a:r>
-              <a:rPr lang="en-US" sz="1600" dirty="0" smtClean="0">
-                <a:solidFill>
-                  <a:schemeClr val="tx1"/>
-                </a:solidFill>
-                <a:latin typeface="Times New Roman" panose="02020603050405020304" pitchFamily="18" charset="0"/>
-                <a:cs typeface="Times New Roman" panose="02020603050405020304" pitchFamily="18" charset="0"/>
-              </a:rPr>
-              <a:t>="Mxx_ID.txt");</a:t>
+              <a:t>source</a:t>
             </a:r>
             <a:endParaRPr lang="en-US" sz="1600" dirty="0">
               <a:solidFill>
@@ -19978,7 +20162,687 @@
             <a:pPr marL="109728" indent="0">
               <a:buNone/>
             </a:pPr>
-            <a:endParaRPr lang="en-US" sz="1600" dirty="0" smtClean="0">
+            <a:r>
+              <a:rPr lang="en-US" sz="1600" dirty="0" err="1">
+                <a:solidFill>
+                  <a:schemeClr val="tx1"/>
+                </a:solidFill>
+                <a:latin typeface="Times New Roman" panose="02020603050405020304" pitchFamily="18" charset="0"/>
+                <a:cs typeface="Times New Roman" panose="02020603050405020304" pitchFamily="18" charset="0"/>
+              </a:rPr>
+              <a:t>motif_ids</a:t>
+            </a:r>
+            <a:r>
+              <a:rPr lang="en-US" sz="1600" dirty="0">
+                <a:solidFill>
+                  <a:schemeClr val="tx1"/>
+                </a:solidFill>
+                <a:latin typeface="Times New Roman" panose="02020603050405020304" pitchFamily="18" charset="0"/>
+                <a:cs typeface="Times New Roman" panose="02020603050405020304" pitchFamily="18" charset="0"/>
+              </a:rPr>
+              <a:t> &lt;- c( "M2938_1.02", "M3591_1.01", "M3590_1.01" );</a:t>
+            </a:r>
+          </a:p>
+          <a:p>
+            <a:pPr marL="109728" indent="0">
+              <a:buNone/>
+            </a:pPr>
+            <a:r>
+              <a:rPr lang="en-US" sz="1600" dirty="0">
+                <a:solidFill>
+                  <a:schemeClr val="tx1"/>
+                </a:solidFill>
+                <a:latin typeface="Times New Roman" panose="02020603050405020304" pitchFamily="18" charset="0"/>
+                <a:cs typeface="Times New Roman" panose="02020603050405020304" pitchFamily="18" charset="0"/>
+              </a:rPr>
+              <a:t>path &lt;- </a:t>
+            </a:r>
+            <a:r>
+              <a:rPr lang="en-US" sz="1600" dirty="0" err="1">
+                <a:solidFill>
+                  <a:schemeClr val="tx1"/>
+                </a:solidFill>
+                <a:latin typeface="Times New Roman" panose="02020603050405020304" pitchFamily="18" charset="0"/>
+                <a:cs typeface="Times New Roman" panose="02020603050405020304" pitchFamily="18" charset="0"/>
+              </a:rPr>
+              <a:t>system.file</a:t>
+            </a:r>
+            <a:r>
+              <a:rPr lang="en-US" sz="1600" dirty="0">
+                <a:solidFill>
+                  <a:schemeClr val="tx1"/>
+                </a:solidFill>
+                <a:latin typeface="Times New Roman" panose="02020603050405020304" pitchFamily="18" charset="0"/>
+                <a:cs typeface="Times New Roman" panose="02020603050405020304" pitchFamily="18" charset="0"/>
+              </a:rPr>
+              <a:t>("</a:t>
+            </a:r>
+            <a:r>
+              <a:rPr lang="en-US" sz="1600" dirty="0" err="1">
+                <a:solidFill>
+                  <a:schemeClr val="tx1"/>
+                </a:solidFill>
+                <a:latin typeface="Times New Roman" panose="02020603050405020304" pitchFamily="18" charset="0"/>
+                <a:cs typeface="Times New Roman" panose="02020603050405020304" pitchFamily="18" charset="0"/>
+              </a:rPr>
+              <a:t>extdata</a:t>
+            </a:r>
+            <a:r>
+              <a:rPr lang="en-US" sz="1600" dirty="0">
+                <a:solidFill>
+                  <a:schemeClr val="tx1"/>
+                </a:solidFill>
+                <a:latin typeface="Times New Roman" panose="02020603050405020304" pitchFamily="18" charset="0"/>
+                <a:cs typeface="Times New Roman" panose="02020603050405020304" pitchFamily="18" charset="0"/>
+              </a:rPr>
+              <a:t>", package="</a:t>
+            </a:r>
+            <a:r>
+              <a:rPr lang="en-US" sz="1600" dirty="0" err="1">
+                <a:solidFill>
+                  <a:schemeClr val="tx1"/>
+                </a:solidFill>
+                <a:latin typeface="Times New Roman" panose="02020603050405020304" pitchFamily="18" charset="0"/>
+                <a:cs typeface="Times New Roman" panose="02020603050405020304" pitchFamily="18" charset="0"/>
+              </a:rPr>
+              <a:t>rtfbsdb</a:t>
+            </a:r>
+            <a:r>
+              <a:rPr lang="en-US" sz="1600" dirty="0">
+                <a:solidFill>
+                  <a:schemeClr val="tx1"/>
+                </a:solidFill>
+                <a:latin typeface="Times New Roman" panose="02020603050405020304" pitchFamily="18" charset="0"/>
+                <a:cs typeface="Times New Roman" panose="02020603050405020304" pitchFamily="18" charset="0"/>
+              </a:rPr>
+              <a:t>");</a:t>
+            </a:r>
+          </a:p>
+          <a:p>
+            <a:pPr marL="109728" indent="0">
+              <a:buNone/>
+            </a:pPr>
+            <a:r>
+              <a:rPr lang="en-US" sz="1600" dirty="0" err="1">
+                <a:solidFill>
+                  <a:schemeClr val="tx1"/>
+                </a:solidFill>
+                <a:latin typeface="Times New Roman" panose="02020603050405020304" pitchFamily="18" charset="0"/>
+                <a:cs typeface="Times New Roman" panose="02020603050405020304" pitchFamily="18" charset="0"/>
+              </a:rPr>
+              <a:t>file_pwms</a:t>
+            </a:r>
+            <a:r>
+              <a:rPr lang="en-US" sz="1600" dirty="0">
+                <a:solidFill>
+                  <a:schemeClr val="tx1"/>
+                </a:solidFill>
+                <a:latin typeface="Times New Roman" panose="02020603050405020304" pitchFamily="18" charset="0"/>
+                <a:cs typeface="Times New Roman" panose="02020603050405020304" pitchFamily="18" charset="0"/>
+              </a:rPr>
+              <a:t> &lt;- paste(path, c( </a:t>
+            </a:r>
+            <a:r>
+              <a:rPr lang="en-US" sz="1600" dirty="0" smtClean="0">
+                <a:solidFill>
+                  <a:schemeClr val="tx1"/>
+                </a:solidFill>
+                <a:latin typeface="Times New Roman" panose="02020603050405020304" pitchFamily="18" charset="0"/>
+                <a:cs typeface="Times New Roman" panose="02020603050405020304" pitchFamily="18" charset="0"/>
+              </a:rPr>
+              <a:t>"</a:t>
+            </a:r>
+            <a:r>
+              <a:rPr lang="en-US" sz="1600" dirty="0">
+                <a:solidFill>
+                  <a:schemeClr val="tx1"/>
+                </a:solidFill>
+                <a:latin typeface="Times New Roman" panose="02020603050405020304" pitchFamily="18" charset="0"/>
+                <a:cs typeface="Times New Roman" panose="02020603050405020304" pitchFamily="18" charset="0"/>
+              </a:rPr>
+              <a:t>fake_M2938_1.02.pwm",</a:t>
+            </a:r>
+          </a:p>
+          <a:p>
+            <a:pPr marL="109728" indent="0">
+              <a:buNone/>
+            </a:pPr>
+            <a:r>
+              <a:rPr lang="en-US" sz="1600" dirty="0">
+                <a:solidFill>
+                  <a:schemeClr val="tx1"/>
+                </a:solidFill>
+                <a:latin typeface="Times New Roman" panose="02020603050405020304" pitchFamily="18" charset="0"/>
+                <a:cs typeface="Times New Roman" panose="02020603050405020304" pitchFamily="18" charset="0"/>
+              </a:rPr>
+              <a:t>      </a:t>
+            </a:r>
+            <a:r>
+              <a:rPr lang="en-US" sz="1600" dirty="0" smtClean="0">
+                <a:solidFill>
+                  <a:schemeClr val="tx1"/>
+                </a:solidFill>
+                <a:latin typeface="Times New Roman" panose="02020603050405020304" pitchFamily="18" charset="0"/>
+                <a:cs typeface="Times New Roman" panose="02020603050405020304" pitchFamily="18" charset="0"/>
+              </a:rPr>
+              <a:t>	"</a:t>
+            </a:r>
+            <a:r>
+              <a:rPr lang="en-US" sz="1600" dirty="0">
+                <a:solidFill>
+                  <a:schemeClr val="tx1"/>
+                </a:solidFill>
+                <a:latin typeface="Times New Roman" panose="02020603050405020304" pitchFamily="18" charset="0"/>
+                <a:cs typeface="Times New Roman" panose="02020603050405020304" pitchFamily="18" charset="0"/>
+              </a:rPr>
+              <a:t>M3591_1.01.pwm", </a:t>
+            </a:r>
+          </a:p>
+          <a:p>
+            <a:pPr marL="109728" indent="0">
+              <a:buNone/>
+            </a:pPr>
+            <a:r>
+              <a:rPr lang="en-US" sz="1600" dirty="0">
+                <a:solidFill>
+                  <a:schemeClr val="tx1"/>
+                </a:solidFill>
+                <a:latin typeface="Times New Roman" panose="02020603050405020304" pitchFamily="18" charset="0"/>
+                <a:cs typeface="Times New Roman" panose="02020603050405020304" pitchFamily="18" charset="0"/>
+              </a:rPr>
+              <a:t>      </a:t>
+            </a:r>
+            <a:r>
+              <a:rPr lang="en-US" sz="1600" dirty="0" smtClean="0">
+                <a:solidFill>
+                  <a:schemeClr val="tx1"/>
+                </a:solidFill>
+                <a:latin typeface="Times New Roman" panose="02020603050405020304" pitchFamily="18" charset="0"/>
+                <a:cs typeface="Times New Roman" panose="02020603050405020304" pitchFamily="18" charset="0"/>
+              </a:rPr>
+              <a:t>	"</a:t>
+            </a:r>
+            <a:r>
+              <a:rPr lang="en-US" sz="1600" dirty="0">
+                <a:solidFill>
+                  <a:schemeClr val="tx1"/>
+                </a:solidFill>
+                <a:latin typeface="Times New Roman" panose="02020603050405020304" pitchFamily="18" charset="0"/>
+                <a:cs typeface="Times New Roman" panose="02020603050405020304" pitchFamily="18" charset="0"/>
+              </a:rPr>
+              <a:t>M3590_1.01.pwm"), </a:t>
+            </a:r>
+            <a:r>
+              <a:rPr lang="en-US" sz="1600" dirty="0" err="1">
+                <a:solidFill>
+                  <a:schemeClr val="tx1"/>
+                </a:solidFill>
+                <a:latin typeface="Times New Roman" panose="02020603050405020304" pitchFamily="18" charset="0"/>
+                <a:cs typeface="Times New Roman" panose="02020603050405020304" pitchFamily="18" charset="0"/>
+              </a:rPr>
+              <a:t>sep</a:t>
+            </a:r>
+            <a:r>
+              <a:rPr lang="en-US" sz="1600" dirty="0">
+                <a:solidFill>
+                  <a:schemeClr val="tx1"/>
+                </a:solidFill>
+                <a:latin typeface="Times New Roman" panose="02020603050405020304" pitchFamily="18" charset="0"/>
+                <a:cs typeface="Times New Roman" panose="02020603050405020304" pitchFamily="18" charset="0"/>
+              </a:rPr>
+              <a:t>="/");</a:t>
+            </a:r>
+          </a:p>
+          <a:p>
+            <a:pPr marL="109728" indent="0">
+              <a:buNone/>
+            </a:pPr>
+            <a:r>
+              <a:rPr lang="en-US" sz="1600" dirty="0" err="1">
+                <a:solidFill>
+                  <a:schemeClr val="tx1"/>
+                </a:solidFill>
+                <a:latin typeface="Times New Roman" panose="02020603050405020304" pitchFamily="18" charset="0"/>
+                <a:cs typeface="Times New Roman" panose="02020603050405020304" pitchFamily="18" charset="0"/>
+              </a:rPr>
+              <a:t>tfs</a:t>
+            </a:r>
+            <a:r>
+              <a:rPr lang="en-US" sz="1600" dirty="0">
+                <a:solidFill>
+                  <a:schemeClr val="tx1"/>
+                </a:solidFill>
+                <a:latin typeface="Times New Roman" panose="02020603050405020304" pitchFamily="18" charset="0"/>
+                <a:cs typeface="Times New Roman" panose="02020603050405020304" pitchFamily="18" charset="0"/>
+              </a:rPr>
+              <a:t> &lt;- </a:t>
+            </a:r>
+            <a:r>
+              <a:rPr lang="en-US" sz="1600" dirty="0" err="1">
+                <a:solidFill>
+                  <a:schemeClr val="tx1"/>
+                </a:solidFill>
+                <a:latin typeface="Times New Roman" panose="02020603050405020304" pitchFamily="18" charset="0"/>
+                <a:cs typeface="Times New Roman" panose="02020603050405020304" pitchFamily="18" charset="0"/>
+              </a:rPr>
+              <a:t>tfbs.importMotifs</a:t>
+            </a:r>
+            <a:r>
+              <a:rPr lang="en-US" sz="1600" dirty="0">
+                <a:solidFill>
+                  <a:schemeClr val="tx1"/>
+                </a:solidFill>
+                <a:latin typeface="Times New Roman" panose="02020603050405020304" pitchFamily="18" charset="0"/>
+                <a:cs typeface="Times New Roman" panose="02020603050405020304" pitchFamily="18" charset="0"/>
+              </a:rPr>
+              <a:t>(</a:t>
+            </a:r>
+            <a:r>
+              <a:rPr lang="en-US" sz="1600" dirty="0" err="1">
+                <a:solidFill>
+                  <a:schemeClr val="tx1"/>
+                </a:solidFill>
+                <a:latin typeface="Times New Roman" panose="02020603050405020304" pitchFamily="18" charset="0"/>
+                <a:cs typeface="Times New Roman" panose="02020603050405020304" pitchFamily="18" charset="0"/>
+              </a:rPr>
+              <a:t>tfs</a:t>
+            </a:r>
+            <a:r>
+              <a:rPr lang="en-US" sz="1600" dirty="0">
+                <a:solidFill>
+                  <a:schemeClr val="tx1"/>
+                </a:solidFill>
+                <a:latin typeface="Times New Roman" panose="02020603050405020304" pitchFamily="18" charset="0"/>
+                <a:cs typeface="Times New Roman" panose="02020603050405020304" pitchFamily="18" charset="0"/>
+              </a:rPr>
+              <a:t>, </a:t>
+            </a:r>
+            <a:r>
+              <a:rPr lang="en-US" sz="1600" dirty="0" smtClean="0">
+                <a:solidFill>
+                  <a:schemeClr val="tx1"/>
+                </a:solidFill>
+                <a:latin typeface="Times New Roman" panose="02020603050405020304" pitchFamily="18" charset="0"/>
+                <a:cs typeface="Times New Roman" panose="02020603050405020304" pitchFamily="18" charset="0"/>
+              </a:rPr>
+              <a:t>"</a:t>
+            </a:r>
+            <a:r>
+              <a:rPr lang="en-US" sz="1600" dirty="0" err="1" smtClean="0">
+                <a:solidFill>
+                  <a:schemeClr val="tx1"/>
+                </a:solidFill>
+                <a:latin typeface="Times New Roman" panose="02020603050405020304" pitchFamily="18" charset="0"/>
+                <a:cs typeface="Times New Roman" panose="02020603050405020304" pitchFamily="18" charset="0"/>
+              </a:rPr>
+              <a:t>pwm.matrix</a:t>
+            </a:r>
+            <a:r>
+              <a:rPr lang="en-US" sz="1600" dirty="0" smtClean="0">
+                <a:solidFill>
+                  <a:schemeClr val="tx1"/>
+                </a:solidFill>
+                <a:latin typeface="Times New Roman" panose="02020603050405020304" pitchFamily="18" charset="0"/>
+                <a:cs typeface="Times New Roman" panose="02020603050405020304" pitchFamily="18" charset="0"/>
+              </a:rPr>
+              <a:t>", </a:t>
+            </a:r>
+            <a:r>
+              <a:rPr lang="en-US" sz="1600" dirty="0" err="1">
+                <a:solidFill>
+                  <a:schemeClr val="tx1"/>
+                </a:solidFill>
+                <a:latin typeface="Times New Roman" panose="02020603050405020304" pitchFamily="18" charset="0"/>
+                <a:cs typeface="Times New Roman" panose="02020603050405020304" pitchFamily="18" charset="0"/>
+              </a:rPr>
+              <a:t>file_pwms</a:t>
+            </a:r>
+            <a:r>
+              <a:rPr lang="en-US" sz="1600" dirty="0">
+                <a:solidFill>
+                  <a:schemeClr val="tx1"/>
+                </a:solidFill>
+                <a:latin typeface="Times New Roman" panose="02020603050405020304" pitchFamily="18" charset="0"/>
+                <a:cs typeface="Times New Roman" panose="02020603050405020304" pitchFamily="18" charset="0"/>
+              </a:rPr>
+              <a:t>, </a:t>
+            </a:r>
+            <a:r>
+              <a:rPr lang="en-US" sz="1600" dirty="0" err="1">
+                <a:solidFill>
+                  <a:schemeClr val="tx1"/>
+                </a:solidFill>
+                <a:latin typeface="Times New Roman" panose="02020603050405020304" pitchFamily="18" charset="0"/>
+                <a:cs typeface="Times New Roman" panose="02020603050405020304" pitchFamily="18" charset="0"/>
+              </a:rPr>
+              <a:t>motif_ids</a:t>
+            </a:r>
+            <a:r>
+              <a:rPr lang="en-US" sz="1600" dirty="0">
+                <a:solidFill>
+                  <a:schemeClr val="tx1"/>
+                </a:solidFill>
+                <a:latin typeface="Times New Roman" panose="02020603050405020304" pitchFamily="18" charset="0"/>
+                <a:cs typeface="Times New Roman" panose="02020603050405020304" pitchFamily="18" charset="0"/>
+              </a:rPr>
+              <a:t>, header=T );</a:t>
+            </a:r>
+          </a:p>
+          <a:p>
+            <a:pPr marL="109728" indent="0">
+              <a:buNone/>
+            </a:pPr>
+            <a:endParaRPr lang="en-US" sz="1600" dirty="0">
+              <a:solidFill>
+                <a:schemeClr val="tx1"/>
+              </a:solidFill>
+              <a:latin typeface="Times New Roman" panose="02020603050405020304" pitchFamily="18" charset="0"/>
+              <a:cs typeface="Times New Roman" panose="02020603050405020304" pitchFamily="18" charset="0"/>
+            </a:endParaRPr>
+          </a:p>
+          <a:p>
+            <a:pPr marL="109728" indent="0">
+              <a:buNone/>
+            </a:pPr>
+            <a:r>
+              <a:rPr lang="en-US" sz="1600" dirty="0">
+                <a:solidFill>
+                  <a:schemeClr val="tx1"/>
+                </a:solidFill>
+                <a:latin typeface="Times New Roman" panose="02020603050405020304" pitchFamily="18" charset="0"/>
+                <a:cs typeface="Times New Roman" panose="02020603050405020304" pitchFamily="18" charset="0"/>
+              </a:rPr>
+              <a:t>## import the data file in Jaspar format</a:t>
+            </a:r>
+          </a:p>
+          <a:p>
+            <a:pPr marL="109728" indent="0">
+              <a:buNone/>
+            </a:pPr>
+            <a:r>
+              <a:rPr lang="en-US" sz="1600" dirty="0" err="1">
+                <a:solidFill>
+                  <a:schemeClr val="tx1"/>
+                </a:solidFill>
+                <a:latin typeface="Times New Roman" panose="02020603050405020304" pitchFamily="18" charset="0"/>
+                <a:cs typeface="Times New Roman" panose="02020603050405020304" pitchFamily="18" charset="0"/>
+              </a:rPr>
+              <a:t>tbs</a:t>
+            </a:r>
+            <a:r>
+              <a:rPr lang="en-US" sz="1600" dirty="0">
+                <a:solidFill>
+                  <a:schemeClr val="tx1"/>
+                </a:solidFill>
+                <a:latin typeface="Times New Roman" panose="02020603050405020304" pitchFamily="18" charset="0"/>
+                <a:cs typeface="Times New Roman" panose="02020603050405020304" pitchFamily="18" charset="0"/>
+              </a:rPr>
+              <a:t> &lt;- </a:t>
+            </a:r>
+            <a:r>
+              <a:rPr lang="en-US" sz="1600" dirty="0" err="1">
+                <a:solidFill>
+                  <a:schemeClr val="tx1"/>
+                </a:solidFill>
+                <a:latin typeface="Times New Roman" panose="02020603050405020304" pitchFamily="18" charset="0"/>
+                <a:cs typeface="Times New Roman" panose="02020603050405020304" pitchFamily="18" charset="0"/>
+              </a:rPr>
+              <a:t>tfbs</a:t>
+            </a:r>
+            <a:r>
+              <a:rPr lang="en-US" sz="1600" dirty="0">
+                <a:solidFill>
+                  <a:schemeClr val="tx1"/>
+                </a:solidFill>
+                <a:latin typeface="Times New Roman" panose="02020603050405020304" pitchFamily="18" charset="0"/>
+                <a:cs typeface="Times New Roman" panose="02020603050405020304" pitchFamily="18" charset="0"/>
+              </a:rPr>
+              <a:t>();</a:t>
+            </a:r>
+          </a:p>
+          <a:p>
+            <a:pPr marL="109728" indent="0">
+              <a:buNone/>
+            </a:pPr>
+            <a:r>
+              <a:rPr lang="en-US" sz="1600" dirty="0" err="1">
+                <a:solidFill>
+                  <a:schemeClr val="tx1"/>
+                </a:solidFill>
+                <a:latin typeface="Times New Roman" panose="02020603050405020304" pitchFamily="18" charset="0"/>
+                <a:cs typeface="Times New Roman" panose="02020603050405020304" pitchFamily="18" charset="0"/>
+              </a:rPr>
+              <a:t>data.jaspar</a:t>
+            </a:r>
+            <a:r>
+              <a:rPr lang="en-US" sz="1600" dirty="0">
+                <a:solidFill>
+                  <a:schemeClr val="tx1"/>
+                </a:solidFill>
+                <a:latin typeface="Times New Roman" panose="02020603050405020304" pitchFamily="18" charset="0"/>
+                <a:cs typeface="Times New Roman" panose="02020603050405020304" pitchFamily="18" charset="0"/>
+              </a:rPr>
+              <a:t> &lt;- </a:t>
+            </a:r>
+            <a:r>
+              <a:rPr lang="en-US" sz="1600" dirty="0" err="1">
+                <a:solidFill>
+                  <a:schemeClr val="tx1"/>
+                </a:solidFill>
+                <a:latin typeface="Times New Roman" panose="02020603050405020304" pitchFamily="18" charset="0"/>
+                <a:cs typeface="Times New Roman" panose="02020603050405020304" pitchFamily="18" charset="0"/>
+              </a:rPr>
+              <a:t>system.file</a:t>
+            </a:r>
+            <a:r>
+              <a:rPr lang="en-US" sz="1600" dirty="0">
+                <a:solidFill>
+                  <a:schemeClr val="tx1"/>
+                </a:solidFill>
+                <a:latin typeface="Times New Roman" panose="02020603050405020304" pitchFamily="18" charset="0"/>
+                <a:cs typeface="Times New Roman" panose="02020603050405020304" pitchFamily="18" charset="0"/>
+              </a:rPr>
+              <a:t>("</a:t>
+            </a:r>
+            <a:r>
+              <a:rPr lang="en-US" sz="1600" dirty="0" err="1">
+                <a:solidFill>
+                  <a:schemeClr val="tx1"/>
+                </a:solidFill>
+                <a:latin typeface="Times New Roman" panose="02020603050405020304" pitchFamily="18" charset="0"/>
+                <a:cs typeface="Times New Roman" panose="02020603050405020304" pitchFamily="18" charset="0"/>
+              </a:rPr>
+              <a:t>extdata</a:t>
+            </a:r>
+            <a:r>
+              <a:rPr lang="en-US" sz="1600" dirty="0">
+                <a:solidFill>
+                  <a:schemeClr val="tx1"/>
+                </a:solidFill>
+                <a:latin typeface="Times New Roman" panose="02020603050405020304" pitchFamily="18" charset="0"/>
+                <a:cs typeface="Times New Roman" panose="02020603050405020304" pitchFamily="18" charset="0"/>
+              </a:rPr>
+              <a:t>", "pwm.example.jaspar.2015.txt", </a:t>
+            </a:r>
+            <a:r>
+              <a:rPr lang="en-US" sz="1600" dirty="0" smtClean="0">
+                <a:solidFill>
+                  <a:schemeClr val="tx1"/>
+                </a:solidFill>
+                <a:latin typeface="Times New Roman" panose="02020603050405020304" pitchFamily="18" charset="0"/>
+                <a:cs typeface="Times New Roman" panose="02020603050405020304" pitchFamily="18" charset="0"/>
+              </a:rPr>
+              <a:t>	package</a:t>
+            </a:r>
+            <a:r>
+              <a:rPr lang="en-US" sz="1600" dirty="0">
+                <a:solidFill>
+                  <a:schemeClr val="tx1"/>
+                </a:solidFill>
+                <a:latin typeface="Times New Roman" panose="02020603050405020304" pitchFamily="18" charset="0"/>
+                <a:cs typeface="Times New Roman" panose="02020603050405020304" pitchFamily="18" charset="0"/>
+              </a:rPr>
+              <a:t>="</a:t>
+            </a:r>
+            <a:r>
+              <a:rPr lang="en-US" sz="1600" dirty="0" err="1">
+                <a:solidFill>
+                  <a:schemeClr val="tx1"/>
+                </a:solidFill>
+                <a:latin typeface="Times New Roman" panose="02020603050405020304" pitchFamily="18" charset="0"/>
+                <a:cs typeface="Times New Roman" panose="02020603050405020304" pitchFamily="18" charset="0"/>
+              </a:rPr>
+              <a:t>rtfbsdb</a:t>
+            </a:r>
+            <a:r>
+              <a:rPr lang="en-US" sz="1600" dirty="0">
+                <a:solidFill>
+                  <a:schemeClr val="tx1"/>
+                </a:solidFill>
+                <a:latin typeface="Times New Roman" panose="02020603050405020304" pitchFamily="18" charset="0"/>
+                <a:cs typeface="Times New Roman" panose="02020603050405020304" pitchFamily="18" charset="0"/>
+              </a:rPr>
+              <a:t>");</a:t>
+            </a:r>
+          </a:p>
+          <a:p>
+            <a:pPr marL="109728" indent="0">
+              <a:buNone/>
+            </a:pPr>
+            <a:r>
+              <a:rPr lang="en-US" sz="1600" dirty="0" err="1">
+                <a:solidFill>
+                  <a:schemeClr val="tx1"/>
+                </a:solidFill>
+                <a:latin typeface="Times New Roman" panose="02020603050405020304" pitchFamily="18" charset="0"/>
+                <a:cs typeface="Times New Roman" panose="02020603050405020304" pitchFamily="18" charset="0"/>
+              </a:rPr>
+              <a:t>tfs.jaspar</a:t>
+            </a:r>
+            <a:r>
+              <a:rPr lang="en-US" sz="1600" dirty="0">
+                <a:solidFill>
+                  <a:schemeClr val="tx1"/>
+                </a:solidFill>
+                <a:latin typeface="Times New Roman" panose="02020603050405020304" pitchFamily="18" charset="0"/>
+                <a:cs typeface="Times New Roman" panose="02020603050405020304" pitchFamily="18" charset="0"/>
+              </a:rPr>
+              <a:t> &lt;- </a:t>
+            </a:r>
+            <a:r>
+              <a:rPr lang="en-US" sz="1600" dirty="0" err="1">
+                <a:solidFill>
+                  <a:schemeClr val="tx1"/>
+                </a:solidFill>
+                <a:latin typeface="Times New Roman" panose="02020603050405020304" pitchFamily="18" charset="0"/>
+                <a:cs typeface="Times New Roman" panose="02020603050405020304" pitchFamily="18" charset="0"/>
+              </a:rPr>
+              <a:t>tfbs.importMotifs</a:t>
+            </a:r>
+            <a:r>
+              <a:rPr lang="en-US" sz="1600" dirty="0">
+                <a:solidFill>
+                  <a:schemeClr val="tx1"/>
+                </a:solidFill>
+                <a:latin typeface="Times New Roman" panose="02020603050405020304" pitchFamily="18" charset="0"/>
+                <a:cs typeface="Times New Roman" panose="02020603050405020304" pitchFamily="18" charset="0"/>
+              </a:rPr>
+              <a:t>(</a:t>
+            </a:r>
+            <a:r>
+              <a:rPr lang="en-US" sz="1600" dirty="0" err="1">
+                <a:solidFill>
+                  <a:schemeClr val="tx1"/>
+                </a:solidFill>
+                <a:latin typeface="Times New Roman" panose="02020603050405020304" pitchFamily="18" charset="0"/>
+                <a:cs typeface="Times New Roman" panose="02020603050405020304" pitchFamily="18" charset="0"/>
+              </a:rPr>
+              <a:t>tfs</a:t>
+            </a:r>
+            <a:r>
+              <a:rPr lang="en-US" sz="1600" dirty="0">
+                <a:solidFill>
+                  <a:schemeClr val="tx1"/>
+                </a:solidFill>
+                <a:latin typeface="Times New Roman" panose="02020603050405020304" pitchFamily="18" charset="0"/>
+                <a:cs typeface="Times New Roman" panose="02020603050405020304" pitchFamily="18" charset="0"/>
+              </a:rPr>
+              <a:t>, "</a:t>
+            </a:r>
+            <a:r>
+              <a:rPr lang="en-US" sz="1600" dirty="0" err="1">
+                <a:solidFill>
+                  <a:schemeClr val="tx1"/>
+                </a:solidFill>
+                <a:latin typeface="Times New Roman" panose="02020603050405020304" pitchFamily="18" charset="0"/>
+                <a:cs typeface="Times New Roman" panose="02020603050405020304" pitchFamily="18" charset="0"/>
+              </a:rPr>
+              <a:t>jaspar</a:t>
+            </a:r>
+            <a:r>
+              <a:rPr lang="en-US" sz="1600" dirty="0">
+                <a:solidFill>
+                  <a:schemeClr val="tx1"/>
+                </a:solidFill>
+                <a:latin typeface="Times New Roman" panose="02020603050405020304" pitchFamily="18" charset="0"/>
+                <a:cs typeface="Times New Roman" panose="02020603050405020304" pitchFamily="18" charset="0"/>
+              </a:rPr>
+              <a:t>", </a:t>
+            </a:r>
+            <a:r>
+              <a:rPr lang="en-US" sz="1600" dirty="0" err="1">
+                <a:solidFill>
+                  <a:schemeClr val="tx1"/>
+                </a:solidFill>
+                <a:latin typeface="Times New Roman" panose="02020603050405020304" pitchFamily="18" charset="0"/>
+                <a:cs typeface="Times New Roman" panose="02020603050405020304" pitchFamily="18" charset="0"/>
+              </a:rPr>
+              <a:t>data.jaspar</a:t>
+            </a:r>
+            <a:r>
+              <a:rPr lang="en-US" sz="1600" dirty="0">
+                <a:solidFill>
+                  <a:schemeClr val="tx1"/>
+                </a:solidFill>
+                <a:latin typeface="Times New Roman" panose="02020603050405020304" pitchFamily="18" charset="0"/>
+                <a:cs typeface="Times New Roman" panose="02020603050405020304" pitchFamily="18" charset="0"/>
+              </a:rPr>
+              <a:t>, </a:t>
+            </a:r>
+            <a:r>
+              <a:rPr lang="en-US" sz="1600" dirty="0" err="1">
+                <a:solidFill>
+                  <a:schemeClr val="tx1"/>
+                </a:solidFill>
+                <a:latin typeface="Times New Roman" panose="02020603050405020304" pitchFamily="18" charset="0"/>
+                <a:cs typeface="Times New Roman" panose="02020603050405020304" pitchFamily="18" charset="0"/>
+              </a:rPr>
+              <a:t>skip.lines</a:t>
+            </a:r>
+            <a:r>
+              <a:rPr lang="en-US" sz="1600" dirty="0">
+                <a:solidFill>
+                  <a:schemeClr val="tx1"/>
+                </a:solidFill>
+                <a:latin typeface="Times New Roman" panose="02020603050405020304" pitchFamily="18" charset="0"/>
+                <a:cs typeface="Times New Roman" panose="02020603050405020304" pitchFamily="18" charset="0"/>
+              </a:rPr>
+              <a:t>=0</a:t>
+            </a:r>
+            <a:r>
+              <a:rPr lang="en-US" sz="1600" dirty="0" smtClean="0">
+                <a:solidFill>
+                  <a:schemeClr val="tx1"/>
+                </a:solidFill>
+                <a:latin typeface="Times New Roman" panose="02020603050405020304" pitchFamily="18" charset="0"/>
+                <a:cs typeface="Times New Roman" panose="02020603050405020304" pitchFamily="18" charset="0"/>
+              </a:rPr>
+              <a:t>);</a:t>
+            </a:r>
+            <a:endParaRPr lang="en-US" sz="1600" dirty="0">
+              <a:solidFill>
+                <a:schemeClr val="tx1"/>
+              </a:solidFill>
               <a:latin typeface="Times New Roman" panose="02020603050405020304" pitchFamily="18" charset="0"/>
               <a:cs typeface="Times New Roman" panose="02020603050405020304" pitchFamily="18" charset="0"/>
             </a:endParaRPr>

</xml_diff>

<commit_message>
Adding 'maxscore' option for the tfbs scanning function
</commit_message>
<xml_diff>
--- a/rtfbsdb-tutorial.pptx
+++ b/rtfbsdb-tutorial.pptx
@@ -247,7 +247,7 @@
             <a:fld id="{68796EA6-6F25-4F19-87BA-7ADCC16DAEFF}" type="datetimeFigureOut">
               <a:rPr lang="en-US" smtClean="0"/>
               <a:pPr/>
-              <a:t>12/8/2015</a:t>
+              <a:t>12/11/2015</a:t>
             </a:fld>
             <a:endParaRPr lang="en-US" dirty="0"/>
           </a:p>
@@ -414,7 +414,7 @@
             <a:fld id="{C39C172E-A8B5-46F6-B05C-DFA3E2E0F207}" type="datetimeFigureOut">
               <a:rPr lang="en-US" smtClean="0"/>
               <a:pPr/>
-              <a:t>12/8/2015</a:t>
+              <a:t>12/11/2015</a:t>
             </a:fld>
             <a:endParaRPr lang="en-US" dirty="0"/>
           </a:p>
@@ -2112,7 +2112,7 @@
             <a:fld id="{4E708F12-96AD-4ED4-8132-A78F5E42C1F5}" type="datetime1">
               <a:rPr lang="en-US" smtClean="0"/>
               <a:pPr/>
-              <a:t>12/8/2015</a:t>
+              <a:t>12/11/2015</a:t>
             </a:fld>
             <a:endParaRPr lang="en-US" dirty="0"/>
           </a:p>
@@ -2336,7 +2336,7 @@
             <a:fld id="{7B7FA170-8299-44AD-AEEF-FC686C3D7804}" type="datetime1">
               <a:rPr lang="en-US" smtClean="0"/>
               <a:pPr/>
-              <a:t>12/8/2015</a:t>
+              <a:t>12/11/2015</a:t>
             </a:fld>
             <a:endParaRPr lang="en-US" dirty="0"/>
           </a:p>
@@ -2520,7 +2520,7 @@
             <a:fld id="{2231763A-68EC-4ECD-9620-D9FE9CDDD622}" type="datetime1">
               <a:rPr lang="en-US" smtClean="0"/>
               <a:pPr/>
-              <a:t>12/8/2015</a:t>
+              <a:t>12/11/2015</a:t>
             </a:fld>
             <a:endParaRPr lang="en-US" dirty="0"/>
           </a:p>
@@ -2714,7 +2714,7 @@
             <a:fld id="{7B98BEDD-6160-49BB-B372-861DE7DE9BA5}" type="datetime1">
               <a:rPr lang="en-US" smtClean="0"/>
               <a:pPr/>
-              <a:t>12/8/2015</a:t>
+              <a:t>12/11/2015</a:t>
             </a:fld>
             <a:endParaRPr lang="en-US" dirty="0"/>
           </a:p>
@@ -2898,7 +2898,7 @@
             <a:fld id="{0AAE819F-B7FD-4B29-8F66-9E318144BC2A}" type="datetime1">
               <a:rPr lang="en-US" smtClean="0"/>
               <a:pPr/>
-              <a:t>12/8/2015</a:t>
+              <a:t>12/11/2015</a:t>
             </a:fld>
             <a:endParaRPr lang="en-US" dirty="0"/>
           </a:p>
@@ -3132,7 +3132,7 @@
             <a:fld id="{D4CA159C-B6E0-4F10-9F4A-2FA57003B139}" type="datetime1">
               <a:rPr lang="en-US" smtClean="0"/>
               <a:pPr/>
-              <a:t>12/8/2015</a:t>
+              <a:t>12/11/2015</a:t>
             </a:fld>
             <a:endParaRPr lang="en-US" dirty="0"/>
           </a:p>
@@ -3426,7 +3426,7 @@
             <a:fld id="{8170CBBB-D1D1-4386-A5E9-07F3477B78F3}" type="datetime1">
               <a:rPr lang="en-US" smtClean="0"/>
               <a:pPr/>
-              <a:t>12/8/2015</a:t>
+              <a:t>12/11/2015</a:t>
             </a:fld>
             <a:endParaRPr lang="en-US" dirty="0"/>
           </a:p>
@@ -3856,7 +3856,7 @@
             <a:fld id="{9FA4CAD8-0EA7-4615-B69B-B2F199EF3A93}" type="datetime1">
               <a:rPr lang="en-US" smtClean="0"/>
               <a:pPr/>
-              <a:t>12/8/2015</a:t>
+              <a:t>12/11/2015</a:t>
             </a:fld>
             <a:endParaRPr lang="en-US" dirty="0"/>
           </a:p>
@@ -4011,7 +4011,7 @@
             <a:fld id="{B9234BD7-6953-492C-921B-E68B2D7F14C8}" type="datetime1">
               <a:rPr lang="en-US" smtClean="0"/>
               <a:pPr/>
-              <a:t>12/8/2015</a:t>
+              <a:t>12/11/2015</a:t>
             </a:fld>
             <a:endParaRPr lang="en-US" dirty="0"/>
           </a:p>
@@ -4120,7 +4120,7 @@
             <a:fld id="{35A17D9B-D4D3-4E23-88DF-2E354FA43196}" type="datetime1">
               <a:rPr lang="en-US" smtClean="0"/>
               <a:pPr/>
-              <a:t>12/8/2015</a:t>
+              <a:t>12/11/2015</a:t>
             </a:fld>
             <a:endParaRPr lang="en-US" dirty="0"/>
           </a:p>
@@ -4384,7 +4384,7 @@
             <a:fld id="{541F67C5-D04E-4576-B61C-12ABA14BBD6C}" type="datetime1">
               <a:rPr lang="en-US" smtClean="0"/>
               <a:pPr/>
-              <a:t>12/8/2015</a:t>
+              <a:t>12/11/2015</a:t>
             </a:fld>
             <a:endParaRPr lang="en-US" dirty="0"/>
           </a:p>
@@ -5286,7 +5286,7 @@
             <a:fld id="{C20F09E4-6EA4-4BF3-9FC8-FF40373B88E6}" type="datetime1">
               <a:rPr lang="en-US" smtClean="0"/>
               <a:pPr/>
-              <a:t>12/8/2015</a:t>
+              <a:t>12/11/2015</a:t>
             </a:fld>
             <a:endParaRPr lang="en-US" dirty="0"/>
           </a:p>
@@ -5880,7 +5880,6 @@
               <a:rPr lang="en-US" sz="2000" dirty="0" smtClean="0"/>
               <a:t>12/8/2015</a:t>
             </a:r>
-            <a:endParaRPr lang="en-US" sz="2000" dirty="0" smtClean="0"/>
           </a:p>
           <a:p>
             <a:endParaRPr lang="en-US" dirty="0"/>
@@ -6056,15 +6055,7 @@
             </a:r>
             <a:r>
               <a:rPr lang="en-US" dirty="0" smtClean="0"/>
-              <a:t> is also employed to </a:t>
-            </a:r>
-            <a:r>
-              <a:rPr lang="en-US" dirty="0" smtClean="0"/>
-              <a:t>cluster </a:t>
-            </a:r>
-            <a:r>
-              <a:rPr lang="en-US" dirty="0" smtClean="0"/>
-              <a:t>the similarity measures used in the </a:t>
+              <a:t> is also employed to cluster the similarity measures used in the </a:t>
             </a:r>
             <a:r>
               <a:rPr lang="en-US" i="1" dirty="0" err="1" smtClean="0"/>
@@ -6243,17 +6234,7 @@
                 <a:latin typeface="Times New Roman" panose="02020603050405020304" pitchFamily="18" charset="0"/>
                 <a:cs typeface="Times New Roman" panose="02020603050405020304" pitchFamily="18" charset="0"/>
               </a:rPr>
-              <a:t>=“agnes.hm.pdf" </a:t>
-            </a:r>
-            <a:r>
-              <a:rPr lang="en-US" sz="1600" dirty="0" smtClean="0">
-                <a:solidFill>
-                  <a:schemeClr val="tx1"/>
-                </a:solidFill>
-                <a:latin typeface="Times New Roman" panose="02020603050405020304" pitchFamily="18" charset="0"/>
-                <a:cs typeface="Times New Roman" panose="02020603050405020304" pitchFamily="18" charset="0"/>
-              </a:rPr>
-              <a:t>)</a:t>
+              <a:t>=“agnes.hm.pdf" )</a:t>
             </a:r>
             <a:endParaRPr lang="en-US" sz="1600" dirty="0">
               <a:solidFill>
@@ -6387,17 +6368,7 @@
                 <a:latin typeface="Times New Roman" panose="02020603050405020304" pitchFamily="18" charset="0"/>
                 <a:cs typeface="Times New Roman" panose="02020603050405020304" pitchFamily="18" charset="0"/>
               </a:rPr>
-              <a:t>=“apcluster.hm.pdf</a:t>
-            </a:r>
-            <a:r>
-              <a:rPr lang="en-US" sz="1600" dirty="0" smtClean="0">
-                <a:solidFill>
-                  <a:schemeClr val="tx1"/>
-                </a:solidFill>
-                <a:latin typeface="Times New Roman" panose="02020603050405020304" pitchFamily="18" charset="0"/>
-                <a:cs typeface="Times New Roman" panose="02020603050405020304" pitchFamily="18" charset="0"/>
-              </a:rPr>
-              <a:t>" )</a:t>
+              <a:t>=“apcluster.hm.pdf" )</a:t>
             </a:r>
             <a:endParaRPr lang="en-US" sz="1600" dirty="0">
               <a:solidFill>
@@ -6466,27 +6437,7 @@
                 <a:latin typeface="Times New Roman" panose="02020603050405020304" pitchFamily="18" charset="0"/>
                 <a:cs typeface="Times New Roman" panose="02020603050405020304" pitchFamily="18" charset="0"/>
               </a:rPr>
-              <a:t>( </a:t>
-            </a:r>
-            <a:r>
-              <a:rPr lang="en-US" sz="1600" dirty="0" smtClean="0">
-                <a:solidFill>
-                  <a:schemeClr val="tx1"/>
-                </a:solidFill>
-                <a:latin typeface="Times New Roman" panose="02020603050405020304" pitchFamily="18" charset="0"/>
-                <a:cs typeface="Times New Roman" panose="02020603050405020304" pitchFamily="18" charset="0"/>
-              </a:rPr>
-              <a:t>tfs1, file.pdf=“agnes.logos.pdf" </a:t>
-            </a:r>
-            <a:r>
-              <a:rPr lang="en-US" sz="1600" dirty="0" smtClean="0">
-                <a:solidFill>
-                  <a:schemeClr val="tx1"/>
-                </a:solidFill>
-                <a:latin typeface="Times New Roman" panose="02020603050405020304" pitchFamily="18" charset="0"/>
-                <a:cs typeface="Times New Roman" panose="02020603050405020304" pitchFamily="18" charset="0"/>
-              </a:rPr>
-              <a:t>);</a:t>
+              <a:t>( tfs1, file.pdf=“agnes.logos.pdf" );</a:t>
             </a:r>
             <a:endParaRPr lang="en-US" sz="1600" dirty="0">
               <a:solidFill>
@@ -7268,7 +7219,17 @@
                 <a:latin typeface="Times New Roman" panose="02020603050405020304" pitchFamily="18" charset="0"/>
                 <a:cs typeface="Times New Roman" panose="02020603050405020304" pitchFamily="18" charset="0"/>
               </a:rPr>
-              <a:t>tfs1 </a:t>
+              <a:t>tfs1 &lt;- </a:t>
+            </a:r>
+            <a:r>
+              <a:rPr lang="en-US" sz="1600" dirty="0" err="1" smtClean="0">
+                <a:solidFill>
+                  <a:schemeClr val="tx1"/>
+                </a:solidFill>
+                <a:latin typeface="Times New Roman" panose="02020603050405020304" pitchFamily="18" charset="0"/>
+                <a:cs typeface="Times New Roman" panose="02020603050405020304" pitchFamily="18" charset="0"/>
+              </a:rPr>
+              <a:t>tfbs.selecteByRandom</a:t>
             </a:r>
             <a:r>
               <a:rPr lang="en-US" sz="1600" dirty="0" smtClean="0">
@@ -7278,35 +7239,8 @@
                 <a:latin typeface="Times New Roman" panose="02020603050405020304" pitchFamily="18" charset="0"/>
                 <a:cs typeface="Times New Roman" panose="02020603050405020304" pitchFamily="18" charset="0"/>
               </a:rPr>
-              <a:t>&lt;- </a:t>
-            </a:r>
-            <a:r>
-              <a:rPr lang="en-US" sz="1600" dirty="0" err="1" smtClean="0">
-                <a:solidFill>
-                  <a:schemeClr val="tx1"/>
-                </a:solidFill>
-                <a:latin typeface="Times New Roman" panose="02020603050405020304" pitchFamily="18" charset="0"/>
-                <a:cs typeface="Times New Roman" panose="02020603050405020304" pitchFamily="18" charset="0"/>
-              </a:rPr>
-              <a:t>tfbs.selecteByRandom</a:t>
-            </a:r>
-            <a:r>
-              <a:rPr lang="en-US" sz="1600" dirty="0" smtClean="0">
-                <a:solidFill>
-                  <a:schemeClr val="tx1"/>
-                </a:solidFill>
-                <a:latin typeface="Times New Roman" panose="02020603050405020304" pitchFamily="18" charset="0"/>
-                <a:cs typeface="Times New Roman" panose="02020603050405020304" pitchFamily="18" charset="0"/>
-              </a:rPr>
               <a:t>(tfs1)</a:t>
             </a:r>
-            <a:endParaRPr lang="en-US" sz="1600" dirty="0" smtClean="0">
-              <a:solidFill>
-                <a:schemeClr val="tx1"/>
-              </a:solidFill>
-              <a:latin typeface="Times New Roman" panose="02020603050405020304" pitchFamily="18" charset="0"/>
-              <a:cs typeface="Times New Roman" panose="02020603050405020304" pitchFamily="18" charset="0"/>
-            </a:endParaRPr>
           </a:p>
           <a:p>
             <a:pPr marL="109728" indent="0">
@@ -7367,7 +7301,17 @@
                 <a:latin typeface="Times New Roman" panose="02020603050405020304" pitchFamily="18" charset="0"/>
                 <a:cs typeface="Times New Roman" panose="02020603050405020304" pitchFamily="18" charset="0"/>
               </a:rPr>
-              <a:t>tfs2 </a:t>
+              <a:t>tfs2 &lt;- </a:t>
+            </a:r>
+            <a:r>
+              <a:rPr lang="en-US" sz="1600" dirty="0" err="1" smtClean="0">
+                <a:solidFill>
+                  <a:schemeClr val="tx1"/>
+                </a:solidFill>
+                <a:latin typeface="Times New Roman" panose="02020603050405020304" pitchFamily="18" charset="0"/>
+                <a:cs typeface="Times New Roman" panose="02020603050405020304" pitchFamily="18" charset="0"/>
+              </a:rPr>
+              <a:t>tfbs.selecteByGeneExp</a:t>
             </a:r>
             <a:r>
               <a:rPr lang="en-US" sz="1600" dirty="0" smtClean="0">
@@ -7377,37 +7321,7 @@
                 <a:latin typeface="Times New Roman" panose="02020603050405020304" pitchFamily="18" charset="0"/>
                 <a:cs typeface="Times New Roman" panose="02020603050405020304" pitchFamily="18" charset="0"/>
               </a:rPr>
-              <a:t>&lt;- </a:t>
-            </a:r>
-            <a:r>
-              <a:rPr lang="en-US" sz="1600" dirty="0" err="1" smtClean="0">
-                <a:solidFill>
-                  <a:schemeClr val="tx1"/>
-                </a:solidFill>
-                <a:latin typeface="Times New Roman" panose="02020603050405020304" pitchFamily="18" charset="0"/>
-                <a:cs typeface="Times New Roman" panose="02020603050405020304" pitchFamily="18" charset="0"/>
-              </a:rPr>
-              <a:t>tfbs.selecteByGeneExp</a:t>
-            </a:r>
-            <a:r>
-              <a:rPr lang="en-US" sz="1600" dirty="0" smtClean="0">
-                <a:solidFill>
-                  <a:schemeClr val="tx1"/>
-                </a:solidFill>
-                <a:latin typeface="Times New Roman" panose="02020603050405020304" pitchFamily="18" charset="0"/>
-                <a:cs typeface="Times New Roman" panose="02020603050405020304" pitchFamily="18" charset="0"/>
-              </a:rPr>
-              <a:t> (</a:t>
-            </a:r>
-            <a:r>
-              <a:rPr lang="en-US" sz="1600" dirty="0" smtClean="0">
-                <a:solidFill>
-                  <a:schemeClr val="tx1"/>
-                </a:solidFill>
-                <a:latin typeface="Times New Roman" panose="02020603050405020304" pitchFamily="18" charset="0"/>
-                <a:cs typeface="Times New Roman" panose="02020603050405020304" pitchFamily="18" charset="0"/>
-              </a:rPr>
-              <a:t>tfs2)</a:t>
+              <a:t> (tfs2)</a:t>
             </a:r>
             <a:endParaRPr lang="en-US" sz="1600" dirty="0">
               <a:solidFill>
@@ -8504,7 +8418,7 @@
         </p:spPr>
         <p:txBody>
           <a:bodyPr>
-            <a:normAutofit fontScale="92500" lnSpcReduction="20000"/>
+            <a:normAutofit fontScale="85000" lnSpcReduction="20000"/>
           </a:bodyPr>
           <a:lstStyle/>
           <a:p>
@@ -8575,7 +8489,15 @@
             </a:pPr>
             <a:r>
               <a:rPr lang="en-US" sz="1600" dirty="0" smtClean="0"/>
-              <a:t>3. Four options are available for the output results.</a:t>
+              <a:t>3. </a:t>
+            </a:r>
+            <a:r>
+              <a:rPr lang="en-US" sz="1600" dirty="0" smtClean="0"/>
+              <a:t>Five </a:t>
+            </a:r>
+            <a:r>
+              <a:rPr lang="en-US" sz="1600" dirty="0" smtClean="0"/>
+              <a:t>options are available for the output results.</a:t>
             </a:r>
             <a:endParaRPr lang="en-US" sz="1600" dirty="0"/>
           </a:p>
@@ -8615,11 +8537,11 @@
             </a:r>
             <a:r>
               <a:rPr lang="en-US" sz="1600" dirty="0" smtClean="0"/>
-              <a:t>in        </a:t>
+              <a:t>in bed-formatted </a:t>
             </a:r>
             <a:r>
               <a:rPr lang="en-US" sz="1600" dirty="0"/>
-              <a:t>bed-formatted loci.</a:t>
+              <a:t>loci.</a:t>
             </a:r>
           </a:p>
           <a:p>
@@ -8633,11 +8555,15 @@
             </a:r>
             <a:r>
               <a:rPr lang="en-US" sz="1600" dirty="0"/>
-              <a:t>: returns the max(posterior) in each position </a:t>
+              <a:t>: returns the max(posterior) </a:t>
             </a:r>
             <a:r>
               <a:rPr lang="en-US" sz="1600" dirty="0" smtClean="0"/>
-              <a:t>in bed-formatted </a:t>
+              <a:t>in </a:t>
+            </a:r>
+            <a:r>
+              <a:rPr lang="en-US" sz="1600" dirty="0" smtClean="0"/>
+              <a:t>bed-formatted </a:t>
             </a:r>
             <a:r>
               <a:rPr lang="en-US" sz="1600" dirty="0"/>
@@ -8646,6 +8572,32 @@
             <a:r>
               <a:rPr lang="en-US" sz="1600" dirty="0" smtClean="0"/>
               <a:t>.</a:t>
+            </a:r>
+          </a:p>
+          <a:p>
+            <a:r>
+              <a:rPr lang="en-US" sz="1600" dirty="0" smtClean="0"/>
+              <a:t>(e) </a:t>
+            </a:r>
+            <a:r>
+              <a:rPr lang="en-US" sz="1600" dirty="0" err="1" smtClean="0"/>
+              <a:t>maxscore</a:t>
+            </a:r>
+            <a:r>
+              <a:rPr lang="en-US" sz="1600" dirty="0" smtClean="0"/>
+              <a:t>: </a:t>
+            </a:r>
+            <a:r>
+              <a:rPr lang="en-US" sz="1600" dirty="0"/>
+              <a:t>returns the </a:t>
+            </a:r>
+            <a:r>
+              <a:rPr lang="en-US" sz="1600" dirty="0" smtClean="0"/>
+              <a:t>max(posterior difference) </a:t>
+            </a:r>
+            <a:r>
+              <a:rPr lang="en-US" sz="1600" dirty="0"/>
+              <a:t>in bed-formatted loci.</a:t>
             </a:r>
           </a:p>
           <a:p>
@@ -12114,11 +12066,7 @@
             </a:r>
             <a:r>
               <a:rPr lang="en-US" sz="1600" dirty="0" smtClean="0"/>
-              <a:t> </a:t>
-            </a:r>
-            <a:r>
-              <a:rPr lang="en-US" sz="1600" dirty="0" smtClean="0"/>
-              <a:t>checks the mean </a:t>
+              <a:t> checks the mean </a:t>
             </a:r>
             <a:r>
               <a:rPr lang="en-US" sz="1600" dirty="0"/>
@@ -12376,15 +12324,7 @@
           <a:p>
             <a:r>
               <a:rPr lang="en-US" dirty="0" smtClean="0"/>
-              <a:t>Provides a framework to integrate the Cis-BP </a:t>
-            </a:r>
-            <a:r>
-              <a:rPr lang="en-US" dirty="0" smtClean="0"/>
-              <a:t>database and </a:t>
-            </a:r>
-            <a:r>
-              <a:rPr lang="en-US" dirty="0" smtClean="0"/>
-              <a:t>the statistical model in the </a:t>
+              <a:t>Provides a framework to integrate the Cis-BP database and the statistical model in the </a:t>
             </a:r>
             <a:r>
               <a:rPr lang="en-US" i="1" dirty="0" err="1" smtClean="0"/>
@@ -13065,13 +13005,6 @@
               </a:rPr>
               <a:t>, </a:t>
             </a:r>
-            <a:endParaRPr lang="en-US" sz="1600" dirty="0" smtClean="0">
-              <a:solidFill>
-                <a:schemeClr val="tx1"/>
-              </a:solidFill>
-              <a:latin typeface="Times New Roman" panose="02020603050405020304" pitchFamily="18" charset="0"/>
-              <a:cs typeface="Times New Roman" panose="02020603050405020304" pitchFamily="18" charset="0"/>
-            </a:endParaRPr>
           </a:p>
           <a:p>
             <a:pPr marL="109728" indent="0">
@@ -16404,13 +16337,8 @@
             </a:r>
             <a:r>
               <a:rPr lang="en-US" sz="2000" dirty="0" smtClean="0"/>
-              <a:t>TF_Information.txt) </a:t>
-            </a:r>
-            <a:r>
-              <a:rPr lang="en-US" sz="2000" dirty="0" smtClean="0"/>
-              <a:t>at the first step</a:t>
-            </a:r>
-            <a:endParaRPr lang="en-US" sz="2000" dirty="0" smtClean="0"/>
+              <a:t>TF_Information.txt) at the first step</a:t>
+            </a:r>
           </a:p>
           <a:p>
             <a:endParaRPr lang="en-US" dirty="0" smtClean="0"/>
@@ -19733,11 +19661,7 @@
             </a:r>
             <a:r>
               <a:rPr lang="en-US" altLang="zh-CN" sz="2000" dirty="0" smtClean="0"/>
-              <a:t>ternal motif </a:t>
-            </a:r>
-            <a:r>
-              <a:rPr lang="en-US" altLang="zh-CN" sz="2000" dirty="0" smtClean="0"/>
-              <a:t>data:</a:t>
+              <a:t>ternal motif data:</a:t>
             </a:r>
           </a:p>
           <a:p>
@@ -19746,11 +19670,7 @@
             </a:pPr>
             <a:r>
               <a:rPr lang="en-US" altLang="zh-CN" sz="2000" dirty="0" smtClean="0"/>
-              <a:t>Licensed </a:t>
-            </a:r>
-            <a:r>
-              <a:rPr lang="en-US" altLang="zh-CN" sz="2000" dirty="0" smtClean="0"/>
-              <a:t>PWM files for Cis-BP data set</a:t>
+              <a:t>Licensed PWM files for Cis-BP data set</a:t>
             </a:r>
           </a:p>
           <a:p>
@@ -19796,7 +19716,6 @@
               <a:rPr lang="en-US" altLang="zh-CN" sz="2000" dirty="0" smtClean="0"/>
               <a:t>User customized data file </a:t>
             </a:r>
-            <a:endParaRPr lang="en-US" altLang="zh-CN" sz="2000" dirty="0" smtClean="0"/>
           </a:p>
           <a:p>
             <a:pPr marL="109728" indent="0">

</xml_diff>

<commit_message>
example codes are improved
</commit_message>
<xml_diff>
--- a/rtfbsdb-tutorial.pptx
+++ b/rtfbsdb-tutorial.pptx
@@ -247,7 +247,7 @@
             <a:fld id="{68796EA6-6F25-4F19-87BA-7ADCC16DAEFF}" type="datetimeFigureOut">
               <a:rPr lang="en-US" smtClean="0"/>
               <a:pPr/>
-              <a:t>12/11/2015</a:t>
+              <a:t>12/17/2015</a:t>
             </a:fld>
             <a:endParaRPr lang="en-US" dirty="0"/>
           </a:p>
@@ -414,7 +414,7 @@
             <a:fld id="{C39C172E-A8B5-46F6-B05C-DFA3E2E0F207}" type="datetimeFigureOut">
               <a:rPr lang="en-US" smtClean="0"/>
               <a:pPr/>
-              <a:t>12/11/2015</a:t>
+              <a:t>12/17/2015</a:t>
             </a:fld>
             <a:endParaRPr lang="en-US" dirty="0"/>
           </a:p>
@@ -2112,7 +2112,7 @@
             <a:fld id="{4E708F12-96AD-4ED4-8132-A78F5E42C1F5}" type="datetime1">
               <a:rPr lang="en-US" smtClean="0"/>
               <a:pPr/>
-              <a:t>12/11/2015</a:t>
+              <a:t>12/17/2015</a:t>
             </a:fld>
             <a:endParaRPr lang="en-US" dirty="0"/>
           </a:p>
@@ -2336,7 +2336,7 @@
             <a:fld id="{7B7FA170-8299-44AD-AEEF-FC686C3D7804}" type="datetime1">
               <a:rPr lang="en-US" smtClean="0"/>
               <a:pPr/>
-              <a:t>12/11/2015</a:t>
+              <a:t>12/17/2015</a:t>
             </a:fld>
             <a:endParaRPr lang="en-US" dirty="0"/>
           </a:p>
@@ -2520,7 +2520,7 @@
             <a:fld id="{2231763A-68EC-4ECD-9620-D9FE9CDDD622}" type="datetime1">
               <a:rPr lang="en-US" smtClean="0"/>
               <a:pPr/>
-              <a:t>12/11/2015</a:t>
+              <a:t>12/17/2015</a:t>
             </a:fld>
             <a:endParaRPr lang="en-US" dirty="0"/>
           </a:p>
@@ -2714,7 +2714,7 @@
             <a:fld id="{7B98BEDD-6160-49BB-B372-861DE7DE9BA5}" type="datetime1">
               <a:rPr lang="en-US" smtClean="0"/>
               <a:pPr/>
-              <a:t>12/11/2015</a:t>
+              <a:t>12/17/2015</a:t>
             </a:fld>
             <a:endParaRPr lang="en-US" dirty="0"/>
           </a:p>
@@ -2898,7 +2898,7 @@
             <a:fld id="{0AAE819F-B7FD-4B29-8F66-9E318144BC2A}" type="datetime1">
               <a:rPr lang="en-US" smtClean="0"/>
               <a:pPr/>
-              <a:t>12/11/2015</a:t>
+              <a:t>12/17/2015</a:t>
             </a:fld>
             <a:endParaRPr lang="en-US" dirty="0"/>
           </a:p>
@@ -3132,7 +3132,7 @@
             <a:fld id="{D4CA159C-B6E0-4F10-9F4A-2FA57003B139}" type="datetime1">
               <a:rPr lang="en-US" smtClean="0"/>
               <a:pPr/>
-              <a:t>12/11/2015</a:t>
+              <a:t>12/17/2015</a:t>
             </a:fld>
             <a:endParaRPr lang="en-US" dirty="0"/>
           </a:p>
@@ -3426,7 +3426,7 @@
             <a:fld id="{8170CBBB-D1D1-4386-A5E9-07F3477B78F3}" type="datetime1">
               <a:rPr lang="en-US" smtClean="0"/>
               <a:pPr/>
-              <a:t>12/11/2015</a:t>
+              <a:t>12/17/2015</a:t>
             </a:fld>
             <a:endParaRPr lang="en-US" dirty="0"/>
           </a:p>
@@ -3856,7 +3856,7 @@
             <a:fld id="{9FA4CAD8-0EA7-4615-B69B-B2F199EF3A93}" type="datetime1">
               <a:rPr lang="en-US" smtClean="0"/>
               <a:pPr/>
-              <a:t>12/11/2015</a:t>
+              <a:t>12/17/2015</a:t>
             </a:fld>
             <a:endParaRPr lang="en-US" dirty="0"/>
           </a:p>
@@ -4011,7 +4011,7 @@
             <a:fld id="{B9234BD7-6953-492C-921B-E68B2D7F14C8}" type="datetime1">
               <a:rPr lang="en-US" smtClean="0"/>
               <a:pPr/>
-              <a:t>12/11/2015</a:t>
+              <a:t>12/17/2015</a:t>
             </a:fld>
             <a:endParaRPr lang="en-US" dirty="0"/>
           </a:p>
@@ -4120,7 +4120,7 @@
             <a:fld id="{35A17D9B-D4D3-4E23-88DF-2E354FA43196}" type="datetime1">
               <a:rPr lang="en-US" smtClean="0"/>
               <a:pPr/>
-              <a:t>12/11/2015</a:t>
+              <a:t>12/17/2015</a:t>
             </a:fld>
             <a:endParaRPr lang="en-US" dirty="0"/>
           </a:p>
@@ -4384,7 +4384,7 @@
             <a:fld id="{541F67C5-D04E-4576-B61C-12ABA14BBD6C}" type="datetime1">
               <a:rPr lang="en-US" smtClean="0"/>
               <a:pPr/>
-              <a:t>12/11/2015</a:t>
+              <a:t>12/17/2015</a:t>
             </a:fld>
             <a:endParaRPr lang="en-US" dirty="0"/>
           </a:p>
@@ -5286,7 +5286,7 @@
             <a:fld id="{C20F09E4-6EA4-4BF3-9FC8-FF40373B88E6}" type="datetime1">
               <a:rPr lang="en-US" smtClean="0"/>
               <a:pPr/>
-              <a:t>12/11/2015</a:t>
+              <a:t>12/17/2015</a:t>
             </a:fld>
             <a:endParaRPr lang="en-US" dirty="0"/>
           </a:p>
@@ -8489,15 +8489,7 @@
             </a:pPr>
             <a:r>
               <a:rPr lang="en-US" sz="1600" dirty="0" smtClean="0"/>
-              <a:t>3. </a:t>
-            </a:r>
-            <a:r>
-              <a:rPr lang="en-US" sz="1600" dirty="0" smtClean="0"/>
-              <a:t>Five </a:t>
-            </a:r>
-            <a:r>
-              <a:rPr lang="en-US" sz="1600" dirty="0" smtClean="0"/>
-              <a:t>options are available for the output results.</a:t>
+              <a:t>3. Five options are available for the output results.</a:t>
             </a:r>
             <a:endParaRPr lang="en-US" sz="1600" dirty="0"/>
           </a:p>
@@ -8559,11 +8551,7 @@
             </a:r>
             <a:r>
               <a:rPr lang="en-US" sz="1600" dirty="0" smtClean="0"/>
-              <a:t>in </a:t>
-            </a:r>
-            <a:r>
-              <a:rPr lang="en-US" sz="1600" dirty="0" smtClean="0"/>
-              <a:t>bed-formatted </a:t>
+              <a:t>in bed-formatted </a:t>
             </a:r>
             <a:r>
               <a:rPr lang="en-US" sz="1600" dirty="0"/>
@@ -9199,7 +9187,7 @@
               <a:t>("./</a:t>
             </a:r>
             <a:r>
-              <a:rPr lang="en-US" sz="1400" dirty="0" err="1">
+              <a:rPr lang="en-US" sz="1400" dirty="0" err="1" smtClean="0">
                 <a:solidFill>
                   <a:schemeClr val="tx1"/>
                 </a:solidFill>
@@ -9209,14 +9197,14 @@
               <a:t>dREG.H.change.bed</a:t>
             </a:r>
             <a:r>
-              <a:rPr lang="en-US" sz="1400" dirty="0">
-                <a:solidFill>
-                  <a:schemeClr val="tx1"/>
-                </a:solidFill>
-                <a:latin typeface="Times New Roman" panose="02020603050405020304" pitchFamily="18" charset="0"/>
-                <a:cs typeface="Times New Roman" panose="02020603050405020304" pitchFamily="18" charset="0"/>
-              </a:rPr>
-              <a:t> ", </a:t>
+              <a:rPr lang="en-US" sz="1400" dirty="0" smtClean="0">
+                <a:solidFill>
+                  <a:schemeClr val="tx1"/>
+                </a:solidFill>
+                <a:latin typeface="Times New Roman" panose="02020603050405020304" pitchFamily="18" charset="0"/>
+                <a:cs typeface="Times New Roman" panose="02020603050405020304" pitchFamily="18" charset="0"/>
+              </a:rPr>
+              <a:t>", </a:t>
             </a:r>
             <a:r>
               <a:rPr lang="en-US" sz="1400" dirty="0" smtClean="0">
@@ -9408,7 +9396,7 @@
               <a:t>="</a:t>
             </a:r>
             <a:r>
-              <a:rPr lang="en-US" sz="1400" i="1" dirty="0" err="1">
+              <a:rPr lang="en-US" sz="1400" i="1" dirty="0" err="1" smtClean="0">
                 <a:solidFill>
                   <a:schemeClr val="tx1"/>
                 </a:solidFill>
@@ -9425,17 +9413,7 @@
                 <a:latin typeface="Times New Roman" panose="02020603050405020304" pitchFamily="18" charset="0"/>
                 <a:cs typeface="Times New Roman" panose="02020603050405020304" pitchFamily="18" charset="0"/>
               </a:rPr>
-              <a:t> </a:t>
-            </a:r>
-            <a:r>
-              <a:rPr lang="en-US" sz="1400" dirty="0" smtClean="0">
-                <a:solidFill>
-                  <a:schemeClr val="tx1"/>
-                </a:solidFill>
-                <a:latin typeface="Times New Roman" panose="02020603050405020304" pitchFamily="18" charset="0"/>
-                <a:cs typeface="Times New Roman" panose="02020603050405020304" pitchFamily="18" charset="0"/>
-              </a:rPr>
-              <a:t>“, </a:t>
+              <a:t>", </a:t>
             </a:r>
             <a:r>
               <a:rPr lang="en-US" sz="1400" dirty="0" err="1" smtClean="0">
@@ -10258,10 +10236,30 @@
                 <a:latin typeface="Times New Roman" panose="02020603050405020304" pitchFamily="18" charset="0"/>
                 <a:cs typeface="Times New Roman" panose="02020603050405020304" pitchFamily="18" charset="0"/>
               </a:rPr>
-              <a:t>=“Scanning </a:t>
+              <a:t>=</a:t>
             </a:r>
             <a:r>
               <a:rPr lang="en-US" sz="1500" dirty="0">
+                <a:solidFill>
+                  <a:schemeClr val="tx1"/>
+                </a:solidFill>
+                <a:latin typeface="Times New Roman" panose="02020603050405020304" pitchFamily="18" charset="0"/>
+                <a:cs typeface="Times New Roman" panose="02020603050405020304" pitchFamily="18" charset="0"/>
+              </a:rPr>
+              <a:t>"</a:t>
+            </a:r>
+            <a:r>
+              <a:rPr lang="en-US" sz="1500" dirty="0" smtClean="0">
+                <a:solidFill>
+                  <a:schemeClr val="tx1"/>
+                </a:solidFill>
+                <a:latin typeface="Times New Roman" panose="02020603050405020304" pitchFamily="18" charset="0"/>
+                <a:cs typeface="Times New Roman" panose="02020603050405020304" pitchFamily="18" charset="0"/>
+              </a:rPr>
+              <a:t>Scanning </a:t>
+            </a:r>
+            <a:r>
+              <a:rPr lang="en-US" sz="1500" dirty="0" smtClean="0">
                 <a:solidFill>
                   <a:schemeClr val="tx1"/>
                 </a:solidFill>
@@ -11885,24 +11883,14 @@
               <a:t>file.prefix</a:t>
             </a:r>
             <a:r>
-              <a:rPr lang="en-US" dirty="0" smtClean="0">
-                <a:solidFill>
-                  <a:schemeClr val="tx1"/>
-                </a:solidFill>
-                <a:latin typeface="Times New Roman" panose="02020603050405020304" pitchFamily="18" charset="0"/>
-                <a:cs typeface="Times New Roman" panose="02020603050405020304" pitchFamily="18" charset="0"/>
-              </a:rPr>
-              <a:t>=“</a:t>
-            </a:r>
-            <a:r>
-              <a:rPr lang="en-US" dirty="0" err="1" smtClean="0">
-                <a:solidFill>
-                  <a:schemeClr val="tx1"/>
-                </a:solidFill>
-                <a:latin typeface="Times New Roman" panose="02020603050405020304" pitchFamily="18" charset="0"/>
-                <a:cs typeface="Times New Roman" panose="02020603050405020304" pitchFamily="18" charset="0"/>
-              </a:rPr>
-              <a:t>enrich.db</a:t>
+              <a:rPr lang="en-US">
+                <a:solidFill>
+                  <a:schemeClr val="tx1"/>
+                </a:solidFill>
+                <a:latin typeface="Times New Roman" panose="02020603050405020304" pitchFamily="18" charset="0"/>
+                <a:cs typeface="Times New Roman" panose="02020603050405020304" pitchFamily="18" charset="0"/>
+              </a:rPr>
+              <a:t>="enrich.db</a:t>
             </a:r>
             <a:r>
               <a:rPr lang="en-US" dirty="0">
@@ -15281,62 +15269,6 @@
             </a:r>
           </a:p>
           <a:p>
-            <a:pPr marL="109728" marR="0" lvl="0" indent="0" algn="l" defTabSz="914400" rtl="0" eaLnBrk="1" fontAlgn="auto" latinLnBrk="0" hangingPunct="1">
-              <a:lnSpc>
-                <a:spcPct val="100000"/>
-              </a:lnSpc>
-              <a:spcBef>
-                <a:spcPts val="300"/>
-              </a:spcBef>
-              <a:spcAft>
-                <a:spcPts val="0"/>
-              </a:spcAft>
-              <a:buClr>
-                <a:schemeClr val="accent3"/>
-              </a:buClr>
-              <a:buSzTx/>
-              <a:buFont typeface="Georgia"/>
-              <a:buNone/>
-              <a:tabLst/>
-              <a:defRPr/>
-            </a:pPr>
-            <a:r>
-              <a:rPr lang="en-US" sz="1600" dirty="0" smtClean="0">
-                <a:latin typeface="Times New Roman" pitchFamily="18" charset="0"/>
-                <a:cs typeface="Times New Roman" pitchFamily="18" charset="0"/>
-              </a:rPr>
-              <a:t>    &gt;</a:t>
-            </a:r>
-            <a:r>
-              <a:rPr lang="en-US" sz="1600" dirty="0" err="1" smtClean="0">
-                <a:latin typeface="Times New Roman" pitchFamily="18" charset="0"/>
-                <a:cs typeface="Times New Roman" pitchFamily="18" charset="0"/>
-              </a:rPr>
-              <a:t>install.packages</a:t>
-            </a:r>
-            <a:r>
-              <a:rPr lang="en-US" sz="1600" dirty="0" smtClean="0">
-                <a:latin typeface="Times New Roman" pitchFamily="18" charset="0"/>
-                <a:cs typeface="Times New Roman" pitchFamily="18" charset="0"/>
-              </a:rPr>
-              <a:t>(“</a:t>
-            </a:r>
-            <a:r>
-              <a:rPr lang="en-US" sz="1600" dirty="0" err="1" smtClean="0">
-                <a:latin typeface="Times New Roman" pitchFamily="18" charset="0"/>
-                <a:cs typeface="Times New Roman" pitchFamily="18" charset="0"/>
-              </a:rPr>
-              <a:t>rphase</a:t>
-            </a:r>
-            <a:r>
-              <a:rPr lang="en-US" sz="1600" dirty="0" smtClean="0">
-                <a:latin typeface="Times New Roman" pitchFamily="18" charset="0"/>
-                <a:cs typeface="Times New Roman" pitchFamily="18" charset="0"/>
-              </a:rPr>
-              <a:t>”);</a:t>
-            </a:r>
-          </a:p>
-          <a:p>
             <a:pPr marL="109728" lvl="0">
               <a:spcBef>
                 <a:spcPts val="300"/>
@@ -15344,6 +15276,60 @@
               <a:buClr>
                 <a:schemeClr val="accent3"/>
               </a:buClr>
+              <a:defRPr/>
+            </a:pPr>
+            <a:r>
+              <a:rPr lang="en-US" sz="1600" dirty="0" smtClean="0">
+                <a:latin typeface="Times New Roman" pitchFamily="18" charset="0"/>
+                <a:cs typeface="Times New Roman" pitchFamily="18" charset="0"/>
+              </a:rPr>
+              <a:t>    </a:t>
+            </a:r>
+            <a:r>
+              <a:rPr lang="en-US" sz="1600" dirty="0">
+                <a:latin typeface="Times New Roman" pitchFamily="18" charset="0"/>
+                <a:cs typeface="Times New Roman" pitchFamily="18" charset="0"/>
+              </a:rPr>
+              <a:t>&gt;</a:t>
+            </a:r>
+            <a:r>
+              <a:rPr lang="en-US" sz="1600" dirty="0" err="1">
+                <a:latin typeface="Times New Roman" pitchFamily="18" charset="0"/>
+                <a:cs typeface="Times New Roman" pitchFamily="18" charset="0"/>
+              </a:rPr>
+              <a:t>install.packages</a:t>
+            </a:r>
+            <a:r>
+              <a:rPr lang="en-US" sz="1600" dirty="0">
+                <a:latin typeface="Times New Roman" pitchFamily="18" charset="0"/>
+                <a:cs typeface="Times New Roman" pitchFamily="18" charset="0"/>
+              </a:rPr>
+              <a:t>("</a:t>
+            </a:r>
+            <a:r>
+              <a:rPr lang="en-US" sz="1600" dirty="0" err="1">
+                <a:latin typeface="Times New Roman" pitchFamily="18" charset="0"/>
+                <a:cs typeface="Times New Roman" pitchFamily="18" charset="0"/>
+              </a:rPr>
+              <a:t>rphast</a:t>
+            </a:r>
+            <a:r>
+              <a:rPr lang="en-US" sz="1600" dirty="0" smtClean="0">
+                <a:latin typeface="Times New Roman" pitchFamily="18" charset="0"/>
+                <a:cs typeface="Times New Roman" pitchFamily="18" charset="0"/>
+              </a:rPr>
+              <a:t>");</a:t>
+            </a:r>
+          </a:p>
+          <a:p>
+            <a:pPr marL="109728" lvl="0">
+              <a:spcBef>
+                <a:spcPts val="300"/>
+              </a:spcBef>
+              <a:buClr>
+                <a:schemeClr val="accent3"/>
+              </a:buClr>
+              <a:defRPr/>
             </a:pPr>
             <a:r>
               <a:rPr kumimoji="0" lang="en-US" sz="1600" b="0" i="0" u="none" strike="noStrike" kern="1200" cap="none" spc="0" normalizeH="0" baseline="0" noProof="0" dirty="0" smtClean="0">
@@ -15380,7 +15366,21 @@
                 <a:latin typeface="Times New Roman" pitchFamily="18" charset="0"/>
                 <a:cs typeface="Times New Roman" pitchFamily="18" charset="0"/>
               </a:rPr>
-              <a:t>(“…”);</a:t>
+              <a:t>(</a:t>
+            </a:r>
+            <a:r>
+              <a:rPr lang="en-US" sz="1600" dirty="0">
+                <a:latin typeface="Times New Roman" pitchFamily="18" charset="0"/>
+                <a:cs typeface="Times New Roman" pitchFamily="18" charset="0"/>
+              </a:rPr>
+              <a:t>"</a:t>
+            </a:r>
+            <a:r>
+              <a:rPr lang="en-US" sz="1600" dirty="0" smtClean="0">
+                <a:latin typeface="Times New Roman" pitchFamily="18" charset="0"/>
+                <a:cs typeface="Times New Roman" pitchFamily="18" charset="0"/>
+              </a:rPr>
+              <a:t>…");</a:t>
             </a:r>
             <a:endParaRPr kumimoji="0" lang="en-US" sz="1600" b="0" i="0" u="none" strike="noStrike" kern="1200" cap="none" spc="0" normalizeH="0" baseline="0" noProof="0" dirty="0" smtClean="0">
               <a:ln>

</xml_diff>

<commit_message>
some bugs in PPT
</commit_message>
<xml_diff>
--- a/rtfbsdb-tutorial.pptx
+++ b/rtfbsdb-tutorial.pptx
@@ -247,7 +247,7 @@
             <a:fld id="{68796EA6-6F25-4F19-87BA-7ADCC16DAEFF}" type="datetimeFigureOut">
               <a:rPr lang="en-US" smtClean="0"/>
               <a:pPr/>
-              <a:t>12/17/2015</a:t>
+              <a:t>12/22/2015</a:t>
             </a:fld>
             <a:endParaRPr lang="en-US" dirty="0"/>
           </a:p>
@@ -414,7 +414,7 @@
             <a:fld id="{C39C172E-A8B5-46F6-B05C-DFA3E2E0F207}" type="datetimeFigureOut">
               <a:rPr lang="en-US" smtClean="0"/>
               <a:pPr/>
-              <a:t>12/17/2015</a:t>
+              <a:t>12/22/2015</a:t>
             </a:fld>
             <a:endParaRPr lang="en-US" dirty="0"/>
           </a:p>
@@ -2112,7 +2112,7 @@
             <a:fld id="{4E708F12-96AD-4ED4-8132-A78F5E42C1F5}" type="datetime1">
               <a:rPr lang="en-US" smtClean="0"/>
               <a:pPr/>
-              <a:t>12/17/2015</a:t>
+              <a:t>12/22/2015</a:t>
             </a:fld>
             <a:endParaRPr lang="en-US" dirty="0"/>
           </a:p>
@@ -2336,7 +2336,7 @@
             <a:fld id="{7B7FA170-8299-44AD-AEEF-FC686C3D7804}" type="datetime1">
               <a:rPr lang="en-US" smtClean="0"/>
               <a:pPr/>
-              <a:t>12/17/2015</a:t>
+              <a:t>12/22/2015</a:t>
             </a:fld>
             <a:endParaRPr lang="en-US" dirty="0"/>
           </a:p>
@@ -2520,7 +2520,7 @@
             <a:fld id="{2231763A-68EC-4ECD-9620-D9FE9CDDD622}" type="datetime1">
               <a:rPr lang="en-US" smtClean="0"/>
               <a:pPr/>
-              <a:t>12/17/2015</a:t>
+              <a:t>12/22/2015</a:t>
             </a:fld>
             <a:endParaRPr lang="en-US" dirty="0"/>
           </a:p>
@@ -2714,7 +2714,7 @@
             <a:fld id="{7B98BEDD-6160-49BB-B372-861DE7DE9BA5}" type="datetime1">
               <a:rPr lang="en-US" smtClean="0"/>
               <a:pPr/>
-              <a:t>12/17/2015</a:t>
+              <a:t>12/22/2015</a:t>
             </a:fld>
             <a:endParaRPr lang="en-US" dirty="0"/>
           </a:p>
@@ -2898,7 +2898,7 @@
             <a:fld id="{0AAE819F-B7FD-4B29-8F66-9E318144BC2A}" type="datetime1">
               <a:rPr lang="en-US" smtClean="0"/>
               <a:pPr/>
-              <a:t>12/17/2015</a:t>
+              <a:t>12/22/2015</a:t>
             </a:fld>
             <a:endParaRPr lang="en-US" dirty="0"/>
           </a:p>
@@ -3132,7 +3132,7 @@
             <a:fld id="{D4CA159C-B6E0-4F10-9F4A-2FA57003B139}" type="datetime1">
               <a:rPr lang="en-US" smtClean="0"/>
               <a:pPr/>
-              <a:t>12/17/2015</a:t>
+              <a:t>12/22/2015</a:t>
             </a:fld>
             <a:endParaRPr lang="en-US" dirty="0"/>
           </a:p>
@@ -3426,7 +3426,7 @@
             <a:fld id="{8170CBBB-D1D1-4386-A5E9-07F3477B78F3}" type="datetime1">
               <a:rPr lang="en-US" smtClean="0"/>
               <a:pPr/>
-              <a:t>12/17/2015</a:t>
+              <a:t>12/22/2015</a:t>
             </a:fld>
             <a:endParaRPr lang="en-US" dirty="0"/>
           </a:p>
@@ -3856,7 +3856,7 @@
             <a:fld id="{9FA4CAD8-0EA7-4615-B69B-B2F199EF3A93}" type="datetime1">
               <a:rPr lang="en-US" smtClean="0"/>
               <a:pPr/>
-              <a:t>12/17/2015</a:t>
+              <a:t>12/22/2015</a:t>
             </a:fld>
             <a:endParaRPr lang="en-US" dirty="0"/>
           </a:p>
@@ -4011,7 +4011,7 @@
             <a:fld id="{B9234BD7-6953-492C-921B-E68B2D7F14C8}" type="datetime1">
               <a:rPr lang="en-US" smtClean="0"/>
               <a:pPr/>
-              <a:t>12/17/2015</a:t>
+              <a:t>12/22/2015</a:t>
             </a:fld>
             <a:endParaRPr lang="en-US" dirty="0"/>
           </a:p>
@@ -4120,7 +4120,7 @@
             <a:fld id="{35A17D9B-D4D3-4E23-88DF-2E354FA43196}" type="datetime1">
               <a:rPr lang="en-US" smtClean="0"/>
               <a:pPr/>
-              <a:t>12/17/2015</a:t>
+              <a:t>12/22/2015</a:t>
             </a:fld>
             <a:endParaRPr lang="en-US" dirty="0"/>
           </a:p>
@@ -4384,7 +4384,7 @@
             <a:fld id="{541F67C5-D04E-4576-B61C-12ABA14BBD6C}" type="datetime1">
               <a:rPr lang="en-US" smtClean="0"/>
               <a:pPr/>
-              <a:t>12/17/2015</a:t>
+              <a:t>12/22/2015</a:t>
             </a:fld>
             <a:endParaRPr lang="en-US" dirty="0"/>
           </a:p>
@@ -5286,7 +5286,7 @@
             <a:fld id="{C20F09E4-6EA4-4BF3-9FC8-FF40373B88E6}" type="datetime1">
               <a:rPr lang="en-US" smtClean="0"/>
               <a:pPr/>
-              <a:t>12/17/2015</a:t>
+              <a:t>12/22/2015</a:t>
             </a:fld>
             <a:endParaRPr lang="en-US" dirty="0"/>
           </a:p>
@@ -6867,39 +6867,6 @@
       </p:grpSpPr>
       <p:pic>
         <p:nvPicPr>
-          <p:cNvPr id="6" name="officeArt object"/>
-          <p:cNvPicPr>
-            <a:picLocks noGrp="1"/>
-          </p:cNvPicPr>
-          <p:nvPr>
-            <p:ph sz="half" idx="2"/>
-          </p:nvPr>
-        </p:nvPicPr>
-        <p:blipFill>
-          <a:blip r:embed="rId2">
-            <a:extLst/>
-          </a:blip>
-          <a:stretch>
-            <a:fillRect/>
-          </a:stretch>
-        </p:blipFill>
-        <p:spPr>
-          <a:xfrm>
-            <a:off x="6682632" y="2051001"/>
-            <a:ext cx="4358750" cy="4341812"/>
-          </a:xfrm>
-          <a:prstGeom prst="rect">
-            <a:avLst/>
-          </a:prstGeom>
-          <a:ln w="12700" cap="flat">
-            <a:noFill/>
-            <a:miter lim="400000"/>
-          </a:ln>
-          <a:effectLst/>
-        </p:spPr>
-      </p:pic>
-      <p:pic>
-        <p:nvPicPr>
           <p:cNvPr id="7" name="officeArt object"/>
           <p:cNvPicPr>
             <a:picLocks noGrp="1"/>
@@ -6909,7 +6876,7 @@
           </p:nvPr>
         </p:nvPicPr>
         <p:blipFill>
-          <a:blip r:embed="rId3">
+          <a:blip r:embed="rId2">
             <a:extLst/>
           </a:blip>
           <a:stretch>
@@ -6977,6 +6944,49 @@
           </a:p>
         </p:txBody>
       </p:sp>
+      <p:sp>
+        <p:nvSpPr>
+          <p:cNvPr id="4" name="Content Placeholder 3"/>
+          <p:cNvSpPr>
+            <a:spLocks noGrp="1"/>
+          </p:cNvSpPr>
+          <p:nvPr>
+            <p:ph sz="half" idx="2"/>
+          </p:nvPr>
+        </p:nvSpPr>
+        <p:spPr/>
+        <p:txBody>
+          <a:bodyPr/>
+          <a:lstStyle/>
+          <a:p>
+            <a:endParaRPr lang="en-US"/>
+          </a:p>
+        </p:txBody>
+      </p:sp>
+      <p:pic>
+        <p:nvPicPr>
+          <p:cNvPr id="5" name="Picture 4"/>
+          <p:cNvPicPr>
+            <a:picLocks noChangeAspect="1"/>
+          </p:cNvPicPr>
+          <p:nvPr/>
+        </p:nvPicPr>
+        <p:blipFill>
+          <a:blip r:embed="rId3"/>
+          <a:stretch>
+            <a:fillRect/>
+          </a:stretch>
+        </p:blipFill>
+        <p:spPr>
+          <a:xfrm>
+            <a:off x="6685393" y="2192620"/>
+            <a:ext cx="4409213" cy="4398680"/>
+          </a:xfrm>
+          <a:prstGeom prst="rect">
+            <a:avLst/>
+          </a:prstGeom>
+        </p:spPr>
+      </p:pic>
     </p:spTree>
     <p:extLst>
       <p:ext uri="{BB962C8B-B14F-4D97-AF65-F5344CB8AC3E}">
@@ -9204,17 +9214,7 @@
                 <a:latin typeface="Times New Roman" panose="02020603050405020304" pitchFamily="18" charset="0"/>
                 <a:cs typeface="Times New Roman" panose="02020603050405020304" pitchFamily="18" charset="0"/>
               </a:rPr>
-              <a:t>", </a:t>
-            </a:r>
-            <a:r>
-              <a:rPr lang="en-US" sz="1400" dirty="0" smtClean="0">
-                <a:solidFill>
-                  <a:schemeClr val="tx1"/>
-                </a:solidFill>
-                <a:latin typeface="Times New Roman" panose="02020603050405020304" pitchFamily="18" charset="0"/>
-                <a:cs typeface="Times New Roman" panose="02020603050405020304" pitchFamily="18" charset="0"/>
-              </a:rPr>
-              <a:t>	header=FALSE, threshold=8);</a:t>
+              <a:t>", 	header=FALSE, threshold=8);</a:t>
             </a:r>
           </a:p>
           <a:p>
@@ -10256,17 +10256,7 @@
                 <a:latin typeface="Times New Roman" panose="02020603050405020304" pitchFamily="18" charset="0"/>
                 <a:cs typeface="Times New Roman" panose="02020603050405020304" pitchFamily="18" charset="0"/>
               </a:rPr>
-              <a:t>Scanning </a:t>
-            </a:r>
-            <a:r>
-              <a:rPr lang="en-US" sz="1500" dirty="0" smtClean="0">
-                <a:solidFill>
-                  <a:schemeClr val="tx1"/>
-                </a:solidFill>
-                <a:latin typeface="Times New Roman" panose="02020603050405020304" pitchFamily="18" charset="0"/>
-                <a:cs typeface="Times New Roman" panose="02020603050405020304" pitchFamily="18" charset="0"/>
-              </a:rPr>
-              <a:t>Results");</a:t>
+              <a:t>Scanning Results");</a:t>
             </a:r>
             <a:endParaRPr lang="en-US" dirty="0" smtClean="0"/>
           </a:p>
@@ -11606,22 +11596,7 @@
                 <a:latin typeface="Times New Roman" panose="02020603050405020304" pitchFamily="18" charset="0"/>
                 <a:cs typeface="Times New Roman" panose="02020603050405020304" pitchFamily="18" charset="0"/>
               </a:rPr>
-              <a:t># Compare motifs between each condition</a:t>
-            </a:r>
-          </a:p>
-          <a:p>
-            <a:pPr marL="109728" indent="0">
-              <a:buNone/>
-            </a:pPr>
-            <a:r>
-              <a:rPr lang="en-US" dirty="0" err="1" smtClean="0">
-                <a:solidFill>
-                  <a:schemeClr val="tx1"/>
-                </a:solidFill>
-                <a:latin typeface="Times New Roman" panose="02020603050405020304" pitchFamily="18" charset="0"/>
-                <a:cs typeface="Times New Roman" panose="02020603050405020304" pitchFamily="18" charset="0"/>
-              </a:rPr>
-              <a:t>t.comp</a:t>
+              <a:t># Compare motifs between </a:t>
             </a:r>
             <a:r>
               <a:rPr lang="en-US" dirty="0" smtClean="0">
@@ -11631,137 +11606,7 @@
                 <a:latin typeface="Times New Roman" panose="02020603050405020304" pitchFamily="18" charset="0"/>
                 <a:cs typeface="Times New Roman" panose="02020603050405020304" pitchFamily="18" charset="0"/>
               </a:rPr>
-              <a:t> </a:t>
-            </a:r>
-            <a:r>
-              <a:rPr lang="en-US" dirty="0">
-                <a:solidFill>
-                  <a:schemeClr val="tx1"/>
-                </a:solidFill>
-                <a:latin typeface="Times New Roman" panose="02020603050405020304" pitchFamily="18" charset="0"/>
-                <a:cs typeface="Times New Roman" panose="02020603050405020304" pitchFamily="18" charset="0"/>
-              </a:rPr>
-              <a:t>&lt;- </a:t>
-            </a:r>
-            <a:r>
-              <a:rPr lang="en-US" dirty="0" err="1" smtClean="0">
-                <a:solidFill>
-                  <a:schemeClr val="tx1"/>
-                </a:solidFill>
-                <a:latin typeface="Times New Roman" panose="02020603050405020304" pitchFamily="18" charset="0"/>
-                <a:cs typeface="Times New Roman" panose="02020603050405020304" pitchFamily="18" charset="0"/>
-              </a:rPr>
-              <a:t>tfbs.enrichmentTest</a:t>
-            </a:r>
-            <a:r>
-              <a:rPr lang="en-US" dirty="0" smtClean="0">
-                <a:solidFill>
-                  <a:schemeClr val="tx1"/>
-                </a:solidFill>
-                <a:latin typeface="Times New Roman" panose="02020603050405020304" pitchFamily="18" charset="0"/>
-                <a:cs typeface="Times New Roman" panose="02020603050405020304" pitchFamily="18" charset="0"/>
-              </a:rPr>
-              <a:t>( </a:t>
-            </a:r>
-            <a:r>
-              <a:rPr lang="en-US" dirty="0" err="1">
-                <a:solidFill>
-                  <a:schemeClr val="tx1"/>
-                </a:solidFill>
-                <a:latin typeface="Times New Roman" panose="02020603050405020304" pitchFamily="18" charset="0"/>
-                <a:cs typeface="Times New Roman" panose="02020603050405020304" pitchFamily="18" charset="0"/>
-              </a:rPr>
-              <a:t>tfs</a:t>
-            </a:r>
-            <a:r>
-              <a:rPr lang="en-US" dirty="0">
-                <a:solidFill>
-                  <a:schemeClr val="tx1"/>
-                </a:solidFill>
-                <a:latin typeface="Times New Roman" panose="02020603050405020304" pitchFamily="18" charset="0"/>
-                <a:cs typeface="Times New Roman" panose="02020603050405020304" pitchFamily="18" charset="0"/>
-              </a:rPr>
-              <a:t>, </a:t>
-            </a:r>
-          </a:p>
-          <a:p>
-            <a:pPr marL="109728" indent="0">
-              <a:buNone/>
-            </a:pPr>
-            <a:r>
-              <a:rPr lang="en-US" dirty="0">
-                <a:solidFill>
-                  <a:schemeClr val="tx1"/>
-                </a:solidFill>
-                <a:latin typeface="Times New Roman" panose="02020603050405020304" pitchFamily="18" charset="0"/>
-                <a:cs typeface="Times New Roman" panose="02020603050405020304" pitchFamily="18" charset="0"/>
-              </a:rPr>
-              <a:t>      </a:t>
-            </a:r>
-            <a:r>
-              <a:rPr lang="en-US" dirty="0" err="1">
-                <a:solidFill>
-                  <a:schemeClr val="tx1"/>
-                </a:solidFill>
-                <a:latin typeface="Times New Roman" panose="02020603050405020304" pitchFamily="18" charset="0"/>
-                <a:cs typeface="Times New Roman" panose="02020603050405020304" pitchFamily="18" charset="0"/>
-              </a:rPr>
-              <a:t>file.twoBit</a:t>
-            </a:r>
-            <a:r>
-              <a:rPr lang="en-US" dirty="0">
-                <a:solidFill>
-                  <a:schemeClr val="tx1"/>
-                </a:solidFill>
-                <a:latin typeface="Times New Roman" panose="02020603050405020304" pitchFamily="18" charset="0"/>
-                <a:cs typeface="Times New Roman" panose="02020603050405020304" pitchFamily="18" charset="0"/>
-              </a:rPr>
-              <a:t>, </a:t>
-            </a:r>
-          </a:p>
-          <a:p>
-            <a:pPr marL="109728" indent="0">
-              <a:buNone/>
-            </a:pPr>
-            <a:r>
-              <a:rPr lang="en-US" dirty="0">
-                <a:solidFill>
-                  <a:schemeClr val="tx1"/>
-                </a:solidFill>
-                <a:latin typeface="Times New Roman" panose="02020603050405020304" pitchFamily="18" charset="0"/>
-                <a:cs typeface="Times New Roman" panose="02020603050405020304" pitchFamily="18" charset="0"/>
-              </a:rPr>
-              <a:t>   </a:t>
-            </a:r>
-            <a:r>
-              <a:rPr lang="en-US" dirty="0" smtClean="0">
-                <a:solidFill>
-                  <a:schemeClr val="tx1"/>
-                </a:solidFill>
-                <a:latin typeface="Times New Roman" panose="02020603050405020304" pitchFamily="18" charset="0"/>
-                <a:cs typeface="Times New Roman" panose="02020603050405020304" pitchFamily="18" charset="0"/>
-              </a:rPr>
-              <a:t>   </a:t>
-            </a:r>
-            <a:r>
-              <a:rPr lang="en-US" dirty="0" err="1" smtClean="0">
-                <a:solidFill>
-                  <a:schemeClr val="tx1"/>
-                </a:solidFill>
-                <a:latin typeface="Times New Roman" panose="02020603050405020304" pitchFamily="18" charset="0"/>
-                <a:cs typeface="Times New Roman" panose="02020603050405020304" pitchFamily="18" charset="0"/>
-              </a:rPr>
-              <a:t>pos.bed</a:t>
-            </a:r>
-            <a:r>
-              <a:rPr lang="en-US" dirty="0" smtClean="0">
-                <a:solidFill>
-                  <a:schemeClr val="tx1"/>
-                </a:solidFill>
-                <a:latin typeface="Times New Roman" panose="02020603050405020304" pitchFamily="18" charset="0"/>
-                <a:cs typeface="Times New Roman" panose="02020603050405020304" pitchFamily="18" charset="0"/>
-              </a:rPr>
-              <a:t>, </a:t>
+              <a:t>two conditions</a:t>
             </a:r>
             <a:endParaRPr lang="en-US" dirty="0">
               <a:solidFill>
@@ -11776,6 +11621,26 @@
               <a:buNone/>
             </a:pPr>
             <a:r>
+              <a:rPr lang="en-US" dirty="0" err="1" smtClean="0">
+                <a:solidFill>
+                  <a:schemeClr val="tx1"/>
+                </a:solidFill>
+                <a:latin typeface="Times New Roman" panose="02020603050405020304" pitchFamily="18" charset="0"/>
+                <a:cs typeface="Times New Roman" panose="02020603050405020304" pitchFamily="18" charset="0"/>
+              </a:rPr>
+              <a:t>t.comp</a:t>
+            </a:r>
+            <a:r>
+              <a:rPr lang="en-US" dirty="0" smtClean="0">
+                <a:solidFill>
+                  <a:schemeClr val="tx1"/>
+                </a:solidFill>
+                <a:latin typeface="Times New Roman" panose="02020603050405020304" pitchFamily="18" charset="0"/>
+                <a:cs typeface="Times New Roman" panose="02020603050405020304" pitchFamily="18" charset="0"/>
+              </a:rPr>
+              <a:t> </a:t>
+            </a:r>
+            <a:r>
               <a:rPr lang="en-US" dirty="0">
                 <a:solidFill>
                   <a:schemeClr val="tx1"/>
@@ -11783,7 +11648,17 @@
                 <a:latin typeface="Times New Roman" panose="02020603050405020304" pitchFamily="18" charset="0"/>
                 <a:cs typeface="Times New Roman" panose="02020603050405020304" pitchFamily="18" charset="0"/>
               </a:rPr>
-              <a:t> </a:t>
+              <a:t>&lt;- </a:t>
+            </a:r>
+            <a:r>
+              <a:rPr lang="en-US" dirty="0" err="1" smtClean="0">
+                <a:solidFill>
+                  <a:schemeClr val="tx1"/>
+                </a:solidFill>
+                <a:latin typeface="Times New Roman" panose="02020603050405020304" pitchFamily="18" charset="0"/>
+                <a:cs typeface="Times New Roman" panose="02020603050405020304" pitchFamily="18" charset="0"/>
+              </a:rPr>
+              <a:t>tfbs.enrichmentTest</a:t>
             </a:r>
             <a:r>
               <a:rPr lang="en-US" dirty="0" smtClean="0">
@@ -11793,7 +11668,87 @@
                 <a:latin typeface="Times New Roman" panose="02020603050405020304" pitchFamily="18" charset="0"/>
                 <a:cs typeface="Times New Roman" panose="02020603050405020304" pitchFamily="18" charset="0"/>
               </a:rPr>
-              <a:t>     </a:t>
+              <a:t>( </a:t>
+            </a:r>
+            <a:r>
+              <a:rPr lang="en-US" dirty="0" err="1">
+                <a:solidFill>
+                  <a:schemeClr val="tx1"/>
+                </a:solidFill>
+                <a:latin typeface="Times New Roman" panose="02020603050405020304" pitchFamily="18" charset="0"/>
+                <a:cs typeface="Times New Roman" panose="02020603050405020304" pitchFamily="18" charset="0"/>
+              </a:rPr>
+              <a:t>tfs</a:t>
+            </a:r>
+            <a:r>
+              <a:rPr lang="en-US" dirty="0">
+                <a:solidFill>
+                  <a:schemeClr val="tx1"/>
+                </a:solidFill>
+                <a:latin typeface="Times New Roman" panose="02020603050405020304" pitchFamily="18" charset="0"/>
+                <a:cs typeface="Times New Roman" panose="02020603050405020304" pitchFamily="18" charset="0"/>
+              </a:rPr>
+              <a:t>, </a:t>
+            </a:r>
+          </a:p>
+          <a:p>
+            <a:pPr marL="109728" indent="0">
+              <a:buNone/>
+            </a:pPr>
+            <a:r>
+              <a:rPr lang="en-US" dirty="0">
+                <a:solidFill>
+                  <a:schemeClr val="tx1"/>
+                </a:solidFill>
+                <a:latin typeface="Times New Roman" panose="02020603050405020304" pitchFamily="18" charset="0"/>
+                <a:cs typeface="Times New Roman" panose="02020603050405020304" pitchFamily="18" charset="0"/>
+              </a:rPr>
+              <a:t>      </a:t>
+            </a:r>
+            <a:r>
+              <a:rPr lang="en-US" dirty="0" err="1">
+                <a:solidFill>
+                  <a:schemeClr val="tx1"/>
+                </a:solidFill>
+                <a:latin typeface="Times New Roman" panose="02020603050405020304" pitchFamily="18" charset="0"/>
+                <a:cs typeface="Times New Roman" panose="02020603050405020304" pitchFamily="18" charset="0"/>
+              </a:rPr>
+              <a:t>file.twoBit</a:t>
+            </a:r>
+            <a:r>
+              <a:rPr lang="en-US" dirty="0">
+                <a:solidFill>
+                  <a:schemeClr val="tx1"/>
+                </a:solidFill>
+                <a:latin typeface="Times New Roman" panose="02020603050405020304" pitchFamily="18" charset="0"/>
+                <a:cs typeface="Times New Roman" panose="02020603050405020304" pitchFamily="18" charset="0"/>
+              </a:rPr>
+              <a:t>, </a:t>
+            </a:r>
+          </a:p>
+          <a:p>
+            <a:pPr marL="109728" indent="0">
+              <a:buNone/>
+            </a:pPr>
+            <a:r>
+              <a:rPr lang="en-US" dirty="0">
+                <a:solidFill>
+                  <a:schemeClr val="tx1"/>
+                </a:solidFill>
+                <a:latin typeface="Times New Roman" panose="02020603050405020304" pitchFamily="18" charset="0"/>
+                <a:cs typeface="Times New Roman" panose="02020603050405020304" pitchFamily="18" charset="0"/>
+              </a:rPr>
+              <a:t>   </a:t>
+            </a:r>
+            <a:r>
+              <a:rPr lang="en-US" dirty="0" smtClean="0">
+                <a:solidFill>
+                  <a:schemeClr val="tx1"/>
+                </a:solidFill>
+                <a:latin typeface="Times New Roman" panose="02020603050405020304" pitchFamily="18" charset="0"/>
+                <a:cs typeface="Times New Roman" panose="02020603050405020304" pitchFamily="18" charset="0"/>
+              </a:rPr>
+              <a:t>   </a:t>
             </a:r>
             <a:r>
               <a:rPr lang="en-US" dirty="0" err="1" smtClean="0">
@@ -11803,7 +11758,7 @@
                 <a:latin typeface="Times New Roman" panose="02020603050405020304" pitchFamily="18" charset="0"/>
                 <a:cs typeface="Times New Roman" panose="02020603050405020304" pitchFamily="18" charset="0"/>
               </a:rPr>
-              <a:t>neg.bed</a:t>
+              <a:t>pos.bed</a:t>
             </a:r>
             <a:r>
               <a:rPr lang="en-US" dirty="0" smtClean="0">
@@ -11835,6 +11790,58 @@
                 <a:latin typeface="Times New Roman" panose="02020603050405020304" pitchFamily="18" charset="0"/>
                 <a:cs typeface="Times New Roman" panose="02020603050405020304" pitchFamily="18" charset="0"/>
               </a:rPr>
+              <a:t> </a:t>
+            </a:r>
+            <a:r>
+              <a:rPr lang="en-US" dirty="0" smtClean="0">
+                <a:solidFill>
+                  <a:schemeClr val="tx1"/>
+                </a:solidFill>
+                <a:latin typeface="Times New Roman" panose="02020603050405020304" pitchFamily="18" charset="0"/>
+                <a:cs typeface="Times New Roman" panose="02020603050405020304" pitchFamily="18" charset="0"/>
+              </a:rPr>
+              <a:t>     </a:t>
+            </a:r>
+            <a:r>
+              <a:rPr lang="en-US" dirty="0" err="1" smtClean="0">
+                <a:solidFill>
+                  <a:schemeClr val="tx1"/>
+                </a:solidFill>
+                <a:latin typeface="Times New Roman" panose="02020603050405020304" pitchFamily="18" charset="0"/>
+                <a:cs typeface="Times New Roman" panose="02020603050405020304" pitchFamily="18" charset="0"/>
+              </a:rPr>
+              <a:t>neg.bed</a:t>
+            </a:r>
+            <a:r>
+              <a:rPr lang="en-US" dirty="0" smtClean="0">
+                <a:solidFill>
+                  <a:schemeClr val="tx1"/>
+                </a:solidFill>
+                <a:latin typeface="Times New Roman" panose="02020603050405020304" pitchFamily="18" charset="0"/>
+                <a:cs typeface="Times New Roman" panose="02020603050405020304" pitchFamily="18" charset="0"/>
+              </a:rPr>
+              <a:t>, </a:t>
+            </a:r>
+            <a:endParaRPr lang="en-US" dirty="0">
+              <a:solidFill>
+                <a:schemeClr val="tx1"/>
+              </a:solidFill>
+              <a:latin typeface="Times New Roman" panose="02020603050405020304" pitchFamily="18" charset="0"/>
+              <a:cs typeface="Times New Roman" panose="02020603050405020304" pitchFamily="18" charset="0"/>
+            </a:endParaRPr>
+          </a:p>
+          <a:p>
+            <a:pPr marL="109728" indent="0">
+              <a:buNone/>
+            </a:pPr>
+            <a:r>
+              <a:rPr lang="en-US" dirty="0">
+                <a:solidFill>
+                  <a:schemeClr val="tx1"/>
+                </a:solidFill>
+                <a:latin typeface="Times New Roman" panose="02020603050405020304" pitchFamily="18" charset="0"/>
+                <a:cs typeface="Times New Roman" panose="02020603050405020304" pitchFamily="18" charset="0"/>
+              </a:rPr>
               <a:t>      </a:t>
             </a:r>
             <a:r>
@@ -11883,14 +11890,24 @@
               <a:t>file.prefix</a:t>
             </a:r>
             <a:r>
-              <a:rPr lang="en-US">
-                <a:solidFill>
-                  <a:schemeClr val="tx1"/>
-                </a:solidFill>
-                <a:latin typeface="Times New Roman" panose="02020603050405020304" pitchFamily="18" charset="0"/>
-                <a:cs typeface="Times New Roman" panose="02020603050405020304" pitchFamily="18" charset="0"/>
-              </a:rPr>
-              <a:t>="enrich.db</a:t>
+              <a:rPr lang="en-US" dirty="0">
+                <a:solidFill>
+                  <a:schemeClr val="tx1"/>
+                </a:solidFill>
+                <a:latin typeface="Times New Roman" panose="02020603050405020304" pitchFamily="18" charset="0"/>
+                <a:cs typeface="Times New Roman" panose="02020603050405020304" pitchFamily="18" charset="0"/>
+              </a:rPr>
+              <a:t>="</a:t>
+            </a:r>
+            <a:r>
+              <a:rPr lang="en-US" dirty="0" err="1">
+                <a:solidFill>
+                  <a:schemeClr val="tx1"/>
+                </a:solidFill>
+                <a:latin typeface="Times New Roman" panose="02020603050405020304" pitchFamily="18" charset="0"/>
+                <a:cs typeface="Times New Roman" panose="02020603050405020304" pitchFamily="18" charset="0"/>
+              </a:rPr>
+              <a:t>enrich.db</a:t>
             </a:r>
             <a:r>
               <a:rPr lang="en-US" dirty="0">
@@ -16390,6 +16407,36 @@
             <a:pPr marL="109728" indent="0">
               <a:buNone/>
             </a:pPr>
+            <a:r>
+              <a:rPr lang="en-US" sz="1600" dirty="0" smtClean="0">
+                <a:solidFill>
+                  <a:schemeClr val="tx1"/>
+                </a:solidFill>
+                <a:latin typeface="Times New Roman" panose="02020603050405020304" pitchFamily="18" charset="0"/>
+                <a:cs typeface="Times New Roman" panose="02020603050405020304" pitchFamily="18" charset="0"/>
+              </a:rPr>
+              <a:t>library(</a:t>
+            </a:r>
+            <a:r>
+              <a:rPr lang="en-US" sz="1600" dirty="0" err="1" smtClean="0">
+                <a:solidFill>
+                  <a:schemeClr val="tx1"/>
+                </a:solidFill>
+                <a:latin typeface="Times New Roman" panose="02020603050405020304" pitchFamily="18" charset="0"/>
+                <a:cs typeface="Times New Roman" panose="02020603050405020304" pitchFamily="18" charset="0"/>
+              </a:rPr>
+              <a:t>rtfbsdb</a:t>
+            </a:r>
+            <a:r>
+              <a:rPr lang="en-US" sz="1600" dirty="0" smtClean="0">
+                <a:solidFill>
+                  <a:schemeClr val="tx1"/>
+                </a:solidFill>
+                <a:latin typeface="Times New Roman" panose="02020603050405020304" pitchFamily="18" charset="0"/>
+                <a:cs typeface="Times New Roman" panose="02020603050405020304" pitchFamily="18" charset="0"/>
+              </a:rPr>
+              <a:t>)</a:t>
+            </a:r>
             <a:endParaRPr lang="en-US" sz="1600" dirty="0" smtClean="0">
               <a:solidFill>
                 <a:schemeClr val="tx1"/>
@@ -18998,6 +19045,26 @@
               <a:buNone/>
             </a:pPr>
             <a:r>
+              <a:rPr lang="en-US" sz="1600" dirty="0" err="1" smtClean="0">
+                <a:solidFill>
+                  <a:schemeClr val="tx1"/>
+                </a:solidFill>
+                <a:latin typeface="Times New Roman" panose="02020603050405020304" pitchFamily="18" charset="0"/>
+                <a:cs typeface="Times New Roman" panose="02020603050405020304" pitchFamily="18" charset="0"/>
+              </a:rPr>
+              <a:t>tfs</a:t>
+            </a:r>
+            <a:r>
+              <a:rPr lang="en-US" sz="1600" dirty="0" smtClean="0">
+                <a:solidFill>
+                  <a:schemeClr val="tx1"/>
+                </a:solidFill>
+                <a:latin typeface="Times New Roman" panose="02020603050405020304" pitchFamily="18" charset="0"/>
+                <a:cs typeface="Times New Roman" panose="02020603050405020304" pitchFamily="18" charset="0"/>
+              </a:rPr>
+              <a:t> </a:t>
+            </a:r>
+            <a:r>
               <a:rPr lang="en-US" sz="1600" dirty="0">
                 <a:solidFill>
                   <a:schemeClr val="tx1"/>
@@ -19005,8 +19072,53 @@
                 <a:latin typeface="Times New Roman" panose="02020603050405020304" pitchFamily="18" charset="0"/>
                 <a:cs typeface="Times New Roman" panose="02020603050405020304" pitchFamily="18" charset="0"/>
               </a:rPr>
-              <a:t># Specify the bigwig files to filter the expressed TFs only </a:t>
-            </a:r>
+              <a:t>&lt;- </a:t>
+            </a:r>
+            <a:r>
+              <a:rPr lang="en-US" sz="1600" dirty="0" err="1" smtClean="0">
+                <a:solidFill>
+                  <a:schemeClr val="tx1"/>
+                </a:solidFill>
+                <a:latin typeface="Times New Roman" panose="02020603050405020304" pitchFamily="18" charset="0"/>
+                <a:cs typeface="Times New Roman" panose="02020603050405020304" pitchFamily="18" charset="0"/>
+              </a:rPr>
+              <a:t>tfbs.createFromCisBP</a:t>
+            </a:r>
+            <a:r>
+              <a:rPr lang="en-US" sz="1600" dirty="0" smtClean="0">
+                <a:solidFill>
+                  <a:schemeClr val="tx1"/>
+                </a:solidFill>
+                <a:latin typeface="Times New Roman" panose="02020603050405020304" pitchFamily="18" charset="0"/>
+                <a:cs typeface="Times New Roman" panose="02020603050405020304" pitchFamily="18" charset="0"/>
+              </a:rPr>
+              <a:t>( </a:t>
+            </a:r>
+            <a:r>
+              <a:rPr lang="en-US" sz="1600" dirty="0" err="1" smtClean="0">
+                <a:solidFill>
+                  <a:schemeClr val="tx1"/>
+                </a:solidFill>
+                <a:latin typeface="Times New Roman" panose="02020603050405020304" pitchFamily="18" charset="0"/>
+                <a:cs typeface="Times New Roman" panose="02020603050405020304" pitchFamily="18" charset="0"/>
+              </a:rPr>
+              <a:t>db</a:t>
+            </a:r>
+            <a:r>
+              <a:rPr lang="en-US" sz="1600" dirty="0" smtClean="0">
+                <a:solidFill>
+                  <a:schemeClr val="tx1"/>
+                </a:solidFill>
+                <a:latin typeface="Times New Roman" panose="02020603050405020304" pitchFamily="18" charset="0"/>
+                <a:cs typeface="Times New Roman" panose="02020603050405020304" pitchFamily="18" charset="0"/>
+              </a:rPr>
+              <a:t> );</a:t>
+            </a:r>
+          </a:p>
+          <a:p>
+            <a:pPr marL="109728" indent="0">
+              <a:buNone/>
+            </a:pPr>
             <a:endParaRPr lang="en-US" sz="1600" dirty="0" smtClean="0">
               <a:solidFill>
                 <a:schemeClr val="tx1"/>
@@ -19020,6 +19132,66 @@
               <a:buNone/>
             </a:pPr>
             <a:r>
+              <a:rPr lang="en-US" sz="1600" dirty="0">
+                <a:solidFill>
+                  <a:schemeClr val="tx1"/>
+                </a:solidFill>
+                <a:latin typeface="Times New Roman" panose="02020603050405020304" pitchFamily="18" charset="0"/>
+                <a:cs typeface="Times New Roman" panose="02020603050405020304" pitchFamily="18" charset="0"/>
+              </a:rPr>
+              <a:t># Specify the bigwig files to filter the expressed TFs only </a:t>
+            </a:r>
+          </a:p>
+          <a:p>
+            <a:pPr marL="109728" indent="0">
+              <a:buNone/>
+            </a:pPr>
+            <a:r>
+              <a:rPr lang="en-US" sz="1600" dirty="0">
+                <a:solidFill>
+                  <a:schemeClr val="tx1"/>
+                </a:solidFill>
+                <a:latin typeface="Times New Roman" panose="02020603050405020304" pitchFamily="18" charset="0"/>
+                <a:cs typeface="Times New Roman" panose="02020603050405020304" pitchFamily="18" charset="0"/>
+              </a:rPr>
+              <a:t># (PRO-</a:t>
+            </a:r>
+            <a:r>
+              <a:rPr lang="en-US" sz="1600" dirty="0" err="1">
+                <a:solidFill>
+                  <a:schemeClr val="tx1"/>
+                </a:solidFill>
+                <a:latin typeface="Times New Roman" panose="02020603050405020304" pitchFamily="18" charset="0"/>
+                <a:cs typeface="Times New Roman" panose="02020603050405020304" pitchFamily="18" charset="0"/>
+              </a:rPr>
+              <a:t>seq</a:t>
+            </a:r>
+            <a:r>
+              <a:rPr lang="en-US" sz="1600" dirty="0">
+                <a:solidFill>
+                  <a:schemeClr val="tx1"/>
+                </a:solidFill>
+                <a:latin typeface="Times New Roman" panose="02020603050405020304" pitchFamily="18" charset="0"/>
+                <a:cs typeface="Times New Roman" panose="02020603050405020304" pitchFamily="18" charset="0"/>
+              </a:rPr>
+              <a:t>)</a:t>
+            </a:r>
+          </a:p>
+          <a:p>
+            <a:pPr marL="109728" indent="0">
+              <a:buNone/>
+            </a:pPr>
+            <a:r>
+              <a:rPr lang="en-US" sz="1600" dirty="0" err="1" smtClean="0">
+                <a:solidFill>
+                  <a:schemeClr val="tx1"/>
+                </a:solidFill>
+                <a:latin typeface="Times New Roman" panose="02020603050405020304" pitchFamily="18" charset="0"/>
+                <a:cs typeface="Times New Roman" panose="02020603050405020304" pitchFamily="18" charset="0"/>
+              </a:rPr>
+              <a:t>tfs</a:t>
+            </a:r>
+            <a:r>
               <a:rPr lang="en-US" sz="1600" dirty="0" smtClean="0">
                 <a:solidFill>
                   <a:schemeClr val="tx1"/>
@@ -19027,7 +19199,7 @@
                 <a:latin typeface="Times New Roman" panose="02020603050405020304" pitchFamily="18" charset="0"/>
                 <a:cs typeface="Times New Roman" panose="02020603050405020304" pitchFamily="18" charset="0"/>
               </a:rPr>
-              <a:t># (</a:t>
+              <a:t> </a:t>
             </a:r>
             <a:r>
               <a:rPr lang="en-US" sz="1600" dirty="0">
@@ -19037,7 +19209,69 @@
                 <a:latin typeface="Times New Roman" panose="02020603050405020304" pitchFamily="18" charset="0"/>
                 <a:cs typeface="Times New Roman" panose="02020603050405020304" pitchFamily="18" charset="0"/>
               </a:rPr>
-              <a:t>PRO-</a:t>
+              <a:t>&lt;- </a:t>
+            </a:r>
+            <a:r>
+              <a:rPr lang="en-US" sz="1600" dirty="0" err="1" smtClean="0">
+                <a:solidFill>
+                  <a:schemeClr val="tx1"/>
+                </a:solidFill>
+                <a:latin typeface="Times New Roman" panose="02020603050405020304" pitchFamily="18" charset="0"/>
+                <a:cs typeface="Times New Roman" panose="02020603050405020304" pitchFamily="18" charset="0"/>
+              </a:rPr>
+              <a:t>tfbs.selectExpressedMotifs</a:t>
+            </a:r>
+            <a:r>
+              <a:rPr lang="en-US" sz="1600" dirty="0" smtClean="0">
+                <a:solidFill>
+                  <a:schemeClr val="tx1"/>
+                </a:solidFill>
+                <a:latin typeface="Times New Roman" panose="02020603050405020304" pitchFamily="18" charset="0"/>
+                <a:cs typeface="Times New Roman" panose="02020603050405020304" pitchFamily="18" charset="0"/>
+              </a:rPr>
+              <a:t>( </a:t>
+            </a:r>
+            <a:r>
+              <a:rPr lang="en-US" sz="1600" dirty="0" err="1" smtClean="0">
+                <a:solidFill>
+                  <a:schemeClr val="tx1"/>
+                </a:solidFill>
+                <a:latin typeface="Times New Roman" panose="02020603050405020304" pitchFamily="18" charset="0"/>
+                <a:cs typeface="Times New Roman" panose="02020603050405020304" pitchFamily="18" charset="0"/>
+              </a:rPr>
+              <a:t>tfs</a:t>
+            </a:r>
+            <a:r>
+              <a:rPr lang="en-US" sz="1600" dirty="0" smtClean="0">
+                <a:solidFill>
+                  <a:schemeClr val="tx1"/>
+                </a:solidFill>
+                <a:latin typeface="Times New Roman" panose="02020603050405020304" pitchFamily="18" charset="0"/>
+                <a:cs typeface="Times New Roman" panose="02020603050405020304" pitchFamily="18" charset="0"/>
+              </a:rPr>
+              <a:t>,</a:t>
+            </a:r>
+            <a:endParaRPr lang="en-US" sz="1600" dirty="0" smtClean="0">
+              <a:solidFill>
+                <a:schemeClr val="tx1"/>
+              </a:solidFill>
+              <a:latin typeface="Times New Roman" panose="02020603050405020304" pitchFamily="18" charset="0"/>
+              <a:cs typeface="Times New Roman" panose="02020603050405020304" pitchFamily="18" charset="0"/>
+            </a:endParaRPr>
+          </a:p>
+          <a:p>
+            <a:pPr marL="109728" indent="0">
+              <a:buNone/>
+            </a:pPr>
+            <a:r>
+              <a:rPr lang="en-US" sz="1600" dirty="0">
+                <a:solidFill>
+                  <a:schemeClr val="tx1"/>
+                </a:solidFill>
+                <a:latin typeface="Times New Roman" panose="02020603050405020304" pitchFamily="18" charset="0"/>
+                <a:cs typeface="Times New Roman" panose="02020603050405020304" pitchFamily="18" charset="0"/>
+              </a:rPr>
+              <a:t>	</a:t>
             </a:r>
             <a:r>
               <a:rPr lang="en-US" sz="1600" dirty="0" err="1">
@@ -19047,7 +19281,7 @@
                 <a:latin typeface="Times New Roman" panose="02020603050405020304" pitchFamily="18" charset="0"/>
                 <a:cs typeface="Times New Roman" panose="02020603050405020304" pitchFamily="18" charset="0"/>
               </a:rPr>
-              <a:t>seq</a:t>
+              <a:t>file.twoBit</a:t>
             </a:r>
             <a:r>
               <a:rPr lang="en-US" sz="1600" dirty="0">
@@ -19057,13 +19291,18 @@
                 <a:latin typeface="Times New Roman" panose="02020603050405020304" pitchFamily="18" charset="0"/>
                 <a:cs typeface="Times New Roman" panose="02020603050405020304" pitchFamily="18" charset="0"/>
               </a:rPr>
-              <a:t>)</a:t>
-            </a:r>
-          </a:p>
-          <a:p>
-            <a:pPr marL="109728" indent="0">
-              <a:buNone/>
-            </a:pPr>
+              <a:t>="hg19.2bit", 	</a:t>
+            </a:r>
+            <a:r>
+              <a:rPr lang="en-US" sz="1600" dirty="0">
+                <a:solidFill>
+                  <a:schemeClr val="tx1"/>
+                </a:solidFill>
+                <a:latin typeface="Times New Roman" panose="02020603050405020304" pitchFamily="18" charset="0"/>
+                <a:cs typeface="Times New Roman" panose="02020603050405020304" pitchFamily="18" charset="0"/>
+              </a:rPr>
+              <a:t>	</a:t>
+            </a:r>
             <a:r>
               <a:rPr lang="en-US" sz="1600" dirty="0" err="1">
                 <a:solidFill>
@@ -19072,7 +19311,7 @@
                 <a:latin typeface="Times New Roman" panose="02020603050405020304" pitchFamily="18" charset="0"/>
                 <a:cs typeface="Times New Roman" panose="02020603050405020304" pitchFamily="18" charset="0"/>
               </a:rPr>
-              <a:t>tfs</a:t>
+              <a:t>file.gencode.gtf</a:t>
             </a:r>
             <a:r>
               <a:rPr lang="en-US" sz="1600" dirty="0">
@@ -19082,7 +19321,37 @@
                 <a:latin typeface="Times New Roman" panose="02020603050405020304" pitchFamily="18" charset="0"/>
                 <a:cs typeface="Times New Roman" panose="02020603050405020304" pitchFamily="18" charset="0"/>
               </a:rPr>
-              <a:t> &lt;- </a:t>
+              <a:t>="gencode.v19.annotation.gtf.gz", </a:t>
+            </a:r>
+            <a:r>
+              <a:rPr lang="en-US" sz="1600" dirty="0" smtClean="0">
+                <a:solidFill>
+                  <a:schemeClr val="tx1"/>
+                </a:solidFill>
+                <a:latin typeface="Times New Roman" panose="02020603050405020304" pitchFamily="18" charset="0"/>
+                <a:cs typeface="Times New Roman" panose="02020603050405020304" pitchFamily="18" charset="0"/>
+              </a:rPr>
+              <a:t>	</a:t>
+            </a:r>
+            <a:r>
+              <a:rPr lang="en-US" sz="1600" dirty="0" err="1" smtClean="0">
+                <a:solidFill>
+                  <a:schemeClr val="tx1"/>
+                </a:solidFill>
+                <a:latin typeface="Times New Roman" panose="02020603050405020304" pitchFamily="18" charset="0"/>
+                <a:cs typeface="Times New Roman" panose="02020603050405020304" pitchFamily="18" charset="0"/>
+              </a:rPr>
+              <a:t>file.bigwig.plus</a:t>
+            </a:r>
+            <a:r>
+              <a:rPr lang="en-US" sz="1600" dirty="0">
+                <a:solidFill>
+                  <a:schemeClr val="tx1"/>
+                </a:solidFill>
+                <a:latin typeface="Times New Roman" panose="02020603050405020304" pitchFamily="18" charset="0"/>
+                <a:cs typeface="Times New Roman" panose="02020603050405020304" pitchFamily="18" charset="0"/>
+              </a:rPr>
+              <a:t>="</a:t>
             </a:r>
             <a:r>
               <a:rPr lang="en-US" sz="1600" dirty="0" err="1">
@@ -19092,7 +19361,7 @@
                 <a:latin typeface="Times New Roman" panose="02020603050405020304" pitchFamily="18" charset="0"/>
                 <a:cs typeface="Times New Roman" panose="02020603050405020304" pitchFamily="18" charset="0"/>
               </a:rPr>
-              <a:t>tfbs.createFromCisBP</a:t>
+              <a:t>bw.plus</a:t>
             </a:r>
             <a:r>
               <a:rPr lang="en-US" sz="1600" dirty="0">
@@ -19102,27 +19371,7 @@
                 <a:latin typeface="Times New Roman" panose="02020603050405020304" pitchFamily="18" charset="0"/>
                 <a:cs typeface="Times New Roman" panose="02020603050405020304" pitchFamily="18" charset="0"/>
               </a:rPr>
-              <a:t>( </a:t>
-            </a:r>
-            <a:r>
-              <a:rPr lang="en-US" sz="1600" dirty="0" err="1">
-                <a:solidFill>
-                  <a:schemeClr val="tx1"/>
-                </a:solidFill>
-                <a:latin typeface="Times New Roman" panose="02020603050405020304" pitchFamily="18" charset="0"/>
-                <a:cs typeface="Times New Roman" panose="02020603050405020304" pitchFamily="18" charset="0"/>
-              </a:rPr>
-              <a:t>db</a:t>
-            </a:r>
-            <a:r>
-              <a:rPr lang="en-US" sz="1600" dirty="0">
-                <a:solidFill>
-                  <a:schemeClr val="tx1"/>
-                </a:solidFill>
-                <a:latin typeface="Times New Roman" panose="02020603050405020304" pitchFamily="18" charset="0"/>
-                <a:cs typeface="Times New Roman" panose="02020603050405020304" pitchFamily="18" charset="0"/>
-              </a:rPr>
-              <a:t>, </a:t>
+              <a:t>", </a:t>
             </a:r>
             <a:r>
               <a:rPr lang="en-US" sz="1600" dirty="0" smtClean="0">
@@ -19132,7 +19381,7 @@
                 <a:latin typeface="Times New Roman" panose="02020603050405020304" pitchFamily="18" charset="0"/>
                 <a:cs typeface="Times New Roman" panose="02020603050405020304" pitchFamily="18" charset="0"/>
               </a:rPr>
-              <a:t>		</a:t>
+              <a:t>	</a:t>
             </a:r>
             <a:r>
               <a:rPr lang="en-US" sz="1600" dirty="0" err="1" smtClean="0">
@@ -19142,137 +19391,7 @@
                 <a:latin typeface="Times New Roman" panose="02020603050405020304" pitchFamily="18" charset="0"/>
                 <a:cs typeface="Times New Roman" panose="02020603050405020304" pitchFamily="18" charset="0"/>
               </a:rPr>
-              <a:t>expressed.only</a:t>
-            </a:r>
-            <a:r>
-              <a:rPr lang="en-US" sz="1600" dirty="0" smtClean="0">
-                <a:solidFill>
-                  <a:schemeClr val="tx1"/>
-                </a:solidFill>
-                <a:latin typeface="Times New Roman" panose="02020603050405020304" pitchFamily="18" charset="0"/>
-                <a:cs typeface="Times New Roman" panose="02020603050405020304" pitchFamily="18" charset="0"/>
-              </a:rPr>
-              <a:t>= TRUE,</a:t>
-            </a:r>
-            <a:r>
-              <a:rPr lang="en-US" sz="1600" dirty="0">
-                <a:solidFill>
-                  <a:schemeClr val="tx1"/>
-                </a:solidFill>
-                <a:latin typeface="Times New Roman" panose="02020603050405020304" pitchFamily="18" charset="0"/>
-                <a:cs typeface="Times New Roman" panose="02020603050405020304" pitchFamily="18" charset="0"/>
-              </a:rPr>
-              <a:t> 	</a:t>
-            </a:r>
-            <a:r>
-              <a:rPr lang="en-US" sz="1600" dirty="0" err="1">
-                <a:solidFill>
-                  <a:schemeClr val="tx1"/>
-                </a:solidFill>
-                <a:latin typeface="Times New Roman" panose="02020603050405020304" pitchFamily="18" charset="0"/>
-                <a:cs typeface="Times New Roman" panose="02020603050405020304" pitchFamily="18" charset="0"/>
-              </a:rPr>
-              <a:t>file.gencode.gtf</a:t>
-            </a:r>
-            <a:r>
-              <a:rPr lang="en-US" sz="1600" dirty="0">
-                <a:solidFill>
-                  <a:schemeClr val="tx1"/>
-                </a:solidFill>
-                <a:latin typeface="Times New Roman" panose="02020603050405020304" pitchFamily="18" charset="0"/>
-                <a:cs typeface="Times New Roman" panose="02020603050405020304" pitchFamily="18" charset="0"/>
-              </a:rPr>
-              <a:t>="gencode.v19.annotation.gtf.gz", 	</a:t>
-            </a:r>
-            <a:r>
-              <a:rPr lang="en-US" sz="1600" dirty="0" err="1">
-                <a:solidFill>
-                  <a:schemeClr val="tx1"/>
-                </a:solidFill>
-                <a:latin typeface="Times New Roman" panose="02020603050405020304" pitchFamily="18" charset="0"/>
-                <a:cs typeface="Times New Roman" panose="02020603050405020304" pitchFamily="18" charset="0"/>
-              </a:rPr>
-              <a:t>file.twoBit</a:t>
-            </a:r>
-            <a:r>
-              <a:rPr lang="en-US" sz="1600" dirty="0">
-                <a:solidFill>
-                  <a:schemeClr val="tx1"/>
-                </a:solidFill>
-                <a:latin typeface="Times New Roman" panose="02020603050405020304" pitchFamily="18" charset="0"/>
-                <a:cs typeface="Times New Roman" panose="02020603050405020304" pitchFamily="18" charset="0"/>
-              </a:rPr>
-              <a:t>="hg19.2bit", 	</a:t>
-            </a:r>
-            <a:r>
-              <a:rPr lang="en-US" sz="1600" dirty="0" smtClean="0">
-                <a:solidFill>
-                  <a:schemeClr val="tx1"/>
-                </a:solidFill>
-                <a:latin typeface="Times New Roman" panose="02020603050405020304" pitchFamily="18" charset="0"/>
-                <a:cs typeface="Times New Roman" panose="02020603050405020304" pitchFamily="18" charset="0"/>
-              </a:rPr>
-              <a:t>	</a:t>
-            </a:r>
-            <a:r>
-              <a:rPr lang="en-US" sz="1600" dirty="0" err="1" smtClean="0">
-                <a:solidFill>
-                  <a:schemeClr val="tx1"/>
-                </a:solidFill>
-                <a:latin typeface="Times New Roman" panose="02020603050405020304" pitchFamily="18" charset="0"/>
-                <a:cs typeface="Times New Roman" panose="02020603050405020304" pitchFamily="18" charset="0"/>
-              </a:rPr>
-              <a:t>file.bigwig.plus</a:t>
-            </a:r>
-            <a:r>
-              <a:rPr lang="en-US" sz="1600" dirty="0">
-                <a:solidFill>
-                  <a:schemeClr val="tx1"/>
-                </a:solidFill>
-                <a:latin typeface="Times New Roman" panose="02020603050405020304" pitchFamily="18" charset="0"/>
-                <a:cs typeface="Times New Roman" panose="02020603050405020304" pitchFamily="18" charset="0"/>
-              </a:rPr>
-              <a:t>="</a:t>
-            </a:r>
-            <a:r>
-              <a:rPr lang="en-US" sz="1600" dirty="0" err="1">
-                <a:solidFill>
-                  <a:schemeClr val="tx1"/>
-                </a:solidFill>
-                <a:latin typeface="Times New Roman" panose="02020603050405020304" pitchFamily="18" charset="0"/>
-                <a:cs typeface="Times New Roman" panose="02020603050405020304" pitchFamily="18" charset="0"/>
-              </a:rPr>
-              <a:t>bw.plus</a:t>
-            </a:r>
-            <a:r>
-              <a:rPr lang="en-US" sz="1600" dirty="0">
-                <a:solidFill>
-                  <a:schemeClr val="tx1"/>
-                </a:solidFill>
-                <a:latin typeface="Times New Roman" panose="02020603050405020304" pitchFamily="18" charset="0"/>
-                <a:cs typeface="Times New Roman" panose="02020603050405020304" pitchFamily="18" charset="0"/>
-              </a:rPr>
-              <a:t>", </a:t>
-            </a:r>
-            <a:r>
-              <a:rPr lang="en-US" sz="1600" dirty="0" smtClean="0">
-                <a:solidFill>
-                  <a:schemeClr val="tx1"/>
-                </a:solidFill>
-                <a:latin typeface="Times New Roman" panose="02020603050405020304" pitchFamily="18" charset="0"/>
-                <a:cs typeface="Times New Roman" panose="02020603050405020304" pitchFamily="18" charset="0"/>
-              </a:rPr>
-              <a:t>	</a:t>
-            </a:r>
-            <a:r>
-              <a:rPr lang="en-US" sz="1600" dirty="0" err="1" smtClean="0">
-                <a:solidFill>
-                  <a:schemeClr val="tx1"/>
-                </a:solidFill>
-                <a:latin typeface="Times New Roman" panose="02020603050405020304" pitchFamily="18" charset="0"/>
-                <a:cs typeface="Times New Roman" panose="02020603050405020304" pitchFamily="18" charset="0"/>
-              </a:rPr>
-              <a:t>file.bigwig.mins</a:t>
+              <a:t>file.bigwig.minus</a:t>
             </a:r>
             <a:r>
               <a:rPr lang="en-US" sz="1600" dirty="0">

</xml_diff>

<commit_message>
Catching the error from system command
</commit_message>
<xml_diff>
--- a/rtfbsdb-tutorial.pptx
+++ b/rtfbsdb-tutorial.pptx
@@ -250,7 +250,7 @@
             <a:fld id="{68796EA6-6F25-4F19-87BA-7ADCC16DAEFF}" type="datetimeFigureOut">
               <a:rPr lang="en-US" smtClean="0"/>
               <a:pPr/>
-              <a:t>2/17/2016</a:t>
+              <a:t>3/2/2016</a:t>
             </a:fld>
             <a:endParaRPr lang="en-US" dirty="0"/>
           </a:p>
@@ -417,7 +417,7 @@
             <a:fld id="{C39C172E-A8B5-46F6-B05C-DFA3E2E0F207}" type="datetimeFigureOut">
               <a:rPr lang="en-US" smtClean="0"/>
               <a:pPr/>
-              <a:t>2/17/2016</a:t>
+              <a:t>3/2/2016</a:t>
             </a:fld>
             <a:endParaRPr lang="en-US" dirty="0"/>
           </a:p>
@@ -2288,7 +2288,7 @@
             <a:fld id="{4E708F12-96AD-4ED4-8132-A78F5E42C1F5}" type="datetime1">
               <a:rPr lang="en-US" smtClean="0"/>
               <a:pPr/>
-              <a:t>2/17/2016</a:t>
+              <a:t>3/2/2016</a:t>
             </a:fld>
             <a:endParaRPr lang="en-US" dirty="0"/>
           </a:p>
@@ -2512,7 +2512,7 @@
             <a:fld id="{7B7FA170-8299-44AD-AEEF-FC686C3D7804}" type="datetime1">
               <a:rPr lang="en-US" smtClean="0"/>
               <a:pPr/>
-              <a:t>2/17/2016</a:t>
+              <a:t>3/2/2016</a:t>
             </a:fld>
             <a:endParaRPr lang="en-US" dirty="0"/>
           </a:p>
@@ -2696,7 +2696,7 @@
             <a:fld id="{2231763A-68EC-4ECD-9620-D9FE9CDDD622}" type="datetime1">
               <a:rPr lang="en-US" smtClean="0"/>
               <a:pPr/>
-              <a:t>2/17/2016</a:t>
+              <a:t>3/2/2016</a:t>
             </a:fld>
             <a:endParaRPr lang="en-US" dirty="0"/>
           </a:p>
@@ -2890,7 +2890,7 @@
             <a:fld id="{7B98BEDD-6160-49BB-B372-861DE7DE9BA5}" type="datetime1">
               <a:rPr lang="en-US" smtClean="0"/>
               <a:pPr/>
-              <a:t>2/17/2016</a:t>
+              <a:t>3/2/2016</a:t>
             </a:fld>
             <a:endParaRPr lang="en-US" dirty="0"/>
           </a:p>
@@ -3074,7 +3074,7 @@
             <a:fld id="{0AAE819F-B7FD-4B29-8F66-9E318144BC2A}" type="datetime1">
               <a:rPr lang="en-US" smtClean="0"/>
               <a:pPr/>
-              <a:t>2/17/2016</a:t>
+              <a:t>3/2/2016</a:t>
             </a:fld>
             <a:endParaRPr lang="en-US" dirty="0"/>
           </a:p>
@@ -3308,7 +3308,7 @@
             <a:fld id="{D4CA159C-B6E0-4F10-9F4A-2FA57003B139}" type="datetime1">
               <a:rPr lang="en-US" smtClean="0"/>
               <a:pPr/>
-              <a:t>2/17/2016</a:t>
+              <a:t>3/2/2016</a:t>
             </a:fld>
             <a:endParaRPr lang="en-US" dirty="0"/>
           </a:p>
@@ -3602,7 +3602,7 @@
             <a:fld id="{8170CBBB-D1D1-4386-A5E9-07F3477B78F3}" type="datetime1">
               <a:rPr lang="en-US" smtClean="0"/>
               <a:pPr/>
-              <a:t>2/17/2016</a:t>
+              <a:t>3/2/2016</a:t>
             </a:fld>
             <a:endParaRPr lang="en-US" dirty="0"/>
           </a:p>
@@ -4032,7 +4032,7 @@
             <a:fld id="{9FA4CAD8-0EA7-4615-B69B-B2F199EF3A93}" type="datetime1">
               <a:rPr lang="en-US" smtClean="0"/>
               <a:pPr/>
-              <a:t>2/17/2016</a:t>
+              <a:t>3/2/2016</a:t>
             </a:fld>
             <a:endParaRPr lang="en-US" dirty="0"/>
           </a:p>
@@ -4187,7 +4187,7 @@
             <a:fld id="{B9234BD7-6953-492C-921B-E68B2D7F14C8}" type="datetime1">
               <a:rPr lang="en-US" smtClean="0"/>
               <a:pPr/>
-              <a:t>2/17/2016</a:t>
+              <a:t>3/2/2016</a:t>
             </a:fld>
             <a:endParaRPr lang="en-US" dirty="0"/>
           </a:p>
@@ -4296,7 +4296,7 @@
             <a:fld id="{35A17D9B-D4D3-4E23-88DF-2E354FA43196}" type="datetime1">
               <a:rPr lang="en-US" smtClean="0"/>
               <a:pPr/>
-              <a:t>2/17/2016</a:t>
+              <a:t>3/2/2016</a:t>
             </a:fld>
             <a:endParaRPr lang="en-US" dirty="0"/>
           </a:p>
@@ -4560,7 +4560,7 @@
             <a:fld id="{541F67C5-D04E-4576-B61C-12ABA14BBD6C}" type="datetime1">
               <a:rPr lang="en-US" smtClean="0"/>
               <a:pPr/>
-              <a:t>2/17/2016</a:t>
+              <a:t>3/2/2016</a:t>
             </a:fld>
             <a:endParaRPr lang="en-US" dirty="0"/>
           </a:p>
@@ -5462,7 +5462,7 @@
             <a:fld id="{C20F09E4-6EA4-4BF3-9FC8-FF40373B88E6}" type="datetime1">
               <a:rPr lang="en-US" smtClean="0"/>
               <a:pPr/>
-              <a:t>2/17/2016</a:t>
+              <a:t>3/2/2016</a:t>
             </a:fld>
             <a:endParaRPr lang="en-US" dirty="0"/>
           </a:p>
@@ -7381,15 +7381,7 @@
             </a:r>
             <a:r>
               <a:rPr lang="en-US" sz="2000" dirty="0" smtClean="0"/>
-              <a:t> package and </a:t>
-            </a:r>
-            <a:r>
-              <a:rPr lang="en-US" sz="2000" dirty="0" smtClean="0"/>
-              <a:t>want to perform </a:t>
-            </a:r>
-            <a:r>
-              <a:rPr lang="en-US" sz="2000" dirty="0" smtClean="0"/>
-              <a:t>analysis by this package:</a:t>
+              <a:t> package and want to perform analysis by this package:</a:t>
             </a:r>
           </a:p>
           <a:p>
@@ -7404,11 +7396,7 @@
             </a:pPr>
             <a:r>
               <a:rPr lang="en-US" altLang="zh-CN" sz="2000" dirty="0" smtClean="0"/>
-              <a:t>Create </a:t>
-            </a:r>
-            <a:r>
-              <a:rPr lang="en-US" altLang="zh-CN" sz="2000" dirty="0" smtClean="0"/>
-              <a:t>a </a:t>
+              <a:t>Create a </a:t>
             </a:r>
             <a:r>
               <a:rPr lang="en-US" altLang="zh-CN" sz="2000" dirty="0" err="1" smtClean="0"/>
@@ -7424,13 +7412,8 @@
             </a:r>
             <a:r>
               <a:rPr lang="en-US" altLang="zh-CN" sz="2000" dirty="0" smtClean="0"/>
-              <a:t> </a:t>
-            </a:r>
-            <a:r>
-              <a:rPr lang="en-US" altLang="zh-CN" sz="2000" dirty="0" smtClean="0"/>
-              <a:t>object.</a:t>
-            </a:r>
-            <a:endParaRPr lang="en-US" altLang="zh-CN" sz="2000" dirty="0" smtClean="0"/>
+              <a:t> object.</a:t>
+            </a:r>
           </a:p>
           <a:p>
             <a:pPr marL="566928" indent="-457200">
@@ -7438,19 +7421,7 @@
             </a:pPr>
             <a:r>
               <a:rPr lang="en-US" altLang="zh-CN" sz="2000" dirty="0" smtClean="0"/>
-              <a:t>Same subsequent </a:t>
-            </a:r>
-            <a:r>
-              <a:rPr lang="en-US" altLang="zh-CN" sz="2000" dirty="0" smtClean="0"/>
-              <a:t>performance</a:t>
-            </a:r>
-            <a:r>
-              <a:rPr lang="en-US" altLang="zh-CN" sz="2000" dirty="0" smtClean="0"/>
-              <a:t> as </a:t>
-            </a:r>
-            <a:r>
-              <a:rPr lang="en-US" altLang="zh-CN" sz="2000" dirty="0" smtClean="0"/>
-              <a:t>Cis-BP dataset. </a:t>
+              <a:t>Same subsequent performance as Cis-BP dataset. </a:t>
             </a:r>
           </a:p>
           <a:p>
@@ -8035,11 +8006,7 @@
             </a:r>
             <a:r>
               <a:rPr lang="en-US" dirty="0" smtClean="0"/>
-              <a:t>Or importing from other data </a:t>
-            </a:r>
-            <a:r>
-              <a:rPr lang="en-US" dirty="0" smtClean="0"/>
-              <a:t>sources</a:t>
+              <a:t>Or importing from other data sources</a:t>
             </a:r>
             <a:endParaRPr lang="en-US" dirty="0"/>
           </a:p>
@@ -8240,13 +8207,8 @@
             </a:r>
             <a:r>
               <a:rPr lang="en-US" sz="2000" dirty="0" smtClean="0"/>
-              <a:t>motif data for missing and empty motifs in Cis-BP </a:t>
-            </a:r>
-            <a:r>
-              <a:rPr lang="en-US" sz="2000" dirty="0" smtClean="0"/>
-              <a:t>database or motif data from other data sources </a:t>
-            </a:r>
-            <a:endParaRPr lang="en-US" sz="2000" dirty="0" smtClean="0"/>
+              <a:t>motif data for missing and empty motifs in Cis-BP database or motif data from other data sources </a:t>
+            </a:r>
           </a:p>
           <a:p>
             <a:pPr marL="109728" indent="0">
@@ -17488,13 +17450,13 @@
   <p:clrMapOvr>
     <a:masterClrMapping/>
   </p:clrMapOvr>
-  <mc:AlternateContent xmlns:mc="http://schemas.openxmlformats.org/markup-compatibility/2006">
-    <mc:Choice xmlns:p14="http://schemas.microsoft.com/office/powerpoint/2010/main" Requires="p14">
+  <mc:AlternateContent xmlns:mc="http://schemas.openxmlformats.org/markup-compatibility/2006" xmlns:p14="http://schemas.microsoft.com/office/powerpoint/2010/main">
+    <mc:Choice Requires="p14">
       <p:transition spd="med" p14:dur="700">
         <p:fade/>
       </p:transition>
     </mc:Choice>
-    <mc:Fallback>
+    <mc:Fallback xmlns="">
       <p:transition spd="med">
         <p:fade/>
       </p:transition>
@@ -18501,7 +18463,15 @@
                   <a:schemeClr val="tx1"/>
                 </a:solidFill>
               </a:rPr>
-              <a:t>##  summary information </a:t>
+              <a:t>##  summary information of </a:t>
+            </a:r>
+            <a:r>
+              <a:rPr lang="en-US" sz="2000" dirty="0" err="1" smtClean="0">
+                <a:solidFill>
+                  <a:schemeClr val="tx1"/>
+                </a:solidFill>
+              </a:rPr>
+              <a:t>MotifDb</a:t>
             </a:r>
             <a:r>
               <a:rPr lang="en-US" sz="2000" dirty="0" smtClean="0">
@@ -18509,29 +18479,8 @@
                   <a:schemeClr val="tx1"/>
                 </a:solidFill>
               </a:rPr>
-              <a:t>of </a:t>
-            </a:r>
-            <a:r>
-              <a:rPr lang="en-US" sz="2000" dirty="0" err="1" smtClean="0">
-                <a:solidFill>
-                  <a:schemeClr val="tx1"/>
-                </a:solidFill>
-              </a:rPr>
-              <a:t>MotifDb</a:t>
-            </a:r>
-            <a:r>
-              <a:rPr lang="en-US" sz="2000" dirty="0" smtClean="0">
-                <a:solidFill>
-                  <a:schemeClr val="tx1"/>
-                </a:solidFill>
-              </a:rPr>
               <a:t> </a:t>
             </a:r>
-            <a:endParaRPr lang="en-US" sz="2000" dirty="0" smtClean="0">
-              <a:solidFill>
-                <a:schemeClr val="tx1"/>
-              </a:solidFill>
-            </a:endParaRPr>
           </a:p>
           <a:p>
             <a:pPr marL="109728" indent="0">
@@ -18589,17 +18538,7 @@
                   </a:schemeClr>
                 </a:solidFill>
               </a:rPr>
-              <a:t> package and other data </a:t>
-            </a:r>
-            <a:r>
-              <a:rPr lang="en-US" dirty="0" smtClean="0">
-                <a:solidFill>
-                  <a:schemeClr val="accent3">
-                    <a:lumMod val="50000"/>
-                  </a:schemeClr>
-                </a:solidFill>
-              </a:rPr>
-              <a:t>sources</a:t>
+              <a:t> package and other data sources</a:t>
             </a:r>
             <a:endParaRPr lang="en-US" dirty="0">
               <a:solidFill>
@@ -18815,27 +18754,7 @@
                   </a:schemeClr>
                 </a:solidFill>
               </a:rPr>
-              <a:t> is a public package </a:t>
-            </a:r>
-            <a:r>
-              <a:rPr lang="en-US" sz="2000" dirty="0" smtClean="0">
-                <a:solidFill>
-                  <a:schemeClr val="accent3">
-                    <a:lumMod val="50000"/>
-                  </a:schemeClr>
-                </a:solidFill>
-              </a:rPr>
-              <a:t>in </a:t>
-            </a:r>
-            <a:r>
-              <a:rPr lang="en-US" sz="2000" dirty="0" smtClean="0">
-                <a:solidFill>
-                  <a:schemeClr val="accent3">
-                    <a:lumMod val="50000"/>
-                  </a:schemeClr>
-                </a:solidFill>
-              </a:rPr>
-              <a:t>Bioconductor.</a:t>
+              <a:t> is a public package in Bioconductor.</a:t>
             </a:r>
           </a:p>
           <a:p>
@@ -18901,27 +18820,7 @@
                   </a:schemeClr>
                 </a:solidFill>
               </a:rPr>
-              <a:t>Other data </a:t>
-            </a:r>
-            <a:r>
-              <a:rPr lang="en-US" sz="2000" dirty="0" smtClean="0">
-                <a:solidFill>
-                  <a:schemeClr val="accent3">
-                    <a:lumMod val="50000"/>
-                  </a:schemeClr>
-                </a:solidFill>
-              </a:rPr>
-              <a:t>sources </a:t>
-            </a:r>
-            <a:r>
-              <a:rPr lang="en-US" sz="2000" dirty="0" smtClean="0">
-                <a:solidFill>
-                  <a:schemeClr val="accent3">
-                    <a:lumMod val="50000"/>
-                  </a:schemeClr>
-                </a:solidFill>
-              </a:rPr>
-              <a:t>can be imported to this pipeline.</a:t>
+              <a:t>Other data sources can be imported to this pipeline.</a:t>
             </a:r>
           </a:p>
           <a:p>
@@ -19411,7 +19310,7 @@
         </p:spPr>
         <p:txBody>
           <a:bodyPr>
-            <a:normAutofit fontScale="85000" lnSpcReduction="20000"/>
+            <a:normAutofit fontScale="77500" lnSpcReduction="20000"/>
           </a:bodyPr>
           <a:lstStyle/>
           <a:p>
@@ -19454,7 +19353,7 @@
             </a:r>
             <a:r>
               <a:rPr lang="en-US" sz="2100" i="1" dirty="0" smtClean="0"/>
-              <a:t>parallel</a:t>
+              <a:t>grid</a:t>
             </a:r>
             <a:r>
               <a:rPr lang="en-US" sz="2100" dirty="0" smtClean="0"/>
@@ -19462,29 +19361,21 @@
             </a:r>
             <a:r>
               <a:rPr lang="en-US" sz="2100" i="1" dirty="0" smtClean="0"/>
-              <a:t>grid</a:t>
+              <a:t>cluster</a:t>
             </a:r>
             <a:r>
               <a:rPr lang="en-US" sz="2100" dirty="0" smtClean="0"/>
               <a:t>, </a:t>
             </a:r>
             <a:r>
-              <a:rPr lang="en-US" sz="2100" i="1" dirty="0" smtClean="0"/>
-              <a:t>cluster</a:t>
+              <a:rPr lang="en-US" sz="2100" i="1" dirty="0" err="1" smtClean="0"/>
+              <a:t>latticeExtra</a:t>
             </a:r>
             <a:r>
               <a:rPr lang="en-US" sz="2100" dirty="0" smtClean="0"/>
               <a:t>, </a:t>
             </a:r>
             <a:r>
-              <a:rPr lang="en-US" sz="2100" i="1" dirty="0" err="1" smtClean="0"/>
-              <a:t>latticeExtra</a:t>
-            </a:r>
-            <a:r>
-              <a:rPr lang="en-US" sz="2100" dirty="0" smtClean="0"/>
-              <a:t>, </a:t>
-            </a:r>
-            <a:r>
               <a:rPr lang="en-US" sz="2100" i="1" dirty="0" smtClean="0"/>
               <a:t>lattice, </a:t>
             </a:r>
@@ -19506,7 +19397,29 @@
             </a:r>
             <a:r>
               <a:rPr lang="en-US" sz="2100" i="1" dirty="0" err="1" smtClean="0"/>
-              <a:t>RCurl</a:t>
+              <a:t>Rcurl</a:t>
+            </a:r>
+            <a:endParaRPr lang="en-US" sz="2100" i="1" dirty="0" smtClean="0"/>
+          </a:p>
+          <a:p>
+            <a:pPr>
+              <a:buNone/>
+            </a:pPr>
+            <a:r>
+              <a:rPr lang="en-US" sz="2100" i="1" dirty="0"/>
+              <a:t>	</a:t>
+            </a:r>
+            <a:r>
+              <a:rPr lang="en-US" sz="2100" i="1" u="sng" dirty="0" smtClean="0">
+                <a:solidFill>
+                  <a:srgbClr val="0070C0"/>
+                </a:solidFill>
+              </a:rPr>
+              <a:t>parallel </a:t>
+            </a:r>
+            <a:r>
+              <a:rPr lang="en-US" sz="2100" dirty="0" smtClean="0"/>
+              <a:t>(included in R software from 2.14.0)</a:t>
             </a:r>
             <a:endParaRPr lang="en-US" sz="2100" i="1" dirty="0" smtClean="0"/>
           </a:p>

</xml_diff>

<commit_message>
Update documents for QQ-like plot
</commit_message>
<xml_diff>
--- a/rtfbsdb-tutorial.pptx
+++ b/rtfbsdb-tutorial.pptx
@@ -257,7 +257,7 @@
             <a:fld id="{68796EA6-6F25-4F19-87BA-7ADCC16DAEFF}" type="datetimeFigureOut">
               <a:rPr lang="en-US" smtClean="0"/>
               <a:pPr/>
-              <a:t>4/20/2016</a:t>
+              <a:t>5/26/2016</a:t>
             </a:fld>
             <a:endParaRPr lang="en-US" dirty="0"/>
           </a:p>
@@ -424,7 +424,7 @@
             <a:fld id="{C39C172E-A8B5-46F6-B05C-DFA3E2E0F207}" type="datetimeFigureOut">
               <a:rPr lang="en-US" smtClean="0"/>
               <a:pPr/>
-              <a:t>4/20/2016</a:t>
+              <a:t>5/26/2016</a:t>
             </a:fld>
             <a:endParaRPr lang="en-US" dirty="0"/>
           </a:p>
@@ -2557,7 +2557,7 @@
             <a:fld id="{4E708F12-96AD-4ED4-8132-A78F5E42C1F5}" type="datetime1">
               <a:rPr lang="en-US" smtClean="0"/>
               <a:pPr/>
-              <a:t>4/20/2016</a:t>
+              <a:t>5/26/2016</a:t>
             </a:fld>
             <a:endParaRPr lang="en-US" dirty="0"/>
           </a:p>
@@ -2781,7 +2781,7 @@
             <a:fld id="{7B7FA170-8299-44AD-AEEF-FC686C3D7804}" type="datetime1">
               <a:rPr lang="en-US" smtClean="0"/>
               <a:pPr/>
-              <a:t>4/20/2016</a:t>
+              <a:t>5/26/2016</a:t>
             </a:fld>
             <a:endParaRPr lang="en-US" dirty="0"/>
           </a:p>
@@ -2965,7 +2965,7 @@
             <a:fld id="{2231763A-68EC-4ECD-9620-D9FE9CDDD622}" type="datetime1">
               <a:rPr lang="en-US" smtClean="0"/>
               <a:pPr/>
-              <a:t>4/20/2016</a:t>
+              <a:t>5/26/2016</a:t>
             </a:fld>
             <a:endParaRPr lang="en-US" dirty="0"/>
           </a:p>
@@ -3159,7 +3159,7 @@
             <a:fld id="{7B98BEDD-6160-49BB-B372-861DE7DE9BA5}" type="datetime1">
               <a:rPr lang="en-US" smtClean="0"/>
               <a:pPr/>
-              <a:t>4/20/2016</a:t>
+              <a:t>5/26/2016</a:t>
             </a:fld>
             <a:endParaRPr lang="en-US" dirty="0"/>
           </a:p>
@@ -3343,7 +3343,7 @@
             <a:fld id="{0AAE819F-B7FD-4B29-8F66-9E318144BC2A}" type="datetime1">
               <a:rPr lang="en-US" smtClean="0"/>
               <a:pPr/>
-              <a:t>4/20/2016</a:t>
+              <a:t>5/26/2016</a:t>
             </a:fld>
             <a:endParaRPr lang="en-US" dirty="0"/>
           </a:p>
@@ -3577,7 +3577,7 @@
             <a:fld id="{D4CA159C-B6E0-4F10-9F4A-2FA57003B139}" type="datetime1">
               <a:rPr lang="en-US" smtClean="0"/>
               <a:pPr/>
-              <a:t>4/20/2016</a:t>
+              <a:t>5/26/2016</a:t>
             </a:fld>
             <a:endParaRPr lang="en-US" dirty="0"/>
           </a:p>
@@ -3871,7 +3871,7 @@
             <a:fld id="{8170CBBB-D1D1-4386-A5E9-07F3477B78F3}" type="datetime1">
               <a:rPr lang="en-US" smtClean="0"/>
               <a:pPr/>
-              <a:t>4/20/2016</a:t>
+              <a:t>5/26/2016</a:t>
             </a:fld>
             <a:endParaRPr lang="en-US" dirty="0"/>
           </a:p>
@@ -4301,7 +4301,7 @@
             <a:fld id="{9FA4CAD8-0EA7-4615-B69B-B2F199EF3A93}" type="datetime1">
               <a:rPr lang="en-US" smtClean="0"/>
               <a:pPr/>
-              <a:t>4/20/2016</a:t>
+              <a:t>5/26/2016</a:t>
             </a:fld>
             <a:endParaRPr lang="en-US" dirty="0"/>
           </a:p>
@@ -4456,7 +4456,7 @@
             <a:fld id="{B9234BD7-6953-492C-921B-E68B2D7F14C8}" type="datetime1">
               <a:rPr lang="en-US" smtClean="0"/>
               <a:pPr/>
-              <a:t>4/20/2016</a:t>
+              <a:t>5/26/2016</a:t>
             </a:fld>
             <a:endParaRPr lang="en-US" dirty="0"/>
           </a:p>
@@ -4565,7 +4565,7 @@
             <a:fld id="{35A17D9B-D4D3-4E23-88DF-2E354FA43196}" type="datetime1">
               <a:rPr lang="en-US" smtClean="0"/>
               <a:pPr/>
-              <a:t>4/20/2016</a:t>
+              <a:t>5/26/2016</a:t>
             </a:fld>
             <a:endParaRPr lang="en-US" dirty="0"/>
           </a:p>
@@ -4829,7 +4829,7 @@
             <a:fld id="{541F67C5-D04E-4576-B61C-12ABA14BBD6C}" type="datetime1">
               <a:rPr lang="en-US" smtClean="0"/>
               <a:pPr/>
-              <a:t>4/20/2016</a:t>
+              <a:t>5/26/2016</a:t>
             </a:fld>
             <a:endParaRPr lang="en-US" dirty="0"/>
           </a:p>
@@ -5731,7 +5731,7 @@
             <a:fld id="{C20F09E4-6EA4-4BF3-9FC8-FF40373B88E6}" type="datetime1">
               <a:rPr lang="en-US" smtClean="0"/>
               <a:pPr/>
-              <a:t>4/20/2016</a:t>
+              <a:t>5/26/2016</a:t>
             </a:fld>
             <a:endParaRPr lang="en-US" dirty="0"/>
           </a:p>
@@ -20802,17 +20802,27 @@
                 <a:latin typeface="Times New Roman" panose="02020603050405020304" pitchFamily="18" charset="0"/>
                 <a:cs typeface="Times New Roman" panose="02020603050405020304" pitchFamily="18" charset="0"/>
               </a:rPr>
-              <a:t>      </a:t>
-            </a:r>
-            <a:r>
-              <a:rPr lang="en-US" sz="1600" dirty="0" err="1">
-                <a:solidFill>
-                  <a:schemeClr val="tx1"/>
-                </a:solidFill>
-                <a:latin typeface="Times New Roman" panose="02020603050405020304" pitchFamily="18" charset="0"/>
-                <a:cs typeface="Times New Roman" panose="02020603050405020304" pitchFamily="18" charset="0"/>
-              </a:rPr>
-              <a:t>plot.title</a:t>
+              <a:t> </a:t>
+            </a:r>
+            <a:r>
+              <a:rPr lang="en-US" sz="1600" dirty="0" smtClean="0">
+                <a:solidFill>
+                  <a:schemeClr val="tx1"/>
+                </a:solidFill>
+                <a:latin typeface="Times New Roman" panose="02020603050405020304" pitchFamily="18" charset="0"/>
+                <a:cs typeface="Times New Roman" panose="02020603050405020304" pitchFamily="18" charset="0"/>
+              </a:rPr>
+              <a:t>     </a:t>
+            </a:r>
+            <a:r>
+              <a:rPr lang="en-US" sz="1600" dirty="0" err="1" smtClean="0">
+                <a:solidFill>
+                  <a:schemeClr val="tx1"/>
+                </a:solidFill>
+                <a:latin typeface="Times New Roman" panose="02020603050405020304" pitchFamily="18" charset="0"/>
+                <a:cs typeface="Times New Roman" panose="02020603050405020304" pitchFamily="18" charset="0"/>
+              </a:rPr>
+              <a:t>plot.type</a:t>
             </a:r>
             <a:r>
               <a:rPr lang="en-US" sz="1600" dirty="0">
@@ -20822,13 +20832,70 @@
                 <a:latin typeface="Times New Roman" panose="02020603050405020304" pitchFamily="18" charset="0"/>
                 <a:cs typeface="Times New Roman" panose="02020603050405020304" pitchFamily="18" charset="0"/>
               </a:rPr>
+              <a:t>="nonpolar", </a:t>
+            </a:r>
+            <a:endParaRPr lang="en-US" sz="1600" dirty="0" smtClean="0">
+              <a:solidFill>
+                <a:schemeClr val="tx1"/>
+              </a:solidFill>
+              <a:latin typeface="Times New Roman" panose="02020603050405020304" pitchFamily="18" charset="0"/>
+              <a:cs typeface="Times New Roman" panose="02020603050405020304" pitchFamily="18" charset="0"/>
+            </a:endParaRPr>
+          </a:p>
+          <a:p>
+            <a:pPr marL="109728" indent="0">
+              <a:buNone/>
+            </a:pPr>
+            <a:r>
+              <a:rPr lang="en-US" sz="1600" dirty="0">
+                <a:solidFill>
+                  <a:schemeClr val="tx1"/>
+                </a:solidFill>
+                <a:latin typeface="Times New Roman" panose="02020603050405020304" pitchFamily="18" charset="0"/>
+                <a:cs typeface="Times New Roman" panose="02020603050405020304" pitchFamily="18" charset="0"/>
+              </a:rPr>
+              <a:t> </a:t>
+            </a:r>
+            <a:r>
+              <a:rPr lang="en-US" sz="1600" dirty="0" smtClean="0">
+                <a:solidFill>
+                  <a:schemeClr val="tx1"/>
+                </a:solidFill>
+                <a:latin typeface="Times New Roman" panose="02020603050405020304" pitchFamily="18" charset="0"/>
+                <a:cs typeface="Times New Roman" panose="02020603050405020304" pitchFamily="18" charset="0"/>
+              </a:rPr>
+              <a:t>     options=list(title</a:t>
+            </a:r>
+            <a:r>
+              <a:rPr lang="en-US" sz="1600" dirty="0">
+                <a:solidFill>
+                  <a:schemeClr val="tx1"/>
+                </a:solidFill>
+                <a:latin typeface="Times New Roman" panose="02020603050405020304" pitchFamily="18" charset="0"/>
+                <a:cs typeface="Times New Roman" panose="02020603050405020304" pitchFamily="18" charset="0"/>
+              </a:rPr>
               <a:t>="QQ plot", </a:t>
             </a:r>
-          </a:p>
-          <a:p>
-            <a:pPr marL="109728" indent="0">
-              <a:buNone/>
-            </a:pPr>
+            <a:r>
+              <a:rPr lang="en-US" sz="1600" dirty="0" err="1" smtClean="0">
+                <a:solidFill>
+                  <a:schemeClr val="tx1"/>
+                </a:solidFill>
+                <a:latin typeface="Times New Roman" panose="02020603050405020304" pitchFamily="18" charset="0"/>
+                <a:cs typeface="Times New Roman" panose="02020603050405020304" pitchFamily="18" charset="0"/>
+              </a:rPr>
+              <a:t>top.motif.labels</a:t>
+            </a:r>
+            <a:r>
+              <a:rPr lang="en-US" sz="1600" dirty="0" smtClean="0">
+                <a:solidFill>
+                  <a:schemeClr val="tx1"/>
+                </a:solidFill>
+                <a:latin typeface="Times New Roman" panose="02020603050405020304" pitchFamily="18" charset="0"/>
+                <a:cs typeface="Times New Roman" panose="02020603050405020304" pitchFamily="18" charset="0"/>
+              </a:rPr>
+              <a:t>=3</a:t>
+            </a:r>
             <a:r>
               <a:rPr lang="en-US" sz="1600" dirty="0">
                 <a:solidFill>
@@ -20837,50 +20904,10 @@
                 <a:latin typeface="Times New Roman" panose="02020603050405020304" pitchFamily="18" charset="0"/>
                 <a:cs typeface="Times New Roman" panose="02020603050405020304" pitchFamily="18" charset="0"/>
               </a:rPr>
-              <a:t>      </a:t>
-            </a:r>
-            <a:r>
-              <a:rPr lang="en-US" sz="1600" dirty="0" err="1">
-                <a:solidFill>
-                  <a:schemeClr val="tx1"/>
-                </a:solidFill>
-                <a:latin typeface="Times New Roman" panose="02020603050405020304" pitchFamily="18" charset="0"/>
-                <a:cs typeface="Times New Roman" panose="02020603050405020304" pitchFamily="18" charset="0"/>
-              </a:rPr>
-              <a:t>top.motif.labels</a:t>
-            </a:r>
-            <a:r>
-              <a:rPr lang="en-US" sz="1600" dirty="0">
-                <a:solidFill>
-                  <a:schemeClr val="tx1"/>
-                </a:solidFill>
-                <a:latin typeface="Times New Roman" panose="02020603050405020304" pitchFamily="18" charset="0"/>
-                <a:cs typeface="Times New Roman" panose="02020603050405020304" pitchFamily="18" charset="0"/>
-              </a:rPr>
-              <a:t>=3, </a:t>
-            </a:r>
-            <a:r>
-              <a:rPr lang="en-US" sz="1600" dirty="0" err="1">
-                <a:solidFill>
-                  <a:schemeClr val="tx1"/>
-                </a:solidFill>
-                <a:latin typeface="Times New Roman" panose="02020603050405020304" pitchFamily="18" charset="0"/>
-                <a:cs typeface="Times New Roman" panose="02020603050405020304" pitchFamily="18" charset="0"/>
-              </a:rPr>
-              <a:t>plot.type</a:t>
-            </a:r>
-            <a:r>
-              <a:rPr lang="en-US" sz="1600" dirty="0">
-                <a:solidFill>
-                  <a:schemeClr val="tx1"/>
-                </a:solidFill>
-                <a:latin typeface="Times New Roman" panose="02020603050405020304" pitchFamily="18" charset="0"/>
-                <a:cs typeface="Times New Roman" panose="02020603050405020304" pitchFamily="18" charset="0"/>
-              </a:rPr>
-              <a:t>="nonpolar", </a:t>
-            </a:r>
-            <a:r>
-              <a:rPr lang="en-US" sz="1600" dirty="0" err="1">
+              <a:t>, </a:t>
+            </a:r>
+            <a:r>
+              <a:rPr lang="en-US" sz="1600" dirty="0" err="1" smtClean="0">
                 <a:solidFill>
                   <a:schemeClr val="tx1"/>
                 </a:solidFill>
@@ -20890,15 +20917,22 @@
               <a:t>color.scheme</a:t>
             </a:r>
             <a:r>
-              <a:rPr lang="en-US" sz="1600" dirty="0">
-                <a:solidFill>
-                  <a:schemeClr val="tx1"/>
-                </a:solidFill>
-                <a:latin typeface="Times New Roman" panose="02020603050405020304" pitchFamily="18" charset="0"/>
-                <a:cs typeface="Times New Roman" panose="02020603050405020304" pitchFamily="18" charset="0"/>
-              </a:rPr>
-              <a:t>=2);</a:t>
-            </a:r>
+              <a:rPr lang="en-US" sz="1600" dirty="0" smtClean="0">
+                <a:solidFill>
+                  <a:schemeClr val="tx1"/>
+                </a:solidFill>
+                <a:latin typeface="Times New Roman" panose="02020603050405020304" pitchFamily="18" charset="0"/>
+                <a:cs typeface="Times New Roman" panose="02020603050405020304" pitchFamily="18" charset="0"/>
+              </a:rPr>
+              <a:t>=2) );</a:t>
+            </a:r>
+            <a:endParaRPr lang="en-US" sz="1600" dirty="0">
+              <a:solidFill>
+                <a:schemeClr val="tx1"/>
+              </a:solidFill>
+              <a:latin typeface="Times New Roman" panose="02020603050405020304" pitchFamily="18" charset="0"/>
+              <a:cs typeface="Times New Roman" panose="02020603050405020304" pitchFamily="18" charset="0"/>
+            </a:endParaRPr>
           </a:p>
           <a:p>
             <a:pPr marL="109728" indent="0">
@@ -21185,7 +21219,7 @@
         </p:blipFill>
         <p:spPr>
           <a:xfrm>
-            <a:off x="7964686" y="2400957"/>
+            <a:off x="4254056" y="2412875"/>
             <a:ext cx="3683888" cy="3665567"/>
           </a:xfrm>
           <a:prstGeom prst="rect">
@@ -21208,7 +21242,7 @@
           <a:bodyPr/>
           <a:lstStyle/>
           <a:p>
-            <a:endParaRPr lang="en-US"/>
+            <a:endParaRPr lang="en-US" dirty="0"/>
           </a:p>
         </p:txBody>
       </p:sp>
@@ -21233,11 +21267,7 @@
             </a:r>
             <a:r>
               <a:rPr lang="en-US" dirty="0" smtClean="0"/>
-              <a:t>for </a:t>
-            </a:r>
-            <a:r>
-              <a:rPr lang="en-US" smtClean="0"/>
-              <a:t>Comparison Results</a:t>
+              <a:t>for Comparison Results</a:t>
             </a:r>
             <a:endParaRPr lang="en-US" dirty="0"/>
           </a:p>
@@ -21269,7 +21299,7 @@
       </p:pic>
       <p:pic>
         <p:nvPicPr>
-          <p:cNvPr id="7" name="Picture 6"/>
+          <p:cNvPr id="9" name="Picture 8"/>
           <p:cNvPicPr>
             <a:picLocks noChangeAspect="1"/>
           </p:cNvPicPr>
@@ -21283,8 +21313,8 @@
         </p:blipFill>
         <p:spPr>
           <a:xfrm>
-            <a:off x="4244512" y="2389041"/>
-            <a:ext cx="3702976" cy="3689401"/>
+            <a:off x="7937944" y="1869324"/>
+            <a:ext cx="3319991" cy="4752668"/>
           </a:xfrm>
           <a:prstGeom prst="rect">
             <a:avLst/>
@@ -26321,11 +26351,7 @@
             </a:pPr>
             <a:r>
               <a:rPr lang="en-US" sz="1800" dirty="0" smtClean="0"/>
-              <a:t>1) If </a:t>
-            </a:r>
-            <a:r>
-              <a:rPr lang="en-US" sz="1800" dirty="0" smtClean="0"/>
-              <a:t>the package can’t run  </a:t>
+              <a:t>1) If the package can’t run  </a:t>
             </a:r>
             <a:r>
               <a:rPr lang="en-US" sz="1800" dirty="0"/>
@@ -26333,28 +26359,16 @@
             </a:r>
             <a:r>
               <a:rPr lang="en-US" sz="1800" dirty="0" smtClean="0"/>
-              <a:t>prerequisite Unix commands or bioinformatics tools, the package will show warning </a:t>
-            </a:r>
+              <a:t>prerequisite Unix commands or bioinformatics tools, the package will show warning messages after it is loaded.</a:t>
+            </a:r>
+          </a:p>
+          <a:p>
+            <a:pPr marL="461963" indent="-344488">
+              <a:buNone/>
+            </a:pPr>
             <a:r>
               <a:rPr lang="en-US" sz="1800" dirty="0" smtClean="0"/>
-              <a:t>messages </a:t>
-            </a:r>
-            <a:r>
-              <a:rPr lang="en-US" sz="1800" dirty="0" smtClean="0"/>
-              <a:t>after it is loaded.</a:t>
-            </a:r>
-          </a:p>
-          <a:p>
-            <a:pPr marL="461963" indent="-344488">
-              <a:buNone/>
-            </a:pPr>
-            <a:r>
-              <a:rPr lang="en-US" sz="1800" dirty="0" smtClean="0"/>
-              <a:t>2) Try </a:t>
-            </a:r>
-            <a:r>
-              <a:rPr lang="en-US" sz="1800" dirty="0" smtClean="0"/>
-              <a:t>to use </a:t>
+              <a:t>2) Try to use </a:t>
             </a:r>
             <a:r>
               <a:rPr lang="en-US" sz="1800" dirty="0" err="1" smtClean="0">

</xml_diff>

<commit_message>
reduce the usage of memory to do scaning arcoss whole genome
</commit_message>
<xml_diff>
--- a/rtfbsdb-tutorial.pptx
+++ b/rtfbsdb-tutorial.pptx
@@ -145,7 +145,7 @@
   </p:defaultTextStyle>
   <p:extLst>
     <p:ext uri="{EFAFB233-063F-42B5-8137-9DF3F51BA10A}">
-      <p15:sldGuideLst xmlns:p15="http://schemas.microsoft.com/office/powerpoint/2012/main" xmlns="">
+      <p15:sldGuideLst xmlns:p15="http://schemas.microsoft.com/office/powerpoint/2012/main">
         <p15:guide id="1" orient="horz" pos="2160" userDrawn="1">
           <p15:clr>
             <a:srgbClr val="A4A3A4"/>
@@ -169,7 +169,7 @@
       </p15:sldGuideLst>
     </p:ext>
     <p:ext uri="{2D200454-40CA-4A62-9FC3-DE9A4176ACB9}">
-      <p15:notesGuideLst xmlns:p15="http://schemas.microsoft.com/office/powerpoint/2012/main" xmlns=""/>
+      <p15:notesGuideLst xmlns:p15="http://schemas.microsoft.com/office/powerpoint/2012/main"/>
     </p:ext>
   </p:extLst>
 </p:presentation>
@@ -258,7 +258,7 @@
             <a:fld id="{68796EA6-6F25-4F19-87BA-7ADCC16DAEFF}" type="datetimeFigureOut">
               <a:rPr lang="en-US" smtClean="0"/>
               <a:pPr/>
-              <a:t>1/26/2017</a:t>
+              <a:t>12/7/2018</a:t>
             </a:fld>
             <a:endParaRPr lang="en-US" dirty="0"/>
           </a:p>
@@ -334,7 +334,7 @@
     </p:spTree>
     <p:extLst>
       <p:ext uri="{BB962C8B-B14F-4D97-AF65-F5344CB8AC3E}">
-        <p14:creationId xmlns:p14="http://schemas.microsoft.com/office/powerpoint/2010/main" xmlns="" val="1323295073"/>
+        <p14:creationId xmlns:p14="http://schemas.microsoft.com/office/powerpoint/2010/main" val="1323295073"/>
       </p:ext>
     </p:extLst>
   </p:cSld>
@@ -425,7 +425,7 @@
             <a:fld id="{C39C172E-A8B5-46F6-B05C-DFA3E2E0F207}" type="datetimeFigureOut">
               <a:rPr lang="en-US" smtClean="0"/>
               <a:pPr/>
-              <a:t>1/26/2017</a:t>
+              <a:t>12/7/2018</a:t>
             </a:fld>
             <a:endParaRPr lang="en-US" dirty="0"/>
           </a:p>
@@ -594,7 +594,7 @@
     </p:spTree>
     <p:extLst>
       <p:ext uri="{BB962C8B-B14F-4D97-AF65-F5344CB8AC3E}">
-        <p14:creationId xmlns:p14="http://schemas.microsoft.com/office/powerpoint/2010/main" xmlns="" val="1273268184"/>
+        <p14:creationId xmlns:p14="http://schemas.microsoft.com/office/powerpoint/2010/main" val="1273268184"/>
       </p:ext>
     </p:extLst>
   </p:cSld>
@@ -769,7 +769,7 @@
     </p:spTree>
     <p:extLst>
       <p:ext uri="{BB962C8B-B14F-4D97-AF65-F5344CB8AC3E}">
-        <p14:creationId xmlns:p14="http://schemas.microsoft.com/office/powerpoint/2010/main" xmlns="" val="2147974240"/>
+        <p14:creationId xmlns:p14="http://schemas.microsoft.com/office/powerpoint/2010/main" val="2147974240"/>
       </p:ext>
     </p:extLst>
   </p:cSld>
@@ -857,7 +857,7 @@
     </p:spTree>
     <p:extLst>
       <p:ext uri="{BB962C8B-B14F-4D97-AF65-F5344CB8AC3E}">
-        <p14:creationId xmlns:p14="http://schemas.microsoft.com/office/powerpoint/2010/main" xmlns="" val="1908513650"/>
+        <p14:creationId xmlns:p14="http://schemas.microsoft.com/office/powerpoint/2010/main" val="1908513650"/>
       </p:ext>
     </p:extLst>
   </p:cSld>
@@ -945,7 +945,7 @@
     </p:spTree>
     <p:extLst>
       <p:ext uri="{BB962C8B-B14F-4D97-AF65-F5344CB8AC3E}">
-        <p14:creationId xmlns:p14="http://schemas.microsoft.com/office/powerpoint/2010/main" xmlns="" val="1290809032"/>
+        <p14:creationId xmlns:p14="http://schemas.microsoft.com/office/powerpoint/2010/main" val="1290809032"/>
       </p:ext>
     </p:extLst>
   </p:cSld>
@@ -1033,7 +1033,7 @@
     </p:spTree>
     <p:extLst>
       <p:ext uri="{BB962C8B-B14F-4D97-AF65-F5344CB8AC3E}">
-        <p14:creationId xmlns:p14="http://schemas.microsoft.com/office/powerpoint/2010/main" xmlns="" val="1934575751"/>
+        <p14:creationId xmlns:p14="http://schemas.microsoft.com/office/powerpoint/2010/main" val="1934575751"/>
       </p:ext>
     </p:extLst>
   </p:cSld>
@@ -1118,7 +1118,7 @@
     </p:spTree>
     <p:extLst>
       <p:ext uri="{BB962C8B-B14F-4D97-AF65-F5344CB8AC3E}">
-        <p14:creationId xmlns:p14="http://schemas.microsoft.com/office/powerpoint/2010/main" xmlns="" val="1338302363"/>
+        <p14:creationId xmlns:p14="http://schemas.microsoft.com/office/powerpoint/2010/main" val="1338302363"/>
       </p:ext>
     </p:extLst>
   </p:cSld>
@@ -1203,7 +1203,7 @@
     </p:spTree>
     <p:extLst>
       <p:ext uri="{BB962C8B-B14F-4D97-AF65-F5344CB8AC3E}">
-        <p14:creationId xmlns:p14="http://schemas.microsoft.com/office/powerpoint/2010/main" xmlns="" val="1709335026"/>
+        <p14:creationId xmlns:p14="http://schemas.microsoft.com/office/powerpoint/2010/main" val="1709335026"/>
       </p:ext>
     </p:extLst>
   </p:cSld>
@@ -1292,7 +1292,7 @@
     </p:spTree>
     <p:extLst>
       <p:ext uri="{BB962C8B-B14F-4D97-AF65-F5344CB8AC3E}">
-        <p14:creationId xmlns:p14="http://schemas.microsoft.com/office/powerpoint/2010/main" xmlns="" val="2547361010"/>
+        <p14:creationId xmlns:p14="http://schemas.microsoft.com/office/powerpoint/2010/main" val="2547361010"/>
       </p:ext>
     </p:extLst>
   </p:cSld>
@@ -1381,7 +1381,7 @@
     </p:spTree>
     <p:extLst>
       <p:ext uri="{BB962C8B-B14F-4D97-AF65-F5344CB8AC3E}">
-        <p14:creationId xmlns:p14="http://schemas.microsoft.com/office/powerpoint/2010/main" xmlns="" val="118867002"/>
+        <p14:creationId xmlns:p14="http://schemas.microsoft.com/office/powerpoint/2010/main" val="118867002"/>
       </p:ext>
     </p:extLst>
   </p:cSld>
@@ -1466,7 +1466,7 @@
     </p:spTree>
     <p:extLst>
       <p:ext uri="{BB962C8B-B14F-4D97-AF65-F5344CB8AC3E}">
-        <p14:creationId xmlns:p14="http://schemas.microsoft.com/office/powerpoint/2010/main" xmlns="" val="1701973911"/>
+        <p14:creationId xmlns:p14="http://schemas.microsoft.com/office/powerpoint/2010/main" val="1701973911"/>
       </p:ext>
     </p:extLst>
   </p:cSld>
@@ -1551,7 +1551,7 @@
     </p:spTree>
     <p:extLst>
       <p:ext uri="{BB962C8B-B14F-4D97-AF65-F5344CB8AC3E}">
-        <p14:creationId xmlns:p14="http://schemas.microsoft.com/office/powerpoint/2010/main" xmlns="" val="3646170879"/>
+        <p14:creationId xmlns:p14="http://schemas.microsoft.com/office/powerpoint/2010/main" val="3646170879"/>
       </p:ext>
     </p:extLst>
   </p:cSld>
@@ -1640,7 +1640,7 @@
     </p:spTree>
     <p:extLst>
       <p:ext uri="{BB962C8B-B14F-4D97-AF65-F5344CB8AC3E}">
-        <p14:creationId xmlns:p14="http://schemas.microsoft.com/office/powerpoint/2010/main" xmlns="" val="1064196180"/>
+        <p14:creationId xmlns:p14="http://schemas.microsoft.com/office/powerpoint/2010/main" val="1064196180"/>
       </p:ext>
     </p:extLst>
   </p:cSld>
@@ -1725,7 +1725,7 @@
     </p:spTree>
     <p:extLst>
       <p:ext uri="{BB962C8B-B14F-4D97-AF65-F5344CB8AC3E}">
-        <p14:creationId xmlns:p14="http://schemas.microsoft.com/office/powerpoint/2010/main" xmlns="" val="295822067"/>
+        <p14:creationId xmlns:p14="http://schemas.microsoft.com/office/powerpoint/2010/main" val="295822067"/>
       </p:ext>
     </p:extLst>
   </p:cSld>
@@ -1813,7 +1813,7 @@
     </p:spTree>
     <p:extLst>
       <p:ext uri="{BB962C8B-B14F-4D97-AF65-F5344CB8AC3E}">
-        <p14:creationId xmlns:p14="http://schemas.microsoft.com/office/powerpoint/2010/main" xmlns="" val="3069441310"/>
+        <p14:creationId xmlns:p14="http://schemas.microsoft.com/office/powerpoint/2010/main" val="3069441310"/>
       </p:ext>
     </p:extLst>
   </p:cSld>
@@ -1898,7 +1898,7 @@
     </p:spTree>
     <p:extLst>
       <p:ext uri="{BB962C8B-B14F-4D97-AF65-F5344CB8AC3E}">
-        <p14:creationId xmlns:p14="http://schemas.microsoft.com/office/powerpoint/2010/main" xmlns="" val="2042606102"/>
+        <p14:creationId xmlns:p14="http://schemas.microsoft.com/office/powerpoint/2010/main" val="2042606102"/>
       </p:ext>
     </p:extLst>
   </p:cSld>
@@ -1986,7 +1986,7 @@
     </p:spTree>
     <p:extLst>
       <p:ext uri="{BB962C8B-B14F-4D97-AF65-F5344CB8AC3E}">
-        <p14:creationId xmlns:p14="http://schemas.microsoft.com/office/powerpoint/2010/main" xmlns="" val="2462296944"/>
+        <p14:creationId xmlns:p14="http://schemas.microsoft.com/office/powerpoint/2010/main" val="2462296944"/>
       </p:ext>
     </p:extLst>
   </p:cSld>
@@ -2558,7 +2558,7 @@
             <a:fld id="{4E708F12-96AD-4ED4-8132-A78F5E42C1F5}" type="datetime1">
               <a:rPr lang="en-US" smtClean="0"/>
               <a:pPr/>
-              <a:t>1/26/2017</a:t>
+              <a:t>12/7/2018</a:t>
             </a:fld>
             <a:endParaRPr lang="en-US" dirty="0"/>
           </a:p>
@@ -2725,20 +2725,20 @@
     </p:spTree>
     <p:extLst>
       <p:ext uri="{BB962C8B-B14F-4D97-AF65-F5344CB8AC3E}">
-        <p14:creationId xmlns:p14="http://schemas.microsoft.com/office/powerpoint/2010/main" xmlns="" val="3601152184"/>
+        <p14:creationId xmlns:p14="http://schemas.microsoft.com/office/powerpoint/2010/main" val="3601152184"/>
       </p:ext>
     </p:extLst>
   </p:cSld>
   <p:clrMapOvr>
     <a:masterClrMapping/>
   </p:clrMapOvr>
-  <mc:AlternateContent xmlns:mc="http://schemas.openxmlformats.org/markup-compatibility/2006">
-    <mc:Choice xmlns:p14="http://schemas.microsoft.com/office/powerpoint/2010/main" xmlns="" Requires="p14">
+  <mc:AlternateContent xmlns:mc="http://schemas.openxmlformats.org/markup-compatibility/2006" xmlns:p14="http://schemas.microsoft.com/office/powerpoint/2010/main">
+    <mc:Choice Requires="p14">
       <p:transition spd="med" p14:dur="700">
         <p:fade/>
       </p:transition>
     </mc:Choice>
-    <mc:Fallback>
+    <mc:Fallback xmlns="">
       <p:transition spd="med">
         <p:fade/>
       </p:transition>
@@ -2782,7 +2782,7 @@
             <a:fld id="{7B7FA170-8299-44AD-AEEF-FC686C3D7804}" type="datetime1">
               <a:rPr lang="en-US" smtClean="0"/>
               <a:pPr/>
-              <a:t>1/26/2017</a:t>
+              <a:t>12/7/2018</a:t>
             </a:fld>
             <a:endParaRPr lang="en-US" dirty="0"/>
           </a:p>
@@ -2909,20 +2909,20 @@
     </p:spTree>
     <p:extLst>
       <p:ext uri="{BB962C8B-B14F-4D97-AF65-F5344CB8AC3E}">
-        <p14:creationId xmlns:p14="http://schemas.microsoft.com/office/powerpoint/2010/main" xmlns="" val="3467844215"/>
+        <p14:creationId xmlns:p14="http://schemas.microsoft.com/office/powerpoint/2010/main" val="3467844215"/>
       </p:ext>
     </p:extLst>
   </p:cSld>
   <p:clrMapOvr>
     <a:masterClrMapping/>
   </p:clrMapOvr>
-  <mc:AlternateContent xmlns:mc="http://schemas.openxmlformats.org/markup-compatibility/2006">
-    <mc:Choice xmlns:p14="http://schemas.microsoft.com/office/powerpoint/2010/main" xmlns="" Requires="p14">
+  <mc:AlternateContent xmlns:mc="http://schemas.openxmlformats.org/markup-compatibility/2006" xmlns:p14="http://schemas.microsoft.com/office/powerpoint/2010/main">
+    <mc:Choice Requires="p14">
       <p:transition spd="med" p14:dur="700">
         <p:fade/>
       </p:transition>
     </mc:Choice>
-    <mc:Fallback>
+    <mc:Fallback xmlns="">
       <p:transition spd="med">
         <p:fade/>
       </p:transition>
@@ -2966,7 +2966,7 @@
             <a:fld id="{2231763A-68EC-4ECD-9620-D9FE9CDDD622}" type="datetime1">
               <a:rPr lang="en-US" smtClean="0"/>
               <a:pPr/>
-              <a:t>1/26/2017</a:t>
+              <a:t>12/7/2018</a:t>
             </a:fld>
             <a:endParaRPr lang="en-US" dirty="0"/>
           </a:p>
@@ -3103,20 +3103,20 @@
     </p:spTree>
     <p:extLst>
       <p:ext uri="{BB962C8B-B14F-4D97-AF65-F5344CB8AC3E}">
-        <p14:creationId xmlns:p14="http://schemas.microsoft.com/office/powerpoint/2010/main" xmlns="" val="2978088367"/>
+        <p14:creationId xmlns:p14="http://schemas.microsoft.com/office/powerpoint/2010/main" val="2978088367"/>
       </p:ext>
     </p:extLst>
   </p:cSld>
   <p:clrMapOvr>
     <a:masterClrMapping/>
   </p:clrMapOvr>
-  <mc:AlternateContent xmlns:mc="http://schemas.openxmlformats.org/markup-compatibility/2006">
-    <mc:Choice xmlns:p14="http://schemas.microsoft.com/office/powerpoint/2010/main" xmlns="" Requires="p14">
+  <mc:AlternateContent xmlns:mc="http://schemas.openxmlformats.org/markup-compatibility/2006" xmlns:p14="http://schemas.microsoft.com/office/powerpoint/2010/main">
+    <mc:Choice Requires="p14">
       <p:transition spd="med" p14:dur="700">
         <p:fade/>
       </p:transition>
     </mc:Choice>
-    <mc:Fallback>
+    <mc:Fallback xmlns="">
       <p:transition spd="med">
         <p:fade/>
       </p:transition>
@@ -3160,7 +3160,7 @@
             <a:fld id="{7B98BEDD-6160-49BB-B372-861DE7DE9BA5}" type="datetime1">
               <a:rPr lang="en-US" smtClean="0"/>
               <a:pPr/>
-              <a:t>1/26/2017</a:t>
+              <a:t>12/7/2018</a:t>
             </a:fld>
             <a:endParaRPr lang="en-US" dirty="0"/>
           </a:p>
@@ -3287,20 +3287,20 @@
     </p:spTree>
     <p:extLst>
       <p:ext uri="{BB962C8B-B14F-4D97-AF65-F5344CB8AC3E}">
-        <p14:creationId xmlns:p14="http://schemas.microsoft.com/office/powerpoint/2010/main" xmlns="" val="3594303165"/>
+        <p14:creationId xmlns:p14="http://schemas.microsoft.com/office/powerpoint/2010/main" val="3594303165"/>
       </p:ext>
     </p:extLst>
   </p:cSld>
   <p:clrMapOvr>
     <a:masterClrMapping/>
   </p:clrMapOvr>
-  <mc:AlternateContent xmlns:mc="http://schemas.openxmlformats.org/markup-compatibility/2006">
-    <mc:Choice xmlns:p14="http://schemas.microsoft.com/office/powerpoint/2010/main" xmlns="" Requires="p14">
+  <mc:AlternateContent xmlns:mc="http://schemas.openxmlformats.org/markup-compatibility/2006" xmlns:p14="http://schemas.microsoft.com/office/powerpoint/2010/main">
+    <mc:Choice Requires="p14">
       <p:transition spd="med" p14:dur="700">
         <p:fade/>
       </p:transition>
     </mc:Choice>
-    <mc:Fallback>
+    <mc:Fallback xmlns="">
       <p:transition spd="med">
         <p:fade/>
       </p:transition>
@@ -3344,7 +3344,7 @@
             <a:fld id="{0AAE819F-B7FD-4B29-8F66-9E318144BC2A}" type="datetime1">
               <a:rPr lang="en-US" smtClean="0"/>
               <a:pPr/>
-              <a:t>1/26/2017</a:t>
+              <a:t>12/7/2018</a:t>
             </a:fld>
             <a:endParaRPr lang="en-US" dirty="0"/>
           </a:p>
@@ -3521,20 +3521,20 @@
     </p:spTree>
     <p:extLst>
       <p:ext uri="{BB962C8B-B14F-4D97-AF65-F5344CB8AC3E}">
-        <p14:creationId xmlns:p14="http://schemas.microsoft.com/office/powerpoint/2010/main" xmlns="" val="2705127227"/>
+        <p14:creationId xmlns:p14="http://schemas.microsoft.com/office/powerpoint/2010/main" val="2705127227"/>
       </p:ext>
     </p:extLst>
   </p:cSld>
   <p:clrMapOvr>
     <a:masterClrMapping/>
   </p:clrMapOvr>
-  <mc:AlternateContent xmlns:mc="http://schemas.openxmlformats.org/markup-compatibility/2006">
-    <mc:Choice xmlns:p14="http://schemas.microsoft.com/office/powerpoint/2010/main" xmlns="" Requires="p14">
+  <mc:AlternateContent xmlns:mc="http://schemas.openxmlformats.org/markup-compatibility/2006" xmlns:p14="http://schemas.microsoft.com/office/powerpoint/2010/main">
+    <mc:Choice Requires="p14">
       <p:transition spd="med" p14:dur="700">
         <p:fade/>
       </p:transition>
     </mc:Choice>
-    <mc:Fallback>
+    <mc:Fallback xmlns="">
       <p:transition spd="med">
         <p:fade/>
       </p:transition>
@@ -3578,7 +3578,7 @@
             <a:fld id="{D4CA159C-B6E0-4F10-9F4A-2FA57003B139}" type="datetime1">
               <a:rPr lang="en-US" smtClean="0"/>
               <a:pPr/>
-              <a:t>1/26/2017</a:t>
+              <a:t>12/7/2018</a:t>
             </a:fld>
             <a:endParaRPr lang="en-US" dirty="0"/>
           </a:p>
@@ -3799,20 +3799,20 @@
     </p:spTree>
     <p:extLst>
       <p:ext uri="{BB962C8B-B14F-4D97-AF65-F5344CB8AC3E}">
-        <p14:creationId xmlns:p14="http://schemas.microsoft.com/office/powerpoint/2010/main" xmlns="" val="3446445169"/>
+        <p14:creationId xmlns:p14="http://schemas.microsoft.com/office/powerpoint/2010/main" val="3446445169"/>
       </p:ext>
     </p:extLst>
   </p:cSld>
   <p:clrMapOvr>
     <a:masterClrMapping/>
   </p:clrMapOvr>
-  <mc:AlternateContent xmlns:mc="http://schemas.openxmlformats.org/markup-compatibility/2006">
-    <mc:Choice xmlns:p14="http://schemas.microsoft.com/office/powerpoint/2010/main" xmlns="" Requires="p14">
+  <mc:AlternateContent xmlns:mc="http://schemas.openxmlformats.org/markup-compatibility/2006" xmlns:p14="http://schemas.microsoft.com/office/powerpoint/2010/main">
+    <mc:Choice Requires="p14">
       <p:transition spd="med" p14:dur="700">
         <p:fade/>
       </p:transition>
     </mc:Choice>
-    <mc:Fallback>
+    <mc:Fallback xmlns="">
       <p:transition spd="med">
         <p:fade/>
       </p:transition>
@@ -3820,7 +3820,7 @@
   </mc:AlternateContent>
   <p:extLst mod="1">
     <p:ext uri="{DCECCB84-F9BA-43D5-87BE-67443E8EF086}">
-      <p15:sldGuideLst xmlns:p15="http://schemas.microsoft.com/office/powerpoint/2012/main" xmlns="">
+      <p15:sldGuideLst xmlns:p15="http://schemas.microsoft.com/office/powerpoint/2012/main">
         <p15:guide id="0" orient="horz" pos="2160" userDrawn="1">
           <p15:clr>
             <a:srgbClr val="FBAE40"/>
@@ -3872,7 +3872,7 @@
             <a:fld id="{8170CBBB-D1D1-4386-A5E9-07F3477B78F3}" type="datetime1">
               <a:rPr lang="en-US" smtClean="0"/>
               <a:pPr/>
-              <a:t>1/26/2017</a:t>
+              <a:t>12/7/2018</a:t>
             </a:fld>
             <a:endParaRPr lang="en-US" dirty="0"/>
           </a:p>
@@ -4240,20 +4240,20 @@
     </p:spTree>
     <p:extLst>
       <p:ext uri="{BB962C8B-B14F-4D97-AF65-F5344CB8AC3E}">
-        <p14:creationId xmlns:p14="http://schemas.microsoft.com/office/powerpoint/2010/main" xmlns="" val="370716595"/>
+        <p14:creationId xmlns:p14="http://schemas.microsoft.com/office/powerpoint/2010/main" val="370716595"/>
       </p:ext>
     </p:extLst>
   </p:cSld>
   <p:clrMapOvr>
     <a:masterClrMapping/>
   </p:clrMapOvr>
-  <mc:AlternateContent xmlns:mc="http://schemas.openxmlformats.org/markup-compatibility/2006">
-    <mc:Choice xmlns:p14="http://schemas.microsoft.com/office/powerpoint/2010/main" xmlns="" Requires="p14">
+  <mc:AlternateContent xmlns:mc="http://schemas.openxmlformats.org/markup-compatibility/2006" xmlns:p14="http://schemas.microsoft.com/office/powerpoint/2010/main">
+    <mc:Choice Requires="p14">
       <p:transition spd="med" p14:dur="700">
         <p:fade/>
       </p:transition>
     </mc:Choice>
-    <mc:Fallback>
+    <mc:Fallback xmlns="">
       <p:transition spd="med">
         <p:fade/>
       </p:transition>
@@ -4302,7 +4302,7 @@
             <a:fld id="{9FA4CAD8-0EA7-4615-B69B-B2F199EF3A93}" type="datetime1">
               <a:rPr lang="en-US" smtClean="0"/>
               <a:pPr/>
-              <a:t>1/26/2017</a:t>
+              <a:t>12/7/2018</a:t>
             </a:fld>
             <a:endParaRPr lang="en-US" dirty="0"/>
           </a:p>
@@ -4400,20 +4400,20 @@
     </p:spTree>
     <p:extLst>
       <p:ext uri="{BB962C8B-B14F-4D97-AF65-F5344CB8AC3E}">
-        <p14:creationId xmlns:p14="http://schemas.microsoft.com/office/powerpoint/2010/main" xmlns="" val="3821952534"/>
+        <p14:creationId xmlns:p14="http://schemas.microsoft.com/office/powerpoint/2010/main" val="3821952534"/>
       </p:ext>
     </p:extLst>
   </p:cSld>
   <p:clrMapOvr>
     <a:masterClrMapping/>
   </p:clrMapOvr>
-  <mc:AlternateContent xmlns:mc="http://schemas.openxmlformats.org/markup-compatibility/2006">
-    <mc:Choice xmlns:p14="http://schemas.microsoft.com/office/powerpoint/2010/main" xmlns="" Requires="p14">
+  <mc:AlternateContent xmlns:mc="http://schemas.openxmlformats.org/markup-compatibility/2006" xmlns:p14="http://schemas.microsoft.com/office/powerpoint/2010/main">
+    <mc:Choice Requires="p14">
       <p:transition spd="med" p14:dur="700">
         <p:fade/>
       </p:transition>
     </mc:Choice>
-    <mc:Fallback>
+    <mc:Fallback xmlns="">
       <p:transition spd="med">
         <p:fade/>
       </p:transition>
@@ -4457,7 +4457,7 @@
             <a:fld id="{B9234BD7-6953-492C-921B-E68B2D7F14C8}" type="datetime1">
               <a:rPr lang="en-US" smtClean="0"/>
               <a:pPr/>
-              <a:t>1/26/2017</a:t>
+              <a:t>12/7/2018</a:t>
             </a:fld>
             <a:endParaRPr lang="en-US" dirty="0"/>
           </a:p>
@@ -4509,20 +4509,20 @@
     </p:spTree>
     <p:extLst>
       <p:ext uri="{BB962C8B-B14F-4D97-AF65-F5344CB8AC3E}">
-        <p14:creationId xmlns:p14="http://schemas.microsoft.com/office/powerpoint/2010/main" xmlns="" val="1135695157"/>
+        <p14:creationId xmlns:p14="http://schemas.microsoft.com/office/powerpoint/2010/main" val="1135695157"/>
       </p:ext>
     </p:extLst>
   </p:cSld>
   <p:clrMapOvr>
     <a:masterClrMapping/>
   </p:clrMapOvr>
-  <mc:AlternateContent xmlns:mc="http://schemas.openxmlformats.org/markup-compatibility/2006">
-    <mc:Choice xmlns:p14="http://schemas.microsoft.com/office/powerpoint/2010/main" xmlns="" Requires="p14">
+  <mc:AlternateContent xmlns:mc="http://schemas.openxmlformats.org/markup-compatibility/2006" xmlns:p14="http://schemas.microsoft.com/office/powerpoint/2010/main">
+    <mc:Choice Requires="p14">
       <p:transition spd="med" p14:dur="700">
         <p:fade/>
       </p:transition>
     </mc:Choice>
-    <mc:Fallback>
+    <mc:Fallback xmlns="">
       <p:transition spd="med">
         <p:fade/>
       </p:transition>
@@ -4566,7 +4566,7 @@
             <a:fld id="{35A17D9B-D4D3-4E23-88DF-2E354FA43196}" type="datetime1">
               <a:rPr lang="en-US" smtClean="0"/>
               <a:pPr/>
-              <a:t>1/26/2017</a:t>
+              <a:t>12/7/2018</a:t>
             </a:fld>
             <a:endParaRPr lang="en-US" dirty="0"/>
           </a:p>
@@ -4773,20 +4773,20 @@
     </p:spTree>
     <p:extLst>
       <p:ext uri="{BB962C8B-B14F-4D97-AF65-F5344CB8AC3E}">
-        <p14:creationId xmlns:p14="http://schemas.microsoft.com/office/powerpoint/2010/main" xmlns="" val="498685234"/>
+        <p14:creationId xmlns:p14="http://schemas.microsoft.com/office/powerpoint/2010/main" val="498685234"/>
       </p:ext>
     </p:extLst>
   </p:cSld>
   <p:clrMapOvr>
     <a:masterClrMapping/>
   </p:clrMapOvr>
-  <mc:AlternateContent xmlns:mc="http://schemas.openxmlformats.org/markup-compatibility/2006">
-    <mc:Choice xmlns:p14="http://schemas.microsoft.com/office/powerpoint/2010/main" xmlns="" Requires="p14">
+  <mc:AlternateContent xmlns:mc="http://schemas.openxmlformats.org/markup-compatibility/2006" xmlns:p14="http://schemas.microsoft.com/office/powerpoint/2010/main">
+    <mc:Choice Requires="p14">
       <p:transition spd="med" p14:dur="700">
         <p:fade/>
       </p:transition>
     </mc:Choice>
-    <mc:Fallback>
+    <mc:Fallback xmlns="">
       <p:transition spd="med">
         <p:fade/>
       </p:transition>
@@ -4830,7 +4830,7 @@
             <a:fld id="{541F67C5-D04E-4576-B61C-12ABA14BBD6C}" type="datetime1">
               <a:rPr lang="en-US" smtClean="0"/>
               <a:pPr/>
-              <a:t>1/26/2017</a:t>
+              <a:t>12/7/2018</a:t>
             </a:fld>
             <a:endParaRPr lang="en-US" dirty="0"/>
           </a:p>
@@ -5036,20 +5036,20 @@
     </p:spTree>
     <p:extLst>
       <p:ext uri="{BB962C8B-B14F-4D97-AF65-F5344CB8AC3E}">
-        <p14:creationId xmlns:p14="http://schemas.microsoft.com/office/powerpoint/2010/main" xmlns="" val="1883619828"/>
+        <p14:creationId xmlns:p14="http://schemas.microsoft.com/office/powerpoint/2010/main" val="1883619828"/>
       </p:ext>
     </p:extLst>
   </p:cSld>
   <p:clrMapOvr>
     <a:masterClrMapping/>
   </p:clrMapOvr>
-  <mc:AlternateContent xmlns:mc="http://schemas.openxmlformats.org/markup-compatibility/2006">
-    <mc:Choice xmlns:p14="http://schemas.microsoft.com/office/powerpoint/2010/main" xmlns="" Requires="p14">
+  <mc:AlternateContent xmlns:mc="http://schemas.openxmlformats.org/markup-compatibility/2006" xmlns:p14="http://schemas.microsoft.com/office/powerpoint/2010/main">
+    <mc:Choice Requires="p14">
       <p:transition spd="med" p14:dur="700">
         <p:fade/>
       </p:transition>
     </mc:Choice>
-    <mc:Fallback>
+    <mc:Fallback xmlns="">
       <p:transition spd="med">
         <p:fade/>
       </p:transition>
@@ -5732,7 +5732,7 @@
             <a:fld id="{C20F09E4-6EA4-4BF3-9FC8-FF40373B88E6}" type="datetime1">
               <a:rPr lang="en-US" smtClean="0"/>
               <a:pPr/>
-              <a:t>1/26/2017</a:t>
+              <a:t>12/7/2018</a:t>
             </a:fld>
             <a:endParaRPr lang="en-US" dirty="0"/>
           </a:p>
@@ -5911,7 +5911,7 @@
     </p:spTree>
     <p:extLst>
       <p:ext uri="{BB962C8B-B14F-4D97-AF65-F5344CB8AC3E}">
-        <p14:creationId xmlns:p14="http://schemas.microsoft.com/office/powerpoint/2010/main" xmlns="" val="2132171725"/>
+        <p14:creationId xmlns:p14="http://schemas.microsoft.com/office/powerpoint/2010/main" val="2132171725"/>
       </p:ext>
     </p:extLst>
   </p:cSld>
@@ -5929,13 +5929,13 @@
     <p:sldLayoutId id="2147483706" r:id="rId10"/>
     <p:sldLayoutId id="2147483707" r:id="rId11"/>
   </p:sldLayoutIdLst>
-  <mc:AlternateContent xmlns:mc="http://schemas.openxmlformats.org/markup-compatibility/2006">
-    <mc:Choice xmlns:p14="http://schemas.microsoft.com/office/powerpoint/2010/main" xmlns="" Requires="p14">
+  <mc:AlternateContent xmlns:mc="http://schemas.openxmlformats.org/markup-compatibility/2006" xmlns:p14="http://schemas.microsoft.com/office/powerpoint/2010/main">
+    <mc:Choice Requires="p14">
       <p:transition spd="med" p14:dur="700">
         <p:fade/>
       </p:transition>
     </mc:Choice>
-    <mc:Fallback>
+    <mc:Fallback xmlns="">
       <p:transition spd="med">
         <p:fade/>
       </p:transition>
@@ -6225,7 +6225,7 @@
   </p:txStyles>
   <p:extLst mod="1">
     <p:ext uri="{27BBF7A9-308A-43DC-89C8-2F10F3537804}">
-      <p15:sldGuideLst xmlns:p15="http://schemas.microsoft.com/office/powerpoint/2012/main" xmlns="">
+      <p15:sldGuideLst xmlns:p15="http://schemas.microsoft.com/office/powerpoint/2012/main">
         <p15:guide id="0" orient="horz" pos="2160" userDrawn="1">
           <p15:clr>
             <a:srgbClr val="F26B43"/>
@@ -6384,20 +6384,20 @@
     </p:spTree>
     <p:extLst>
       <p:ext uri="{BB962C8B-B14F-4D97-AF65-F5344CB8AC3E}">
-        <p14:creationId xmlns:p14="http://schemas.microsoft.com/office/powerpoint/2010/main" xmlns="" val="706305541"/>
+        <p14:creationId xmlns:p14="http://schemas.microsoft.com/office/powerpoint/2010/main" val="706305541"/>
       </p:ext>
     </p:extLst>
   </p:cSld>
   <p:clrMapOvr>
     <a:masterClrMapping/>
   </p:clrMapOvr>
-  <mc:AlternateContent xmlns:mc="http://schemas.openxmlformats.org/markup-compatibility/2006">
-    <mc:Choice xmlns:p14="http://schemas.microsoft.com/office/powerpoint/2010/main" xmlns="" Requires="p14">
+  <mc:AlternateContent xmlns:mc="http://schemas.openxmlformats.org/markup-compatibility/2006" xmlns:p14="http://schemas.microsoft.com/office/powerpoint/2010/main">
+    <mc:Choice Requires="p14">
       <p:transition spd="med" p14:dur="700">
         <p:fade/>
       </p:transition>
     </mc:Choice>
-    <mc:Fallback>
+    <mc:Fallback xmlns="">
       <p:transition spd="med">
         <p:fade/>
       </p:transition>
@@ -6981,21 +6981,35 @@
                 <a:latin typeface="Times New Roman" panose="02020603050405020304" pitchFamily="18" charset="0"/>
                 <a:cs typeface="Times New Roman" panose="02020603050405020304" pitchFamily="18" charset="0"/>
               </a:rPr>
-              <a:t>', '</a:t>
-            </a:r>
-            <a:r>
-              <a:rPr lang="en-US" sz="1400" dirty="0" err="1">
-                <a:latin typeface="Times New Roman" panose="02020603050405020304" pitchFamily="18" charset="0"/>
-                <a:cs typeface="Times New Roman" panose="02020603050405020304" pitchFamily="18" charset="0"/>
-              </a:rPr>
-              <a:t>bedop</a:t>
+              <a:t>', </a:t>
+            </a:r>
+            <a:r>
+              <a:rPr lang="en-US" sz="1400" dirty="0" smtClean="0">
+                <a:latin typeface="Times New Roman" panose="02020603050405020304" pitchFamily="18" charset="0"/>
+                <a:cs typeface="Times New Roman" panose="02020603050405020304" pitchFamily="18" charset="0"/>
+              </a:rPr>
+              <a:t>'</a:t>
+            </a:r>
+            <a:r>
+              <a:rPr lang="en-US" sz="1400" dirty="0" err="1" smtClean="0">
+                <a:latin typeface="Times New Roman" panose="02020603050405020304" pitchFamily="18" charset="0"/>
+                <a:cs typeface="Times New Roman" panose="02020603050405020304" pitchFamily="18" charset="0"/>
+              </a:rPr>
+              <a:t>bedops</a:t>
+            </a:r>
+            <a:r>
+              <a:rPr lang="en-US" sz="1400" dirty="0" smtClean="0">
+                <a:latin typeface="Times New Roman" panose="02020603050405020304" pitchFamily="18" charset="0"/>
+                <a:cs typeface="Times New Roman" panose="02020603050405020304" pitchFamily="18" charset="0"/>
+              </a:rPr>
+              <a:t>', </a:t>
             </a:r>
             <a:r>
               <a:rPr lang="en-US" sz="1400" dirty="0">
                 <a:latin typeface="Times New Roman" panose="02020603050405020304" pitchFamily="18" charset="0"/>
                 <a:cs typeface="Times New Roman" panose="02020603050405020304" pitchFamily="18" charset="0"/>
               </a:rPr>
-              <a:t>', '</a:t>
+              <a:t>'</a:t>
             </a:r>
             <a:r>
               <a:rPr lang="en-US" sz="1400" dirty="0" err="1">
@@ -7338,20 +7352,20 @@
     </p:spTree>
     <p:extLst>
       <p:ext uri="{BB962C8B-B14F-4D97-AF65-F5344CB8AC3E}">
-        <p14:creationId xmlns:p14="http://schemas.microsoft.com/office/powerpoint/2010/main" xmlns="" val="4237670843"/>
+        <p14:creationId xmlns:p14="http://schemas.microsoft.com/office/powerpoint/2010/main" val="4237670843"/>
       </p:ext>
     </p:extLst>
   </p:cSld>
   <p:clrMapOvr>
     <a:masterClrMapping/>
   </p:clrMapOvr>
-  <mc:AlternateContent xmlns:mc="http://schemas.openxmlformats.org/markup-compatibility/2006">
-    <mc:Choice xmlns:p14="http://schemas.microsoft.com/office/powerpoint/2010/main" xmlns="" Requires="p14">
+  <mc:AlternateContent xmlns:mc="http://schemas.openxmlformats.org/markup-compatibility/2006" xmlns:p14="http://schemas.microsoft.com/office/powerpoint/2010/main">
+    <mc:Choice Requires="p14">
       <p:transition spd="med" p14:dur="700">
         <p:fade/>
       </p:transition>
     </mc:Choice>
-    <mc:Fallback>
+    <mc:Fallback xmlns="">
       <p:transition spd="med">
         <p:fade/>
       </p:transition>
@@ -8330,20 +8344,20 @@
     </p:spTree>
     <p:extLst>
       <p:ext uri="{BB962C8B-B14F-4D97-AF65-F5344CB8AC3E}">
-        <p14:creationId xmlns:p14="http://schemas.microsoft.com/office/powerpoint/2010/main" xmlns="" val="384888077"/>
+        <p14:creationId xmlns:p14="http://schemas.microsoft.com/office/powerpoint/2010/main" val="384888077"/>
       </p:ext>
     </p:extLst>
   </p:cSld>
   <p:clrMapOvr>
     <a:masterClrMapping/>
   </p:clrMapOvr>
-  <mc:AlternateContent xmlns:mc="http://schemas.openxmlformats.org/markup-compatibility/2006">
-    <mc:Choice xmlns:p14="http://schemas.microsoft.com/office/powerpoint/2010/main" xmlns="" Requires="p14">
+  <mc:AlternateContent xmlns:mc="http://schemas.openxmlformats.org/markup-compatibility/2006" xmlns:p14="http://schemas.microsoft.com/office/powerpoint/2010/main">
+    <mc:Choice Requires="p14">
       <p:transition spd="med" p14:dur="700">
         <p:fade/>
       </p:transition>
     </mc:Choice>
-    <mc:Fallback>
+    <mc:Fallback xmlns="">
       <p:transition spd="med">
         <p:fade/>
       </p:transition>
@@ -8779,20 +8793,20 @@
     </p:spTree>
     <p:extLst>
       <p:ext uri="{BB962C8B-B14F-4D97-AF65-F5344CB8AC3E}">
-        <p14:creationId xmlns:p14="http://schemas.microsoft.com/office/powerpoint/2010/main" xmlns="" val="1771752402"/>
+        <p14:creationId xmlns:p14="http://schemas.microsoft.com/office/powerpoint/2010/main" val="1771752402"/>
       </p:ext>
     </p:extLst>
   </p:cSld>
   <p:clrMapOvr>
     <a:masterClrMapping/>
   </p:clrMapOvr>
-  <mc:AlternateContent xmlns:mc="http://schemas.openxmlformats.org/markup-compatibility/2006">
-    <mc:Choice xmlns:p14="http://schemas.microsoft.com/office/powerpoint/2010/main" xmlns="" Requires="p14">
+  <mc:AlternateContent xmlns:mc="http://schemas.openxmlformats.org/markup-compatibility/2006" xmlns:p14="http://schemas.microsoft.com/office/powerpoint/2010/main">
+    <mc:Choice Requires="p14">
       <p:transition spd="med" p14:dur="700">
         <p:fade/>
       </p:transition>
     </mc:Choice>
-    <mc:Fallback>
+    <mc:Fallback xmlns="">
       <p:transition spd="med">
         <p:fade/>
       </p:transition>
@@ -9782,20 +9796,20 @@
     </p:spTree>
     <p:extLst>
       <p:ext uri="{BB962C8B-B14F-4D97-AF65-F5344CB8AC3E}">
-        <p14:creationId xmlns:p14="http://schemas.microsoft.com/office/powerpoint/2010/main" xmlns="" val="2242570613"/>
+        <p14:creationId xmlns:p14="http://schemas.microsoft.com/office/powerpoint/2010/main" val="2242570613"/>
       </p:ext>
     </p:extLst>
   </p:cSld>
   <p:clrMapOvr>
     <a:masterClrMapping/>
   </p:clrMapOvr>
-  <mc:AlternateContent xmlns:mc="http://schemas.openxmlformats.org/markup-compatibility/2006">
-    <mc:Choice xmlns:p14="http://schemas.microsoft.com/office/powerpoint/2010/main" xmlns="" Requires="p14">
+  <mc:AlternateContent xmlns:mc="http://schemas.openxmlformats.org/markup-compatibility/2006" xmlns:p14="http://schemas.microsoft.com/office/powerpoint/2010/main">
+    <mc:Choice Requires="p14">
       <p:transition spd="med" p14:dur="700">
         <p:fade/>
       </p:transition>
     </mc:Choice>
-    <mc:Fallback>
+    <mc:Fallback xmlns="">
       <p:transition spd="med">
         <p:fade/>
       </p:transition>
@@ -10816,20 +10830,20 @@
     </p:spTree>
     <p:extLst>
       <p:ext uri="{BB962C8B-B14F-4D97-AF65-F5344CB8AC3E}">
-        <p14:creationId xmlns:p14="http://schemas.microsoft.com/office/powerpoint/2010/main" xmlns="" val="3056500915"/>
+        <p14:creationId xmlns:p14="http://schemas.microsoft.com/office/powerpoint/2010/main" val="3056500915"/>
       </p:ext>
     </p:extLst>
   </p:cSld>
   <p:clrMapOvr>
     <a:masterClrMapping/>
   </p:clrMapOvr>
-  <mc:AlternateContent xmlns:mc="http://schemas.openxmlformats.org/markup-compatibility/2006">
-    <mc:Choice xmlns:p14="http://schemas.microsoft.com/office/powerpoint/2010/main" xmlns="" Requires="p14">
+  <mc:AlternateContent xmlns:mc="http://schemas.openxmlformats.org/markup-compatibility/2006" xmlns:p14="http://schemas.microsoft.com/office/powerpoint/2010/main">
+    <mc:Choice Requires="p14">
       <p:transition spd="med" p14:dur="700">
         <p:fade/>
       </p:transition>
     </mc:Choice>
-    <mc:Fallback>
+    <mc:Fallback xmlns="">
       <p:transition spd="med">
         <p:fade/>
       </p:transition>
@@ -11916,20 +11930,20 @@
     </p:spTree>
     <p:extLst>
       <p:ext uri="{BB962C8B-B14F-4D97-AF65-F5344CB8AC3E}">
-        <p14:creationId xmlns:p14="http://schemas.microsoft.com/office/powerpoint/2010/main" xmlns="" val="1649755180"/>
+        <p14:creationId xmlns:p14="http://schemas.microsoft.com/office/powerpoint/2010/main" val="1649755180"/>
       </p:ext>
     </p:extLst>
   </p:cSld>
   <p:clrMapOvr>
     <a:masterClrMapping/>
   </p:clrMapOvr>
-  <mc:AlternateContent xmlns:mc="http://schemas.openxmlformats.org/markup-compatibility/2006">
-    <mc:Choice xmlns:p14="http://schemas.microsoft.com/office/powerpoint/2010/main" xmlns="" Requires="p14">
+  <mc:AlternateContent xmlns:mc="http://schemas.openxmlformats.org/markup-compatibility/2006" xmlns:p14="http://schemas.microsoft.com/office/powerpoint/2010/main">
+    <mc:Choice Requires="p14">
       <p:transition spd="med" p14:dur="700">
         <p:fade/>
       </p:transition>
     </mc:Choice>
-    <mc:Fallback>
+    <mc:Fallback xmlns="">
       <p:transition spd="med">
         <p:fade/>
       </p:transition>
@@ -12770,20 +12784,20 @@
     </p:spTree>
     <p:extLst>
       <p:ext uri="{BB962C8B-B14F-4D97-AF65-F5344CB8AC3E}">
-        <p14:creationId xmlns:p14="http://schemas.microsoft.com/office/powerpoint/2010/main" xmlns="" val="2586293034"/>
+        <p14:creationId xmlns:p14="http://schemas.microsoft.com/office/powerpoint/2010/main" val="2586293034"/>
       </p:ext>
     </p:extLst>
   </p:cSld>
   <p:clrMapOvr>
     <a:masterClrMapping/>
   </p:clrMapOvr>
-  <mc:AlternateContent xmlns:mc="http://schemas.openxmlformats.org/markup-compatibility/2006">
-    <mc:Choice xmlns:p14="http://schemas.microsoft.com/office/powerpoint/2010/main" xmlns="" Requires="p14">
+  <mc:AlternateContent xmlns:mc="http://schemas.openxmlformats.org/markup-compatibility/2006" xmlns:p14="http://schemas.microsoft.com/office/powerpoint/2010/main">
+    <mc:Choice Requires="p14">
       <p:transition spd="med" p14:dur="700">
         <p:fade/>
       </p:transition>
     </mc:Choice>
-    <mc:Fallback>
+    <mc:Fallback xmlns="">
       <p:transition spd="med">
         <p:fade/>
       </p:transition>
@@ -14176,20 +14190,20 @@
     </p:spTree>
     <p:extLst>
       <p:ext uri="{BB962C8B-B14F-4D97-AF65-F5344CB8AC3E}">
-        <p14:creationId xmlns:p14="http://schemas.microsoft.com/office/powerpoint/2010/main" xmlns="" val="3537234432"/>
+        <p14:creationId xmlns:p14="http://schemas.microsoft.com/office/powerpoint/2010/main" val="3537234432"/>
       </p:ext>
     </p:extLst>
   </p:cSld>
   <p:clrMapOvr>
     <a:masterClrMapping/>
   </p:clrMapOvr>
-  <mc:AlternateContent xmlns:mc="http://schemas.openxmlformats.org/markup-compatibility/2006">
-    <mc:Choice xmlns:p14="http://schemas.microsoft.com/office/powerpoint/2010/main" xmlns="" Requires="p14">
+  <mc:AlternateContent xmlns:mc="http://schemas.openxmlformats.org/markup-compatibility/2006" xmlns:p14="http://schemas.microsoft.com/office/powerpoint/2010/main">
+    <mc:Choice Requires="p14">
       <p:transition spd="med" p14:dur="700">
         <p:fade/>
       </p:transition>
     </mc:Choice>
-    <mc:Fallback>
+    <mc:Fallback xmlns="">
       <p:transition spd="med">
         <p:fade/>
       </p:transition>
@@ -15080,20 +15094,20 @@
     </p:spTree>
     <p:extLst>
       <p:ext uri="{BB962C8B-B14F-4D97-AF65-F5344CB8AC3E}">
-        <p14:creationId xmlns:p14="http://schemas.microsoft.com/office/powerpoint/2010/main" xmlns="" val="2774262937"/>
+        <p14:creationId xmlns:p14="http://schemas.microsoft.com/office/powerpoint/2010/main" val="2774262937"/>
       </p:ext>
     </p:extLst>
   </p:cSld>
   <p:clrMapOvr>
     <a:masterClrMapping/>
   </p:clrMapOvr>
-  <mc:AlternateContent xmlns:mc="http://schemas.openxmlformats.org/markup-compatibility/2006">
-    <mc:Choice xmlns:p14="http://schemas.microsoft.com/office/powerpoint/2010/main" xmlns="" Requires="p14">
+  <mc:AlternateContent xmlns:mc="http://schemas.openxmlformats.org/markup-compatibility/2006" xmlns:p14="http://schemas.microsoft.com/office/powerpoint/2010/main">
+    <mc:Choice Requires="p14">
       <p:transition spd="med" p14:dur="700">
         <p:fade/>
       </p:transition>
     </mc:Choice>
-    <mc:Fallback>
+    <mc:Fallback xmlns="">
       <p:transition spd="med">
         <p:fade/>
       </p:transition>
@@ -15251,20 +15265,20 @@
     </p:spTree>
     <p:extLst>
       <p:ext uri="{BB962C8B-B14F-4D97-AF65-F5344CB8AC3E}">
-        <p14:creationId xmlns:p14="http://schemas.microsoft.com/office/powerpoint/2010/main" xmlns="" val="65627960"/>
+        <p14:creationId xmlns:p14="http://schemas.microsoft.com/office/powerpoint/2010/main" val="65627960"/>
       </p:ext>
     </p:extLst>
   </p:cSld>
   <p:clrMapOvr>
     <a:masterClrMapping/>
   </p:clrMapOvr>
-  <mc:AlternateContent xmlns:mc="http://schemas.openxmlformats.org/markup-compatibility/2006">
-    <mc:Choice xmlns:p14="http://schemas.microsoft.com/office/powerpoint/2010/main" xmlns="" Requires="p14">
+  <mc:AlternateContent xmlns:mc="http://schemas.openxmlformats.org/markup-compatibility/2006" xmlns:p14="http://schemas.microsoft.com/office/powerpoint/2010/main">
+    <mc:Choice Requires="p14">
       <p:transition spd="med" p14:dur="700">
         <p:fade/>
       </p:transition>
     </mc:Choice>
-    <mc:Fallback>
+    <mc:Fallback xmlns="">
       <p:transition spd="med">
         <p:fade/>
       </p:transition>
@@ -15448,20 +15462,20 @@
     </p:spTree>
     <p:extLst>
       <p:ext uri="{BB962C8B-B14F-4D97-AF65-F5344CB8AC3E}">
-        <p14:creationId xmlns:p14="http://schemas.microsoft.com/office/powerpoint/2010/main" xmlns="" val="1198150999"/>
+        <p14:creationId xmlns:p14="http://schemas.microsoft.com/office/powerpoint/2010/main" val="1198150999"/>
       </p:ext>
     </p:extLst>
   </p:cSld>
   <p:clrMapOvr>
     <a:masterClrMapping/>
   </p:clrMapOvr>
-  <mc:AlternateContent xmlns:mc="http://schemas.openxmlformats.org/markup-compatibility/2006">
-    <mc:Choice xmlns:p14="http://schemas.microsoft.com/office/powerpoint/2010/main" xmlns="" Requires="p14">
+  <mc:AlternateContent xmlns:mc="http://schemas.openxmlformats.org/markup-compatibility/2006" xmlns:p14="http://schemas.microsoft.com/office/powerpoint/2010/main">
+    <mc:Choice Requires="p14">
       <p:transition spd="med" p14:dur="700">
         <p:fade/>
       </p:transition>
     </mc:Choice>
-    <mc:Fallback>
+    <mc:Fallback xmlns="">
       <p:transition spd="med">
         <p:fade/>
       </p:transition>
@@ -15858,20 +15872,20 @@
     </p:spTree>
     <p:extLst>
       <p:ext uri="{BB962C8B-B14F-4D97-AF65-F5344CB8AC3E}">
-        <p14:creationId xmlns:p14="http://schemas.microsoft.com/office/powerpoint/2010/main" xmlns="" val="3436511039"/>
+        <p14:creationId xmlns:p14="http://schemas.microsoft.com/office/powerpoint/2010/main" val="3436511039"/>
       </p:ext>
     </p:extLst>
   </p:cSld>
   <p:clrMapOvr>
     <a:masterClrMapping/>
   </p:clrMapOvr>
-  <mc:AlternateContent xmlns:mc="http://schemas.openxmlformats.org/markup-compatibility/2006">
-    <mc:Choice xmlns:p14="http://schemas.microsoft.com/office/powerpoint/2010/main" xmlns="" Requires="p14">
+  <mc:AlternateContent xmlns:mc="http://schemas.openxmlformats.org/markup-compatibility/2006" xmlns:p14="http://schemas.microsoft.com/office/powerpoint/2010/main">
+    <mc:Choice Requires="p14">
       <p:transition spd="med" p14:dur="700">
         <p:fade/>
       </p:transition>
     </mc:Choice>
-    <mc:Fallback>
+    <mc:Fallback xmlns="">
       <p:transition spd="med">
         <p:fade/>
       </p:transition>
@@ -16652,20 +16666,20 @@
     </p:spTree>
     <p:extLst>
       <p:ext uri="{BB962C8B-B14F-4D97-AF65-F5344CB8AC3E}">
-        <p14:creationId xmlns:p14="http://schemas.microsoft.com/office/powerpoint/2010/main" xmlns="" val="4237039325"/>
+        <p14:creationId xmlns:p14="http://schemas.microsoft.com/office/powerpoint/2010/main" val="4237039325"/>
       </p:ext>
     </p:extLst>
   </p:cSld>
   <p:clrMapOvr>
     <a:masterClrMapping/>
   </p:clrMapOvr>
-  <mc:AlternateContent xmlns:mc="http://schemas.openxmlformats.org/markup-compatibility/2006">
-    <mc:Choice xmlns:p14="http://schemas.microsoft.com/office/powerpoint/2010/main" xmlns="" Requires="p14">
+  <mc:AlternateContent xmlns:mc="http://schemas.openxmlformats.org/markup-compatibility/2006" xmlns:p14="http://schemas.microsoft.com/office/powerpoint/2010/main">
+    <mc:Choice Requires="p14">
       <p:transition spd="med" p14:dur="700">
         <p:fade/>
       </p:transition>
     </mc:Choice>
-    <mc:Fallback>
+    <mc:Fallback xmlns="">
       <p:transition spd="med">
         <p:fade/>
       </p:transition>
@@ -16815,20 +16829,20 @@
     </p:spTree>
     <p:extLst>
       <p:ext uri="{BB962C8B-B14F-4D97-AF65-F5344CB8AC3E}">
-        <p14:creationId xmlns:p14="http://schemas.microsoft.com/office/powerpoint/2010/main" xmlns="" val="3615970230"/>
+        <p14:creationId xmlns:p14="http://schemas.microsoft.com/office/powerpoint/2010/main" val="3615970230"/>
       </p:ext>
     </p:extLst>
   </p:cSld>
   <p:clrMapOvr>
     <a:masterClrMapping/>
   </p:clrMapOvr>
-  <mc:AlternateContent xmlns:mc="http://schemas.openxmlformats.org/markup-compatibility/2006">
-    <mc:Choice xmlns:p14="http://schemas.microsoft.com/office/powerpoint/2010/main" xmlns="" Requires="p14">
+  <mc:AlternateContent xmlns:mc="http://schemas.openxmlformats.org/markup-compatibility/2006" xmlns:p14="http://schemas.microsoft.com/office/powerpoint/2010/main">
+    <mc:Choice Requires="p14">
       <p:transition spd="med" p14:dur="700">
         <p:fade/>
       </p:transition>
     </mc:Choice>
-    <mc:Fallback>
+    <mc:Fallback xmlns="">
       <p:transition spd="med">
         <p:fade/>
       </p:transition>
@@ -17665,7 +17679,7 @@
                 <a:latin typeface="Times New Roman" panose="02020603050405020304" pitchFamily="18" charset="0"/>
                 <a:cs typeface="Times New Roman" panose="02020603050405020304" pitchFamily="18" charset="0"/>
               </a:rPr>
-              <a:t>", 	header=FALSE, threshold=8);</a:t>
+              <a:t>", 	header=FALSE);</a:t>
             </a:r>
           </a:p>
           <a:p>
@@ -17894,7 +17908,7 @@
                 <a:latin typeface="Times New Roman" panose="02020603050405020304" pitchFamily="18" charset="0"/>
                 <a:cs typeface="Times New Roman" panose="02020603050405020304" pitchFamily="18" charset="0"/>
               </a:rPr>
-              <a:t>= 7);  </a:t>
+              <a:t>= 7 , threshold=8);  </a:t>
             </a:r>
             <a:endParaRPr lang="en-US" sz="1400" dirty="0" smtClean="0">
               <a:solidFill>
@@ -17969,20 +17983,20 @@
     </p:spTree>
     <p:extLst>
       <p:ext uri="{BB962C8B-B14F-4D97-AF65-F5344CB8AC3E}">
-        <p14:creationId xmlns:p14="http://schemas.microsoft.com/office/powerpoint/2010/main" xmlns="" val="1665556587"/>
+        <p14:creationId xmlns:p14="http://schemas.microsoft.com/office/powerpoint/2010/main" val="1665556587"/>
       </p:ext>
     </p:extLst>
   </p:cSld>
   <p:clrMapOvr>
     <a:masterClrMapping/>
   </p:clrMapOvr>
-  <mc:AlternateContent xmlns:mc="http://schemas.openxmlformats.org/markup-compatibility/2006">
-    <mc:Choice xmlns:p14="http://schemas.microsoft.com/office/powerpoint/2010/main" xmlns="" Requires="p14">
+  <mc:AlternateContent xmlns:mc="http://schemas.openxmlformats.org/markup-compatibility/2006" xmlns:p14="http://schemas.microsoft.com/office/powerpoint/2010/main">
+    <mc:Choice Requires="p14">
       <p:transition spd="med" p14:dur="700">
         <p:fade/>
       </p:transition>
     </mc:Choice>
-    <mc:Fallback>
+    <mc:Fallback xmlns="">
       <p:transition spd="med">
         <p:fade/>
       </p:transition>
@@ -18773,20 +18787,20 @@
     </p:spTree>
     <p:extLst>
       <p:ext uri="{BB962C8B-B14F-4D97-AF65-F5344CB8AC3E}">
-        <p14:creationId xmlns:p14="http://schemas.microsoft.com/office/powerpoint/2010/main" xmlns="" val="967488287"/>
+        <p14:creationId xmlns:p14="http://schemas.microsoft.com/office/powerpoint/2010/main" val="967488287"/>
       </p:ext>
     </p:extLst>
   </p:cSld>
   <p:clrMapOvr>
     <a:masterClrMapping/>
   </p:clrMapOvr>
-  <mc:AlternateContent xmlns:mc="http://schemas.openxmlformats.org/markup-compatibility/2006">
-    <mc:Choice xmlns:p14="http://schemas.microsoft.com/office/powerpoint/2010/main" xmlns="" Requires="p14">
+  <mc:AlternateContent xmlns:mc="http://schemas.openxmlformats.org/markup-compatibility/2006" xmlns:p14="http://schemas.microsoft.com/office/powerpoint/2010/main">
+    <mc:Choice Requires="p14">
       <p:transition spd="med" p14:dur="700">
         <p:fade/>
       </p:transition>
     </mc:Choice>
-    <mc:Fallback>
+    <mc:Fallback xmlns="">
       <p:transition spd="med">
         <p:fade/>
       </p:transition>
@@ -19121,20 +19135,20 @@
     </p:spTree>
     <p:extLst>
       <p:ext uri="{BB962C8B-B14F-4D97-AF65-F5344CB8AC3E}">
-        <p14:creationId xmlns:p14="http://schemas.microsoft.com/office/powerpoint/2010/main" xmlns="" val="3284964494"/>
+        <p14:creationId xmlns:p14="http://schemas.microsoft.com/office/powerpoint/2010/main" val="3284964494"/>
       </p:ext>
     </p:extLst>
   </p:cSld>
   <p:clrMapOvr>
     <a:masterClrMapping/>
   </p:clrMapOvr>
-  <mc:AlternateContent xmlns:mc="http://schemas.openxmlformats.org/markup-compatibility/2006">
-    <mc:Choice xmlns:p14="http://schemas.microsoft.com/office/powerpoint/2010/main" xmlns="" Requires="p14">
+  <mc:AlternateContent xmlns:mc="http://schemas.openxmlformats.org/markup-compatibility/2006" xmlns:p14="http://schemas.microsoft.com/office/powerpoint/2010/main">
+    <mc:Choice Requires="p14">
       <p:transition spd="med" p14:dur="700">
         <p:fade/>
       </p:transition>
     </mc:Choice>
-    <mc:Fallback>
+    <mc:Fallback xmlns="">
       <p:transition spd="med">
         <p:fade/>
       </p:transition>
@@ -20418,20 +20432,20 @@
     </p:spTree>
     <p:extLst>
       <p:ext uri="{BB962C8B-B14F-4D97-AF65-F5344CB8AC3E}">
-        <p14:creationId xmlns:p14="http://schemas.microsoft.com/office/powerpoint/2010/main" xmlns="" val="669523446"/>
+        <p14:creationId xmlns:p14="http://schemas.microsoft.com/office/powerpoint/2010/main" val="669523446"/>
       </p:ext>
     </p:extLst>
   </p:cSld>
   <p:clrMapOvr>
     <a:masterClrMapping/>
   </p:clrMapOvr>
-  <mc:AlternateContent xmlns:mc="http://schemas.openxmlformats.org/markup-compatibility/2006">
-    <mc:Choice xmlns:p14="http://schemas.microsoft.com/office/powerpoint/2010/main" xmlns="" Requires="p14">
+  <mc:AlternateContent xmlns:mc="http://schemas.openxmlformats.org/markup-compatibility/2006" xmlns:p14="http://schemas.microsoft.com/office/powerpoint/2010/main">
+    <mc:Choice Requires="p14">
       <p:transition spd="med" p14:dur="700">
         <p:fade/>
       </p:transition>
     </mc:Choice>
-    <mc:Fallback>
+    <mc:Fallback xmlns="">
       <p:transition spd="med">
         <p:fade/>
       </p:transition>
@@ -20717,20 +20731,20 @@
     </p:spTree>
     <p:extLst>
       <p:ext uri="{BB962C8B-B14F-4D97-AF65-F5344CB8AC3E}">
-        <p14:creationId xmlns:p14="http://schemas.microsoft.com/office/powerpoint/2010/main" xmlns="" val="286076213"/>
+        <p14:creationId xmlns:p14="http://schemas.microsoft.com/office/powerpoint/2010/main" val="286076213"/>
       </p:ext>
     </p:extLst>
   </p:cSld>
   <p:clrMapOvr>
     <a:masterClrMapping/>
   </p:clrMapOvr>
-  <mc:AlternateContent xmlns:mc="http://schemas.openxmlformats.org/markup-compatibility/2006">
-    <mc:Choice xmlns:p14="http://schemas.microsoft.com/office/powerpoint/2010/main" xmlns="" Requires="p14">
+  <mc:AlternateContent xmlns:mc="http://schemas.openxmlformats.org/markup-compatibility/2006" xmlns:p14="http://schemas.microsoft.com/office/powerpoint/2010/main">
+    <mc:Choice Requires="p14">
       <p:transition spd="med" p14:dur="700">
         <p:fade/>
       </p:transition>
     </mc:Choice>
-    <mc:Fallback>
+    <mc:Fallback xmlns="">
       <p:transition spd="med">
         <p:fade/>
       </p:transition>
@@ -21951,20 +21965,20 @@
     </p:spTree>
     <p:extLst>
       <p:ext uri="{BB962C8B-B14F-4D97-AF65-F5344CB8AC3E}">
-        <p14:creationId xmlns:p14="http://schemas.microsoft.com/office/powerpoint/2010/main" xmlns="" val="1393943048"/>
+        <p14:creationId xmlns:p14="http://schemas.microsoft.com/office/powerpoint/2010/main" val="1393943048"/>
       </p:ext>
     </p:extLst>
   </p:cSld>
   <p:clrMapOvr>
     <a:masterClrMapping/>
   </p:clrMapOvr>
-  <mc:AlternateContent xmlns:mc="http://schemas.openxmlformats.org/markup-compatibility/2006">
-    <mc:Choice xmlns:p14="http://schemas.microsoft.com/office/powerpoint/2010/main" xmlns="" Requires="p14">
+  <mc:AlternateContent xmlns:mc="http://schemas.openxmlformats.org/markup-compatibility/2006" xmlns:p14="http://schemas.microsoft.com/office/powerpoint/2010/main">
+    <mc:Choice Requires="p14">
       <p:transition spd="med" p14:dur="700">
         <p:fade/>
       </p:transition>
     </mc:Choice>
-    <mc:Fallback>
+    <mc:Fallback xmlns="">
       <p:transition spd="med">
         <p:fade/>
       </p:transition>
@@ -22103,20 +22117,20 @@
     </p:spTree>
     <p:extLst>
       <p:ext uri="{BB962C8B-B14F-4D97-AF65-F5344CB8AC3E}">
-        <p14:creationId xmlns:p14="http://schemas.microsoft.com/office/powerpoint/2010/main" xmlns="" val="3982392824"/>
+        <p14:creationId xmlns:p14="http://schemas.microsoft.com/office/powerpoint/2010/main" val="3982392824"/>
       </p:ext>
     </p:extLst>
   </p:cSld>
   <p:clrMapOvr>
     <a:masterClrMapping/>
   </p:clrMapOvr>
-  <mc:AlternateContent xmlns:mc="http://schemas.openxmlformats.org/markup-compatibility/2006">
-    <mc:Choice xmlns:p14="http://schemas.microsoft.com/office/powerpoint/2010/main" xmlns="" Requires="p14">
+  <mc:AlternateContent xmlns:mc="http://schemas.openxmlformats.org/markup-compatibility/2006" xmlns:p14="http://schemas.microsoft.com/office/powerpoint/2010/main">
+    <mc:Choice Requires="p14">
       <p:transition spd="med" p14:dur="700">
         <p:fade/>
       </p:transition>
     </mc:Choice>
-    <mc:Fallback>
+    <mc:Fallback xmlns="">
       <p:transition spd="med">
         <p:fade/>
       </p:transition>
@@ -22221,13 +22235,13 @@
   <p:clrMapOvr>
     <a:masterClrMapping/>
   </p:clrMapOvr>
-  <mc:AlternateContent xmlns:mc="http://schemas.openxmlformats.org/markup-compatibility/2006">
-    <mc:Choice xmlns:p14="http://schemas.microsoft.com/office/powerpoint/2010/main" xmlns="" Requires="p14">
+  <mc:AlternateContent xmlns:mc="http://schemas.openxmlformats.org/markup-compatibility/2006" xmlns:p14="http://schemas.microsoft.com/office/powerpoint/2010/main">
+    <mc:Choice Requires="p14">
       <p:transition spd="med" p14:dur="700">
         <p:fade/>
       </p:transition>
     </mc:Choice>
-    <mc:Fallback>
+    <mc:Fallback xmlns="">
       <p:transition spd="med">
         <p:fade/>
       </p:transition>
@@ -22376,20 +22390,20 @@
     </p:spTree>
     <p:extLst>
       <p:ext uri="{BB962C8B-B14F-4D97-AF65-F5344CB8AC3E}">
-        <p14:creationId xmlns:p14="http://schemas.microsoft.com/office/powerpoint/2010/main" xmlns="" val="86259864"/>
+        <p14:creationId xmlns:p14="http://schemas.microsoft.com/office/powerpoint/2010/main" val="86259864"/>
       </p:ext>
     </p:extLst>
   </p:cSld>
   <p:clrMapOvr>
     <a:masterClrMapping/>
   </p:clrMapOvr>
-  <mc:AlternateContent xmlns:mc="http://schemas.openxmlformats.org/markup-compatibility/2006">
-    <mc:Choice xmlns:p14="http://schemas.microsoft.com/office/powerpoint/2010/main" xmlns="" Requires="p14">
+  <mc:AlternateContent xmlns:mc="http://schemas.openxmlformats.org/markup-compatibility/2006" xmlns:p14="http://schemas.microsoft.com/office/powerpoint/2010/main">
+    <mc:Choice Requires="p14">
       <p:transition spd="med" p14:dur="700">
         <p:fade/>
       </p:transition>
     </mc:Choice>
-    <mc:Fallback>
+    <mc:Fallback xmlns="">
       <p:transition spd="med">
         <p:fade/>
       </p:transition>
@@ -22905,20 +22919,20 @@
     </p:spTree>
     <p:extLst>
       <p:ext uri="{BB962C8B-B14F-4D97-AF65-F5344CB8AC3E}">
-        <p14:creationId xmlns:p14="http://schemas.microsoft.com/office/powerpoint/2010/main" xmlns="" val="728467612"/>
+        <p14:creationId xmlns:p14="http://schemas.microsoft.com/office/powerpoint/2010/main" val="728467612"/>
       </p:ext>
     </p:extLst>
   </p:cSld>
   <p:clrMapOvr>
     <a:masterClrMapping/>
   </p:clrMapOvr>
-  <mc:AlternateContent xmlns:mc="http://schemas.openxmlformats.org/markup-compatibility/2006">
-    <mc:Choice xmlns:p14="http://schemas.microsoft.com/office/powerpoint/2010/main" xmlns="" Requires="p14">
+  <mc:AlternateContent xmlns:mc="http://schemas.openxmlformats.org/markup-compatibility/2006" xmlns:p14="http://schemas.microsoft.com/office/powerpoint/2010/main">
+    <mc:Choice Requires="p14">
       <p:transition spd="med" p14:dur="700">
         <p:fade/>
       </p:transition>
     </mc:Choice>
-    <mc:Fallback>
+    <mc:Fallback xmlns="">
       <p:transition spd="med">
         <p:fade/>
       </p:transition>
@@ -23254,20 +23268,20 @@
     </p:spTree>
     <p:extLst>
       <p:ext uri="{BB962C8B-B14F-4D97-AF65-F5344CB8AC3E}">
-        <p14:creationId xmlns:p14="http://schemas.microsoft.com/office/powerpoint/2010/main" xmlns="" val="243335261"/>
+        <p14:creationId xmlns:p14="http://schemas.microsoft.com/office/powerpoint/2010/main" val="243335261"/>
       </p:ext>
     </p:extLst>
   </p:cSld>
   <p:clrMapOvr>
     <a:masterClrMapping/>
   </p:clrMapOvr>
-  <mc:AlternateContent xmlns:mc="http://schemas.openxmlformats.org/markup-compatibility/2006">
-    <mc:Choice xmlns:p14="http://schemas.microsoft.com/office/powerpoint/2010/main" xmlns="" Requires="p14">
+  <mc:AlternateContent xmlns:mc="http://schemas.openxmlformats.org/markup-compatibility/2006" xmlns:p14="http://schemas.microsoft.com/office/powerpoint/2010/main">
+    <mc:Choice Requires="p14">
       <p:transition spd="med" p14:dur="700">
         <p:fade/>
       </p:transition>
     </mc:Choice>
-    <mc:Fallback>
+    <mc:Fallback xmlns="">
       <p:transition spd="med">
         <p:fade/>
       </p:transition>
@@ -23474,20 +23488,20 @@
     </p:spTree>
     <p:extLst>
       <p:ext uri="{BB962C8B-B14F-4D97-AF65-F5344CB8AC3E}">
-        <p14:creationId xmlns:p14="http://schemas.microsoft.com/office/powerpoint/2010/main" xmlns="" val="3627382192"/>
+        <p14:creationId xmlns:p14="http://schemas.microsoft.com/office/powerpoint/2010/main" val="3627382192"/>
       </p:ext>
     </p:extLst>
   </p:cSld>
   <p:clrMapOvr>
     <a:masterClrMapping/>
   </p:clrMapOvr>
-  <mc:AlternateContent xmlns:mc="http://schemas.openxmlformats.org/markup-compatibility/2006">
-    <mc:Choice xmlns:p14="http://schemas.microsoft.com/office/powerpoint/2010/main" xmlns="" Requires="p14">
+  <mc:AlternateContent xmlns:mc="http://schemas.openxmlformats.org/markup-compatibility/2006" xmlns:p14="http://schemas.microsoft.com/office/powerpoint/2010/main">
+    <mc:Choice Requires="p14">
       <p:transition spd="med" p14:dur="700">
         <p:fade/>
       </p:transition>
     </mc:Choice>
-    <mc:Fallback>
+    <mc:Fallback xmlns="">
       <p:transition spd="med">
         <p:fade/>
       </p:transition>
@@ -23736,20 +23750,20 @@
     </p:spTree>
     <p:extLst>
       <p:ext uri="{BB962C8B-B14F-4D97-AF65-F5344CB8AC3E}">
-        <p14:creationId xmlns:p14="http://schemas.microsoft.com/office/powerpoint/2010/main" xmlns="" val="3982392824"/>
+        <p14:creationId xmlns:p14="http://schemas.microsoft.com/office/powerpoint/2010/main" val="3982392824"/>
       </p:ext>
     </p:extLst>
   </p:cSld>
   <p:clrMapOvr>
     <a:masterClrMapping/>
   </p:clrMapOvr>
-  <mc:AlternateContent xmlns:mc="http://schemas.openxmlformats.org/markup-compatibility/2006">
-    <mc:Choice xmlns:p14="http://schemas.microsoft.com/office/powerpoint/2010/main" xmlns="" Requires="p14">
+  <mc:AlternateContent xmlns:mc="http://schemas.openxmlformats.org/markup-compatibility/2006" xmlns:p14="http://schemas.microsoft.com/office/powerpoint/2010/main">
+    <mc:Choice Requires="p14">
       <p:transition spd="med" p14:dur="700">
         <p:fade/>
       </p:transition>
     </mc:Choice>
-    <mc:Fallback>
+    <mc:Fallback xmlns="">
       <p:transition spd="med">
         <p:fade/>
       </p:transition>
@@ -23892,20 +23906,20 @@
     </p:spTree>
     <p:extLst>
       <p:ext uri="{BB962C8B-B14F-4D97-AF65-F5344CB8AC3E}">
-        <p14:creationId xmlns:p14="http://schemas.microsoft.com/office/powerpoint/2010/main" xmlns="" val="1851896080"/>
+        <p14:creationId xmlns:p14="http://schemas.microsoft.com/office/powerpoint/2010/main" val="1851896080"/>
       </p:ext>
     </p:extLst>
   </p:cSld>
   <p:clrMapOvr>
     <a:masterClrMapping/>
   </p:clrMapOvr>
-  <mc:AlternateContent xmlns:mc="http://schemas.openxmlformats.org/markup-compatibility/2006">
-    <mc:Choice xmlns:p14="http://schemas.microsoft.com/office/powerpoint/2010/main" xmlns="" Requires="p14">
+  <mc:AlternateContent xmlns:mc="http://schemas.openxmlformats.org/markup-compatibility/2006" xmlns:p14="http://schemas.microsoft.com/office/powerpoint/2010/main">
+    <mc:Choice Requires="p14">
       <p:transition spd="med" p14:dur="700">
         <p:fade/>
       </p:transition>
     </mc:Choice>
-    <mc:Fallback>
+    <mc:Fallback xmlns="">
       <p:transition spd="med">
         <p:fade/>
       </p:transition>
@@ -24011,7 +24025,7 @@
           <a:blip r:embed="rId2" cstate="print">
             <a:extLst>
               <a:ext uri="{28A0092B-C50C-407E-A947-70E740481C1C}">
-                <a14:useLocalDpi xmlns:a14="http://schemas.microsoft.com/office/drawing/2010/main" xmlns="" val="0"/>
+                <a14:useLocalDpi xmlns:a14="http://schemas.microsoft.com/office/drawing/2010/main" val="0"/>
               </a:ext>
             </a:extLst>
           </a:blip>
@@ -24031,7 +24045,7 @@
           <a:noFill/>
           <a:extLst>
             <a:ext uri="{909E8E84-426E-40DD-AFC4-6F175D3DCCD1}">
-              <a14:hiddenFill xmlns:a14="http://schemas.microsoft.com/office/drawing/2010/main" xmlns="">
+              <a14:hiddenFill xmlns:a14="http://schemas.microsoft.com/office/drawing/2010/main">
                 <a:solidFill>
                   <a:srgbClr val="FFFFFF"/>
                 </a:solidFill>
@@ -24043,20 +24057,20 @@
     </p:spTree>
     <p:extLst>
       <p:ext uri="{BB962C8B-B14F-4D97-AF65-F5344CB8AC3E}">
-        <p14:creationId xmlns:p14="http://schemas.microsoft.com/office/powerpoint/2010/main" xmlns="" val="1254138836"/>
+        <p14:creationId xmlns:p14="http://schemas.microsoft.com/office/powerpoint/2010/main" val="1254138836"/>
       </p:ext>
     </p:extLst>
   </p:cSld>
   <p:clrMapOvr>
     <a:masterClrMapping/>
   </p:clrMapOvr>
-  <mc:AlternateContent xmlns:mc="http://schemas.openxmlformats.org/markup-compatibility/2006">
-    <mc:Choice xmlns:p14="http://schemas.microsoft.com/office/powerpoint/2010/main" xmlns="" Requires="p14">
+  <mc:AlternateContent xmlns:mc="http://schemas.openxmlformats.org/markup-compatibility/2006" xmlns:p14="http://schemas.microsoft.com/office/powerpoint/2010/main">
+    <mc:Choice Requires="p14">
       <p:transition spd="med" p14:dur="700">
         <p:fade/>
       </p:transition>
     </mc:Choice>
-    <mc:Fallback>
+    <mc:Fallback xmlns="">
       <p:transition spd="med">
         <p:fade/>
       </p:transition>
@@ -24310,20 +24324,20 @@
     </p:spTree>
     <p:extLst>
       <p:ext uri="{BB962C8B-B14F-4D97-AF65-F5344CB8AC3E}">
-        <p14:creationId xmlns:p14="http://schemas.microsoft.com/office/powerpoint/2010/main" xmlns="" val="1962344879"/>
+        <p14:creationId xmlns:p14="http://schemas.microsoft.com/office/powerpoint/2010/main" val="1962344879"/>
       </p:ext>
     </p:extLst>
   </p:cSld>
   <p:clrMapOvr>
     <a:masterClrMapping/>
   </p:clrMapOvr>
-  <mc:AlternateContent xmlns:mc="http://schemas.openxmlformats.org/markup-compatibility/2006">
-    <mc:Choice xmlns:p14="http://schemas.microsoft.com/office/powerpoint/2010/main" xmlns="" Requires="p14">
+  <mc:AlternateContent xmlns:mc="http://schemas.openxmlformats.org/markup-compatibility/2006" xmlns:p14="http://schemas.microsoft.com/office/powerpoint/2010/main">
+    <mc:Choice Requires="p14">
       <p:transition spd="med" p14:dur="700">
         <p:fade/>
       </p:transition>
     </mc:Choice>
-    <mc:Fallback>
+    <mc:Fallback xmlns="">
       <p:transition spd="med">
         <p:fade/>
       </p:transition>
@@ -25248,20 +25262,20 @@
     </p:spTree>
     <p:extLst>
       <p:ext uri="{BB962C8B-B14F-4D97-AF65-F5344CB8AC3E}">
-        <p14:creationId xmlns:p14="http://schemas.microsoft.com/office/powerpoint/2010/main" xmlns="" val="3733679413"/>
+        <p14:creationId xmlns:p14="http://schemas.microsoft.com/office/powerpoint/2010/main" val="3733679413"/>
       </p:ext>
     </p:extLst>
   </p:cSld>
   <p:clrMapOvr>
     <a:masterClrMapping/>
   </p:clrMapOvr>
-  <mc:AlternateContent xmlns:mc="http://schemas.openxmlformats.org/markup-compatibility/2006">
-    <mc:Choice xmlns:p14="http://schemas.microsoft.com/office/powerpoint/2010/main" xmlns="" Requires="p14">
+  <mc:AlternateContent xmlns:mc="http://schemas.openxmlformats.org/markup-compatibility/2006" xmlns:p14="http://schemas.microsoft.com/office/powerpoint/2010/main">
+    <mc:Choice Requires="p14">
       <p:transition spd="med" p14:dur="700">
         <p:fade/>
       </p:transition>
     </mc:Choice>
-    <mc:Fallback>
+    <mc:Fallback xmlns="">
       <p:transition spd="med">
         <p:fade/>
       </p:transition>
@@ -25948,20 +25962,20 @@
     </p:spTree>
     <p:extLst>
       <p:ext uri="{BB962C8B-B14F-4D97-AF65-F5344CB8AC3E}">
-        <p14:creationId xmlns:p14="http://schemas.microsoft.com/office/powerpoint/2010/main" xmlns="" val="2923801834"/>
+        <p14:creationId xmlns:p14="http://schemas.microsoft.com/office/powerpoint/2010/main" val="2923801834"/>
       </p:ext>
     </p:extLst>
   </p:cSld>
   <p:clrMapOvr>
     <a:masterClrMapping/>
   </p:clrMapOvr>
-  <mc:AlternateContent xmlns:mc="http://schemas.openxmlformats.org/markup-compatibility/2006">
-    <mc:Choice xmlns:p14="http://schemas.microsoft.com/office/powerpoint/2010/main" xmlns="" Requires="p14">
+  <mc:AlternateContent xmlns:mc="http://schemas.openxmlformats.org/markup-compatibility/2006" xmlns:p14="http://schemas.microsoft.com/office/powerpoint/2010/main">
+    <mc:Choice Requires="p14">
       <p:transition spd="med" p14:dur="700">
         <p:fade/>
       </p:transition>
     </mc:Choice>
-    <mc:Fallback>
+    <mc:Fallback xmlns="">
       <p:transition spd="med">
         <p:fade/>
       </p:transition>
@@ -27109,20 +27123,20 @@
     </p:spTree>
     <p:extLst>
       <p:ext uri="{BB962C8B-B14F-4D97-AF65-F5344CB8AC3E}">
-        <p14:creationId xmlns:p14="http://schemas.microsoft.com/office/powerpoint/2010/main" xmlns="" val="1392893668"/>
+        <p14:creationId xmlns:p14="http://schemas.microsoft.com/office/powerpoint/2010/main" val="1392893668"/>
       </p:ext>
     </p:extLst>
   </p:cSld>
   <p:clrMapOvr>
     <a:masterClrMapping/>
   </p:clrMapOvr>
-  <mc:AlternateContent xmlns:mc="http://schemas.openxmlformats.org/markup-compatibility/2006">
-    <mc:Choice xmlns:p14="http://schemas.microsoft.com/office/powerpoint/2010/main" xmlns="" Requires="p14">
+  <mc:AlternateContent xmlns:mc="http://schemas.openxmlformats.org/markup-compatibility/2006" xmlns:p14="http://schemas.microsoft.com/office/powerpoint/2010/main">
+    <mc:Choice Requires="p14">
       <p:transition spd="med" p14:dur="700">
         <p:fade/>
       </p:transition>
     </mc:Choice>
-    <mc:Fallback>
+    <mc:Fallback xmlns="">
       <p:transition spd="med">
         <p:fade/>
       </p:transition>
@@ -27397,7 +27411,7 @@
   <a:extraClrSchemeLst/>
   <a:extLst>
     <a:ext uri="{05A4C25C-085E-4340-85A3-A5531E510DB2}">
-      <thm15:themeFamily xmlns:thm15="http://schemas.microsoft.com/office/thememl/2012/main" xmlns="" name="Training presentation" id="{9308F140-5CDC-477D-BC4D-9C1906451284}" vid="{11C5112C-663B-4E6D-9D3D-2361F8FA32D6}"/>
+      <thm15:themeFamily xmlns:thm15="http://schemas.microsoft.com/office/thememl/2012/main" name="Training presentation" id="{9308F140-5CDC-477D-BC4D-9C1906451284}" vid="{11C5112C-663B-4E6D-9D3D-2361F8FA32D6}"/>
     </a:ext>
   </a:extLst>
 </a:theme>
@@ -27658,7 +27672,7 @@
   <a:extraClrSchemeLst/>
   <a:extLst>
     <a:ext uri="{05A4C25C-085E-4340-85A3-A5531E510DB2}">
-      <thm15:themeFamily xmlns:thm15="http://schemas.microsoft.com/office/thememl/2012/main" xmlns="" name="Office Theme" id="{62F939B6-93AF-4DB8-9C6B-D6C7DFDC589F}" vid="{4A3C46E8-61CC-4603-A589-7422A47A8E4A}"/>
+      <thm15:themeFamily xmlns:thm15="http://schemas.microsoft.com/office/thememl/2012/main" name="Office Theme" id="{62F939B6-93AF-4DB8-9C6B-D6C7DFDC589F}" vid="{4A3C46E8-61CC-4603-A589-7422A47A8E4A}"/>
     </a:ext>
   </a:extLst>
 </a:theme>
@@ -27919,7 +27933,7 @@
   <a:extraClrSchemeLst/>
   <a:extLst>
     <a:ext uri="{05A4C25C-085E-4340-85A3-A5531E510DB2}">
-      <thm15:themeFamily xmlns:thm15="http://schemas.microsoft.com/office/thememl/2012/main" xmlns="" name="Office Theme" id="{62F939B6-93AF-4DB8-9C6B-D6C7DFDC589F}" vid="{4A3C46E8-61CC-4603-A589-7422A47A8E4A}"/>
+      <thm15:themeFamily xmlns:thm15="http://schemas.microsoft.com/office/thememl/2012/main" name="Office Theme" id="{62F939B6-93AF-4DB8-9C6B-D6C7DFDC589F}" vid="{4A3C46E8-61CC-4603-A589-7422A47A8E4A}"/>
     </a:ext>
   </a:extLst>
 </a:theme>

</xml_diff>